<commit_message>
added instroduction, objectives, materials and methods
</commit_message>
<xml_diff>
--- a/2017-11-23__rostock__forschungscamp/poster.pptx
+++ b/2017-11-23__rostock__forschungscamp/poster.pptx
@@ -1925,7 +1925,7 @@
         </p:nvSpPr>
         <p:spPr>
           <a:xfrm>
-            <a:off x="3006720" y="6606720"/>
+            <a:off x="2934720" y="6606720"/>
             <a:ext cx="24119280" cy="2051640"/>
           </a:xfrm>
           <a:prstGeom prst="rect">
@@ -1973,8 +1973,8 @@
         </p:nvSpPr>
         <p:spPr>
           <a:xfrm>
-            <a:off x="3117240" y="9955080"/>
-            <a:ext cx="24119280" cy="26030160"/>
+            <a:off x="2928960" y="10063080"/>
+            <a:ext cx="11795760" cy="28981800"/>
           </a:xfrm>
           <a:prstGeom prst="rect">
             <a:avLst/>
@@ -1993,146 +1993,29 @@
         <p:txBody>
           <a:bodyPr lIns="0" rIns="0" tIns="208800" bIns="208800"/>
           <a:p>
-            <a:pPr marL="1566720" indent="-1566000">
-              <a:lnSpc>
-                <a:spcPct val="100000"/>
-              </a:lnSpc>
-              <a:spcBef>
-                <a:spcPts val="879"/>
-              </a:spcBef>
-            </a:pPr>
-            <a:endParaRPr b="0" lang="en-US" sz="1800" spc="-1" strike="noStrike">
-              <a:latin typeface="Arial"/>
-            </a:endParaRPr>
-          </a:p>
-          <a:p>
-            <a:pPr marL="1566720" indent="-1566000">
-              <a:lnSpc>
-                <a:spcPct val="100000"/>
-              </a:lnSpc>
-              <a:spcBef>
-                <a:spcPts val="879"/>
-              </a:spcBef>
-            </a:pPr>
-            <a:endParaRPr b="0" lang="en-US" sz="1800" spc="-1" strike="noStrike">
-              <a:latin typeface="Arial"/>
-            </a:endParaRPr>
-          </a:p>
-          <a:p>
-            <a:pPr marL="1566720" indent="-1566000">
-              <a:lnSpc>
-                <a:spcPct val="100000"/>
-              </a:lnSpc>
-              <a:spcBef>
-                <a:spcPts val="879"/>
-              </a:spcBef>
-            </a:pPr>
-            <a:endParaRPr b="0" lang="en-US" sz="1800" spc="-1" strike="noStrike">
-              <a:latin typeface="Arial"/>
-            </a:endParaRPr>
-          </a:p>
-          <a:p>
-            <a:pPr marL="1566720" indent="-1566000">
-              <a:lnSpc>
-                <a:spcPct val="100000"/>
-              </a:lnSpc>
-              <a:spcBef>
-                <a:spcPts val="879"/>
-              </a:spcBef>
-            </a:pPr>
-            <a:endParaRPr b="0" lang="en-US" sz="1800" spc="-1" strike="noStrike">
-              <a:latin typeface="Arial"/>
-            </a:endParaRPr>
-          </a:p>
-          <a:p>
-            <a:pPr marL="1566720" indent="-1566000">
-              <a:lnSpc>
-                <a:spcPct val="100000"/>
-              </a:lnSpc>
-              <a:spcBef>
-                <a:spcPts val="879"/>
-              </a:spcBef>
-            </a:pPr>
-            <a:endParaRPr b="0" lang="en-US" sz="1800" spc="-1" strike="noStrike">
-              <a:latin typeface="Arial"/>
-            </a:endParaRPr>
-          </a:p>
-          <a:p>
-            <a:pPr marL="1566720" indent="-1566000">
-              <a:lnSpc>
-                <a:spcPct val="100000"/>
-              </a:lnSpc>
-              <a:spcBef>
-                <a:spcPts val="879"/>
-              </a:spcBef>
-            </a:pPr>
-            <a:endParaRPr b="0" lang="en-US" sz="1800" spc="-1" strike="noStrike">
-              <a:latin typeface="Arial"/>
-            </a:endParaRPr>
-          </a:p>
-          <a:p>
-            <a:pPr marL="1566720" indent="-1566000">
-              <a:lnSpc>
-                <a:spcPct val="100000"/>
-              </a:lnSpc>
-              <a:spcBef>
-                <a:spcPts val="879"/>
-              </a:spcBef>
-            </a:pPr>
-            <a:endParaRPr b="0" lang="en-US" sz="1800" spc="-1" strike="noStrike">
-              <a:latin typeface="Arial"/>
-            </a:endParaRPr>
-          </a:p>
-          <a:p>
-            <a:pPr marL="1566720" indent="-1566000">
-              <a:lnSpc>
-                <a:spcPct val="100000"/>
-              </a:lnSpc>
-              <a:spcBef>
-                <a:spcPts val="879"/>
-              </a:spcBef>
-            </a:pPr>
-            <a:endParaRPr b="0" lang="en-US" sz="1800" spc="-1" strike="noStrike">
-              <a:latin typeface="Arial"/>
-            </a:endParaRPr>
-          </a:p>
-          <a:p>
-            <a:pPr marL="1566720" indent="-1566000">
-              <a:lnSpc>
-                <a:spcPct val="100000"/>
-              </a:lnSpc>
-              <a:spcBef>
-                <a:spcPts val="879"/>
-              </a:spcBef>
-            </a:pPr>
-            <a:r>
-              <a:rPr b="0" lang="en-US" sz="4400" spc="-1" strike="noStrike">
+            <a:pPr algn="just">
+              <a:lnSpc>
+                <a:spcPct val="100000"/>
+              </a:lnSpc>
+              <a:spcBef>
+                <a:spcPts val="879"/>
+              </a:spcBef>
+            </a:pPr>
+            <a:r>
+              <a:rPr b="1" lang="en-US" sz="5400" spc="-1" strike="noStrike">
                 <a:solidFill>
                   <a:srgbClr val="000000"/>
                 </a:solidFill>
                 <a:latin typeface="Arial Narrow"/>
               </a:rPr>
-              <a:t> </a:t>
-            </a:r>
-            <a:endParaRPr b="0" lang="en-US" sz="4400" spc="-1" strike="noStrike">
-              <a:latin typeface="Arial"/>
-            </a:endParaRPr>
-          </a:p>
-          <a:p>
-            <a:pPr marL="1566720" indent="-1566000">
-              <a:lnSpc>
-                <a:spcPct val="100000"/>
-              </a:lnSpc>
-              <a:spcBef>
-                <a:spcPts val="879"/>
-              </a:spcBef>
-            </a:pPr>
-            <a:endParaRPr b="0" lang="en-US" sz="4400" spc="-1" strike="noStrike">
-              <a:latin typeface="Arial"/>
-            </a:endParaRPr>
-          </a:p>
-          <a:p>
-            <a:pPr marL="1566720" indent="-1566000">
+              <a:t>Introduction</a:t>
+            </a:r>
+            <a:endParaRPr b="0" lang="en-US" sz="5400" spc="-1" strike="noStrike">
+              <a:latin typeface="Arial"/>
+            </a:endParaRPr>
+          </a:p>
+          <a:p>
+            <a:pPr algn="just">
               <a:lnSpc>
                 <a:spcPct val="100000"/>
               </a:lnSpc>
@@ -2147,36 +2030,49 @@
                 </a:solidFill>
                 <a:latin typeface="Arial Narrow"/>
               </a:rPr>
-              <a:t> </a:t>
-            </a:r>
-            <a:endParaRPr b="0" lang="en-US" sz="4400" spc="-1" strike="noStrike">
-              <a:latin typeface="Arial"/>
-            </a:endParaRPr>
-          </a:p>
-          <a:p>
-            <a:pPr marL="1566720" indent="-1566000">
-              <a:lnSpc>
-                <a:spcPct val="100000"/>
-              </a:lnSpc>
-              <a:spcBef>
-                <a:spcPts val="879"/>
-              </a:spcBef>
-            </a:pPr>
-            <a:r>
-              <a:rPr b="1" lang="en-US" sz="4400" spc="-1" strike="noStrike">
+              <a:t>The Galaxy community is promoting RNA-Seq protocols and best practices through the reuse of existing tools, and the consolidation of a Training Network to provide guidance to researchers through example datasets, tutorials, and interactive tours. However, the more tools and techniques are showcased, the more complex the options for tool chaining and parametrization become.</a:t>
+            </a:r>
+            <a:endParaRPr b="0" lang="en-US" sz="4400" spc="-1" strike="noStrike">
+              <a:latin typeface="Arial"/>
+            </a:endParaRPr>
+          </a:p>
+          <a:p>
+            <a:pPr algn="just">
+              <a:lnSpc>
+                <a:spcPct val="100000"/>
+              </a:lnSpc>
+              <a:spcBef>
+                <a:spcPts val="879"/>
+              </a:spcBef>
+            </a:pPr>
+            <a:endParaRPr b="0" lang="en-US" sz="4400" spc="-1" strike="noStrike">
+              <a:latin typeface="Arial"/>
+            </a:endParaRPr>
+          </a:p>
+          <a:p>
+            <a:pPr algn="just">
+              <a:lnSpc>
+                <a:spcPct val="100000"/>
+              </a:lnSpc>
+              <a:spcBef>
+                <a:spcPts val="879"/>
+              </a:spcBef>
+            </a:pPr>
+            <a:r>
+              <a:rPr b="1" lang="en-US" sz="5400" spc="-1" strike="noStrike">
                 <a:solidFill>
                   <a:srgbClr val="000000"/>
                 </a:solidFill>
                 <a:latin typeface="Arial Narrow"/>
               </a:rPr>
-              <a:t>Poster Content</a:t>
-            </a:r>
-            <a:endParaRPr b="0" lang="en-US" sz="4400" spc="-1" strike="noStrike">
-              <a:latin typeface="Arial"/>
-            </a:endParaRPr>
-          </a:p>
-          <a:p>
-            <a:pPr marL="895320" indent="-894600">
+              <a:t>Objectives</a:t>
+            </a:r>
+            <a:endParaRPr b="0" lang="en-US" sz="5400" spc="-1" strike="noStrike">
+              <a:latin typeface="Arial"/>
+            </a:endParaRPr>
+          </a:p>
+          <a:p>
+            <a:pPr marL="895320" indent="-894600" algn="just">
               <a:lnSpc>
                 <a:spcPct val="100000"/>
               </a:lnSpc>
@@ -2196,14 +2092,14 @@
                 </a:solidFill>
                 <a:latin typeface="Arial Narrow"/>
               </a:rPr>
-              <a:t>The text should be limited to brief statements.</a:t>
-            </a:r>
-            <a:endParaRPr b="0" lang="en-US" sz="4400" spc="-1" strike="noStrike">
-              <a:latin typeface="Arial"/>
-            </a:endParaRPr>
-          </a:p>
-          <a:p>
-            <a:pPr marL="895320" indent="-894600">
+              <a:t>Assist researchers in carrying out their analyses</a:t>
+            </a:r>
+            <a:endParaRPr b="0" lang="en-US" sz="4400" spc="-1" strike="noStrike">
+              <a:latin typeface="Arial"/>
+            </a:endParaRPr>
+          </a:p>
+          <a:p>
+            <a:pPr marL="895320" indent="-894600" algn="just">
               <a:lnSpc>
                 <a:spcPct val="100000"/>
               </a:lnSpc>
@@ -2223,14 +2119,14 @@
                 </a:solidFill>
                 <a:latin typeface="Arial Narrow"/>
               </a:rPr>
-              <a:t>Font: Arial Narrow</a:t>
-            </a:r>
-            <a:endParaRPr b="0" lang="en-US" sz="4400" spc="-1" strike="noStrike">
-              <a:latin typeface="Arial"/>
-            </a:endParaRPr>
-          </a:p>
-          <a:p>
-            <a:pPr marL="895320" indent="-894600">
+              <a:t>Integrate the Galaxy framework with an interactive recommendation system leveraging on community consolidated best practices as well as EDAM-annotated tools</a:t>
+            </a:r>
+            <a:endParaRPr b="0" lang="en-US" sz="4400" spc="-1" strike="noStrike">
+              <a:latin typeface="Arial"/>
+            </a:endParaRPr>
+          </a:p>
+          <a:p>
+            <a:pPr marL="895320" indent="-894600" algn="just">
               <a:lnSpc>
                 <a:spcPct val="100000"/>
               </a:lnSpc>
@@ -2250,14 +2146,14 @@
                 </a:solidFill>
                 <a:latin typeface="Arial Narrow"/>
               </a:rPr>
-              <a:t>Font Size: min. 44 pt.</a:t>
-            </a:r>
-            <a:endParaRPr b="0" lang="en-US" sz="4400" spc="-1" strike="noStrike">
-              <a:latin typeface="Arial"/>
-            </a:endParaRPr>
-          </a:p>
-          <a:p>
-            <a:pPr marL="895320" indent="-894600">
+              <a:t>Promote the adoption of well established pipelines</a:t>
+            </a:r>
+            <a:endParaRPr b="0" lang="en-US" sz="4400" spc="-1" strike="noStrike">
+              <a:latin typeface="Arial"/>
+            </a:endParaRPr>
+          </a:p>
+          <a:p>
+            <a:pPr marL="895320" indent="-894600" algn="just">
               <a:lnSpc>
                 <a:spcPct val="100000"/>
               </a:lnSpc>
@@ -2277,14 +2173,14 @@
                 </a:solidFill>
                 <a:latin typeface="Arial Narrow"/>
               </a:rPr>
-              <a:t>max. 4.000 characters (including spaces) </a:t>
-            </a:r>
-            <a:endParaRPr b="0" lang="en-US" sz="4400" spc="-1" strike="noStrike">
-              <a:latin typeface="Arial"/>
-            </a:endParaRPr>
-          </a:p>
-          <a:p>
-            <a:pPr marL="895320" indent="-894600">
+              <a:t>Allow room for experimental tools</a:t>
+            </a:r>
+            <a:endParaRPr b="0" lang="en-US" sz="4400" spc="-1" strike="noStrike">
+              <a:latin typeface="Arial"/>
+            </a:endParaRPr>
+          </a:p>
+          <a:p>
+            <a:pPr marL="895320" indent="-894600" algn="just">
               <a:lnSpc>
                 <a:spcPct val="100000"/>
               </a:lnSpc>
@@ -2304,181 +2200,57 @@
                 </a:solidFill>
                 <a:latin typeface="Arial Narrow"/>
               </a:rPr>
-              <a:t>Structure: Introduction, Objective, Material &amp; Methods, Results, Discussion, Conclusion</a:t>
-            </a:r>
-            <a:endParaRPr b="0" lang="en-US" sz="4400" spc="-1" strike="noStrike">
-              <a:latin typeface="Arial"/>
-            </a:endParaRPr>
-          </a:p>
-          <a:p>
-            <a:pPr marL="895320" indent="-894600">
-              <a:lnSpc>
-                <a:spcPct val="100000"/>
-              </a:lnSpc>
-              <a:spcBef>
-                <a:spcPts val="879"/>
-              </a:spcBef>
-              <a:buClr>
-                <a:srgbClr val="000000"/>
-              </a:buClr>
-              <a:buFont typeface="Arial"/>
-              <a:buChar char="•"/>
-            </a:pPr>
-            <a:r>
-              <a:rPr b="0" lang="en-US" sz="4400" spc="-1" strike="noStrike">
+              <a:t>Consolidate protocols and reproducibility</a:t>
+            </a:r>
+            <a:endParaRPr b="0" lang="en-US" sz="4400" spc="-1" strike="noStrike">
+              <a:latin typeface="Arial"/>
+            </a:endParaRPr>
+          </a:p>
+          <a:p>
+            <a:pPr algn="just">
+              <a:lnSpc>
+                <a:spcPct val="100000"/>
+              </a:lnSpc>
+              <a:spcBef>
+                <a:spcPts val="879"/>
+              </a:spcBef>
+            </a:pPr>
+            <a:endParaRPr b="0" lang="en-US" sz="4400" spc="-1" strike="noStrike">
+              <a:latin typeface="Arial"/>
+            </a:endParaRPr>
+          </a:p>
+          <a:p>
+            <a:pPr algn="just">
+              <a:lnSpc>
+                <a:spcPct val="100000"/>
+              </a:lnSpc>
+              <a:spcBef>
+                <a:spcPts val="879"/>
+              </a:spcBef>
+            </a:pPr>
+            <a:r>
+              <a:rPr b="1" lang="en-US" sz="5400" spc="-1" strike="noStrike">
                 <a:solidFill>
                   <a:srgbClr val="000000"/>
                 </a:solidFill>
                 <a:latin typeface="Arial Narrow"/>
               </a:rPr>
-              <a:t>The use of figures as well as tables is very welcome. Please make sure that the font size of their description is sufficient.</a:t>
-            </a:r>
-            <a:endParaRPr b="0" lang="en-US" sz="4400" spc="-1" strike="noStrike">
-              <a:latin typeface="Arial"/>
-            </a:endParaRPr>
-          </a:p>
-          <a:p>
-            <a:pPr marL="1566720" indent="-1566000">
-              <a:lnSpc>
-                <a:spcPct val="100000"/>
-              </a:lnSpc>
-              <a:spcBef>
-                <a:spcPts val="879"/>
-              </a:spcBef>
-            </a:pPr>
-            <a:r>
-              <a:rPr b="1" lang="en-US" sz="4400" spc="-1" strike="noStrike">
-                <a:solidFill>
-                  <a:srgbClr val="000000"/>
-                </a:solidFill>
-                <a:latin typeface="Arial Narrow"/>
-              </a:rPr>
-              <a:t> </a:t>
-            </a:r>
-            <a:endParaRPr b="0" lang="en-US" sz="4400" spc="-1" strike="noStrike">
-              <a:latin typeface="Arial"/>
-            </a:endParaRPr>
-          </a:p>
-          <a:p>
-            <a:pPr marL="1566720" indent="-1566000">
-              <a:lnSpc>
-                <a:spcPct val="100000"/>
-              </a:lnSpc>
-              <a:spcBef>
-                <a:spcPts val="879"/>
-              </a:spcBef>
-            </a:pPr>
-            <a:r>
-              <a:rPr b="1" lang="en-US" sz="4400" spc="-1" strike="noStrike">
-                <a:solidFill>
-                  <a:srgbClr val="000000"/>
-                </a:solidFill>
-                <a:latin typeface="Arial Narrow"/>
-              </a:rPr>
-              <a:t>Tagging</a:t>
-            </a:r>
-            <a:endParaRPr b="0" lang="en-US" sz="4400" spc="-1" strike="noStrike">
-              <a:latin typeface="Arial"/>
-            </a:endParaRPr>
-          </a:p>
-          <a:p>
-            <a:pPr marL="895320" indent="-894600">
-              <a:lnSpc>
-                <a:spcPct val="100000"/>
-              </a:lnSpc>
-              <a:spcBef>
-                <a:spcPts val="879"/>
-              </a:spcBef>
-              <a:buClr>
-                <a:srgbClr val="000000"/>
-              </a:buClr>
-              <a:buFont typeface="Arial"/>
-              <a:buChar char="•"/>
-            </a:pPr>
-            <a:r>
-              <a:rPr b="0" lang="en-US" sz="4400" spc="-1" strike="noStrike">
-                <a:solidFill>
-                  <a:srgbClr val="000000"/>
-                </a:solidFill>
-                <a:latin typeface="Arial Narrow"/>
-              </a:rPr>
-              <a:t>Please list the professional and popular science keywords from your application for a hashtag line in the footer of your poster. Write an double cross in front of each keyword without a space character (see the examples below).</a:t>
-            </a:r>
-            <a:endParaRPr b="0" lang="en-US" sz="4400" spc="-1" strike="noStrike">
-              <a:latin typeface="Arial"/>
-            </a:endParaRPr>
-          </a:p>
-          <a:p>
-            <a:pPr marL="895320" indent="-894600">
-              <a:lnSpc>
-                <a:spcPct val="100000"/>
-              </a:lnSpc>
-              <a:spcBef>
-                <a:spcPts val="879"/>
-              </a:spcBef>
-              <a:buClr>
-                <a:srgbClr val="000000"/>
-              </a:buClr>
-              <a:buFont typeface="Arial"/>
-              <a:buChar char="•"/>
-            </a:pPr>
-            <a:r>
-              <a:rPr b="0" lang="en-US" sz="4400" spc="-1" strike="noStrike">
-                <a:solidFill>
-                  <a:srgbClr val="000000"/>
-                </a:solidFill>
-                <a:latin typeface="Arial Narrow"/>
-              </a:rPr>
-              <a:t>Font: Verdana</a:t>
-            </a:r>
-            <a:endParaRPr b="0" lang="en-US" sz="4400" spc="-1" strike="noStrike">
-              <a:latin typeface="Arial"/>
-            </a:endParaRPr>
-          </a:p>
-          <a:p>
-            <a:pPr marL="895320" indent="-894600">
-              <a:lnSpc>
-                <a:spcPct val="100000"/>
-              </a:lnSpc>
-              <a:spcBef>
-                <a:spcPts val="879"/>
-              </a:spcBef>
-              <a:buClr>
-                <a:srgbClr val="000000"/>
-              </a:buClr>
-              <a:buFont typeface="Arial"/>
-              <a:buChar char="•"/>
-            </a:pPr>
-            <a:r>
-              <a:rPr b="0" lang="en-US" sz="4400" spc="-1" strike="noStrike">
-                <a:solidFill>
-                  <a:srgbClr val="000000"/>
-                </a:solidFill>
-                <a:latin typeface="Arial Narrow"/>
-              </a:rPr>
-              <a:t>Font Size: 44 pt.</a:t>
-            </a:r>
-            <a:endParaRPr b="0" lang="en-US" sz="4400" spc="-1" strike="noStrike">
-              <a:latin typeface="Arial"/>
-            </a:endParaRPr>
-          </a:p>
-          <a:p>
-            <a:pPr>
-              <a:lnSpc>
-                <a:spcPct val="100000"/>
-              </a:lnSpc>
-            </a:pPr>
-            <a:endParaRPr b="0" lang="en-US" sz="4400" spc="-1" strike="noStrike">
-              <a:latin typeface="Arial"/>
-            </a:endParaRPr>
-          </a:p>
-          <a:p>
-            <a:pPr>
-              <a:lnSpc>
-                <a:spcPct val="100000"/>
-              </a:lnSpc>
-            </a:pPr>
-            <a:endParaRPr b="0" lang="en-US" sz="4400" spc="-1" strike="noStrike">
+              <a:t>Materials and Methods</a:t>
+            </a:r>
+            <a:endParaRPr b="0" lang="en-US" sz="5400" spc="-1" strike="noStrike">
+              <a:latin typeface="Arial"/>
+            </a:endParaRPr>
+          </a:p>
+          <a:p>
+            <a:pPr algn="just">
+              <a:lnSpc>
+                <a:spcPct val="100000"/>
+              </a:lnSpc>
+              <a:spcBef>
+                <a:spcPts val="879"/>
+              </a:spcBef>
+            </a:pPr>
+            <a:endParaRPr b="0" lang="en-US" sz="5400" spc="-1" strike="noStrike">
               <a:latin typeface="Arial"/>
             </a:endParaRPr>
           </a:p>
@@ -2540,7 +2312,7 @@
         </p:nvSpPr>
         <p:spPr>
           <a:xfrm>
-            <a:off x="3006720" y="8118720"/>
+            <a:off x="2934720" y="8298720"/>
             <a:ext cx="24119280" cy="1583280"/>
           </a:xfrm>
           <a:prstGeom prst="rect">
@@ -2722,7 +2494,7 @@
         </p:blipFill>
         <p:spPr>
           <a:xfrm>
-            <a:off x="18937800" y="10159200"/>
+            <a:off x="17726040" y="25511760"/>
             <a:ext cx="8242920" cy="5879880"/>
           </a:xfrm>
           <a:prstGeom prst="rect">
@@ -2741,7 +2513,7 @@
         </p:nvSpPr>
         <p:spPr>
           <a:xfrm>
-            <a:off x="18883080" y="16219800"/>
+            <a:off x="17647920" y="31391640"/>
             <a:ext cx="8242920" cy="1570320"/>
           </a:xfrm>
           <a:prstGeom prst="rect">
@@ -2831,6 +2603,1345 @@
           </a:ln>
         </p:spPr>
       </p:pic>
+      <p:sp>
+        <p:nvSpPr>
+          <p:cNvPr id="51" name="CustomShape 9"/>
+          <p:cNvSpPr/>
+          <p:nvPr/>
+        </p:nvSpPr>
+        <p:spPr>
+          <a:xfrm>
+            <a:off x="15475680" y="9969840"/>
+            <a:ext cx="11795760" cy="26030160"/>
+          </a:xfrm>
+          <a:prstGeom prst="rect">
+            <a:avLst/>
+          </a:prstGeom>
+          <a:noFill/>
+          <a:ln w="9360">
+            <a:noFill/>
+          </a:ln>
+        </p:spPr>
+        <p:style>
+          <a:lnRef idx="0"/>
+          <a:fillRef idx="0"/>
+          <a:effectRef idx="0"/>
+          <a:fontRef idx="minor"/>
+        </p:style>
+        <p:txBody>
+          <a:bodyPr lIns="0" rIns="0" tIns="208800" bIns="208800"/>
+          <a:p>
+            <a:pPr algn="just">
+              <a:lnSpc>
+                <a:spcPct val="100000"/>
+              </a:lnSpc>
+              <a:spcBef>
+                <a:spcPts val="879"/>
+              </a:spcBef>
+            </a:pPr>
+            <a:r>
+              <a:rPr b="1" lang="en-US" sz="5400" spc="-1" strike="noStrike">
+                <a:solidFill>
+                  <a:srgbClr val="000000"/>
+                </a:solidFill>
+                <a:latin typeface="Arial Narrow"/>
+              </a:rPr>
+              <a:t>Introduction</a:t>
+            </a:r>
+            <a:endParaRPr b="0" lang="en-US" sz="5400" spc="-1" strike="noStrike">
+              <a:latin typeface="Arial"/>
+            </a:endParaRPr>
+          </a:p>
+          <a:p>
+            <a:pPr algn="just">
+              <a:lnSpc>
+                <a:spcPct val="100000"/>
+              </a:lnSpc>
+              <a:spcBef>
+                <a:spcPts val="879"/>
+              </a:spcBef>
+            </a:pPr>
+            <a:r>
+              <a:rPr b="0" lang="en-US" sz="4400" spc="-1" strike="noStrike">
+                <a:solidFill>
+                  <a:srgbClr val="000000"/>
+                </a:solidFill>
+                <a:latin typeface="Arial Narrow"/>
+              </a:rPr>
+              <a:t>The Galaxy community is promoting RNA-Seq protocols and best practices through the reuse of existing tools, and the consolidation of a Training Network to provide guidance to researchers through example datasets, tutorials, and interactive tours. However, the more tools and techniques are showcased, the more complex the options for tool chaining and parametrization become.</a:t>
+            </a:r>
+            <a:endParaRPr b="0" lang="en-US" sz="4400" spc="-1" strike="noStrike">
+              <a:latin typeface="Arial"/>
+            </a:endParaRPr>
+          </a:p>
+          <a:p>
+            <a:pPr algn="just">
+              <a:lnSpc>
+                <a:spcPct val="100000"/>
+              </a:lnSpc>
+              <a:spcBef>
+                <a:spcPts val="879"/>
+              </a:spcBef>
+            </a:pPr>
+            <a:endParaRPr b="0" lang="en-US" sz="4400" spc="-1" strike="noStrike">
+              <a:latin typeface="Arial"/>
+            </a:endParaRPr>
+          </a:p>
+          <a:p>
+            <a:pPr algn="just">
+              <a:lnSpc>
+                <a:spcPct val="100000"/>
+              </a:lnSpc>
+              <a:spcBef>
+                <a:spcPts val="879"/>
+              </a:spcBef>
+            </a:pPr>
+            <a:r>
+              <a:rPr b="1" lang="en-US" sz="5400" spc="-1" strike="noStrike">
+                <a:solidFill>
+                  <a:srgbClr val="000000"/>
+                </a:solidFill>
+                <a:latin typeface="Arial Narrow"/>
+              </a:rPr>
+              <a:t>Objectives</a:t>
+            </a:r>
+            <a:endParaRPr b="0" lang="en-US" sz="5400" spc="-1" strike="noStrike">
+              <a:latin typeface="Arial"/>
+            </a:endParaRPr>
+          </a:p>
+          <a:p>
+            <a:pPr marL="895320" indent="-894600" algn="just">
+              <a:lnSpc>
+                <a:spcPct val="100000"/>
+              </a:lnSpc>
+              <a:spcBef>
+                <a:spcPts val="879"/>
+              </a:spcBef>
+              <a:buClr>
+                <a:srgbClr val="000000"/>
+              </a:buClr>
+              <a:buFont typeface="Arial"/>
+              <a:buChar char="•"/>
+            </a:pPr>
+            <a:r>
+              <a:rPr b="0" lang="en-US" sz="4400" spc="-1" strike="noStrike">
+                <a:solidFill>
+                  <a:srgbClr val="000000"/>
+                </a:solidFill>
+                <a:latin typeface="Arial Narrow"/>
+              </a:rPr>
+              <a:t>Assist researchers in carrying out their analyses</a:t>
+            </a:r>
+            <a:endParaRPr b="0" lang="en-US" sz="4400" spc="-1" strike="noStrike">
+              <a:latin typeface="Arial"/>
+            </a:endParaRPr>
+          </a:p>
+          <a:p>
+            <a:pPr marL="895320" indent="-894600" algn="just">
+              <a:lnSpc>
+                <a:spcPct val="100000"/>
+              </a:lnSpc>
+              <a:spcBef>
+                <a:spcPts val="879"/>
+              </a:spcBef>
+              <a:buClr>
+                <a:srgbClr val="000000"/>
+              </a:buClr>
+              <a:buFont typeface="Arial"/>
+              <a:buChar char="•"/>
+            </a:pPr>
+            <a:r>
+              <a:rPr b="0" lang="en-US" sz="4400" spc="-1" strike="noStrike">
+                <a:solidFill>
+                  <a:srgbClr val="000000"/>
+                </a:solidFill>
+                <a:latin typeface="Arial Narrow"/>
+              </a:rPr>
+              <a:t>Integrate the Galaxy framework with an interactive recommendation system leveraging on community consolidated best practices as well as EDAM-annotated tools</a:t>
+            </a:r>
+            <a:endParaRPr b="0" lang="en-US" sz="4400" spc="-1" strike="noStrike">
+              <a:latin typeface="Arial"/>
+            </a:endParaRPr>
+          </a:p>
+          <a:p>
+            <a:pPr marL="895320" indent="-894600" algn="just">
+              <a:lnSpc>
+                <a:spcPct val="100000"/>
+              </a:lnSpc>
+              <a:spcBef>
+                <a:spcPts val="879"/>
+              </a:spcBef>
+              <a:buClr>
+                <a:srgbClr val="000000"/>
+              </a:buClr>
+              <a:buFont typeface="Arial"/>
+              <a:buChar char="•"/>
+            </a:pPr>
+            <a:r>
+              <a:rPr b="0" lang="en-US" sz="4400" spc="-1" strike="noStrike">
+                <a:solidFill>
+                  <a:srgbClr val="000000"/>
+                </a:solidFill>
+                <a:latin typeface="Arial Narrow"/>
+              </a:rPr>
+              <a:t>Promote the adoption of well established pipelines</a:t>
+            </a:r>
+            <a:endParaRPr b="0" lang="en-US" sz="4400" spc="-1" strike="noStrike">
+              <a:latin typeface="Arial"/>
+            </a:endParaRPr>
+          </a:p>
+          <a:p>
+            <a:pPr marL="895320" indent="-894600" algn="just">
+              <a:lnSpc>
+                <a:spcPct val="100000"/>
+              </a:lnSpc>
+              <a:spcBef>
+                <a:spcPts val="879"/>
+              </a:spcBef>
+              <a:buClr>
+                <a:srgbClr val="000000"/>
+              </a:buClr>
+              <a:buFont typeface="Arial"/>
+              <a:buChar char="•"/>
+            </a:pPr>
+            <a:r>
+              <a:rPr b="0" lang="en-US" sz="4400" spc="-1" strike="noStrike">
+                <a:solidFill>
+                  <a:srgbClr val="000000"/>
+                </a:solidFill>
+                <a:latin typeface="Arial Narrow"/>
+              </a:rPr>
+              <a:t>Allow room for experimental tools</a:t>
+            </a:r>
+            <a:endParaRPr b="0" lang="en-US" sz="4400" spc="-1" strike="noStrike">
+              <a:latin typeface="Arial"/>
+            </a:endParaRPr>
+          </a:p>
+          <a:p>
+            <a:pPr marL="895320" indent="-894600" algn="just">
+              <a:lnSpc>
+                <a:spcPct val="100000"/>
+              </a:lnSpc>
+              <a:spcBef>
+                <a:spcPts val="879"/>
+              </a:spcBef>
+              <a:buClr>
+                <a:srgbClr val="000000"/>
+              </a:buClr>
+              <a:buFont typeface="Arial"/>
+              <a:buChar char="•"/>
+            </a:pPr>
+            <a:r>
+              <a:rPr b="0" lang="en-US" sz="4400" spc="-1" strike="noStrike">
+                <a:solidFill>
+                  <a:srgbClr val="000000"/>
+                </a:solidFill>
+                <a:latin typeface="Arial Narrow"/>
+              </a:rPr>
+              <a:t>Consolidate protocols and reproducibility</a:t>
+            </a:r>
+            <a:endParaRPr b="0" lang="en-US" sz="4400" spc="-1" strike="noStrike">
+              <a:latin typeface="Arial"/>
+            </a:endParaRPr>
+          </a:p>
+          <a:p>
+            <a:pPr algn="just">
+              <a:lnSpc>
+                <a:spcPct val="100000"/>
+              </a:lnSpc>
+              <a:spcBef>
+                <a:spcPts val="879"/>
+              </a:spcBef>
+            </a:pPr>
+            <a:endParaRPr b="0" lang="en-US" sz="4400" spc="-1" strike="noStrike">
+              <a:latin typeface="Arial"/>
+            </a:endParaRPr>
+          </a:p>
+          <a:p>
+            <a:pPr algn="just">
+              <a:lnSpc>
+                <a:spcPct val="100000"/>
+              </a:lnSpc>
+              <a:spcBef>
+                <a:spcPts val="879"/>
+              </a:spcBef>
+            </a:pPr>
+            <a:endParaRPr b="0" lang="en-US" sz="4400" spc="-1" strike="noStrike">
+              <a:latin typeface="Arial"/>
+            </a:endParaRPr>
+          </a:p>
+          <a:p>
+            <a:pPr algn="just">
+              <a:lnSpc>
+                <a:spcPct val="100000"/>
+              </a:lnSpc>
+              <a:spcBef>
+                <a:spcPts val="879"/>
+              </a:spcBef>
+            </a:pPr>
+            <a:endParaRPr b="0" lang="en-US" sz="4400" spc="-1" strike="noStrike">
+              <a:latin typeface="Arial"/>
+            </a:endParaRPr>
+          </a:p>
+          <a:p>
+            <a:pPr algn="just">
+              <a:lnSpc>
+                <a:spcPct val="100000"/>
+              </a:lnSpc>
+              <a:spcBef>
+                <a:spcPts val="879"/>
+              </a:spcBef>
+            </a:pPr>
+            <a:endParaRPr b="0" lang="en-US" sz="4400" spc="-1" strike="noStrike">
+              <a:latin typeface="Arial"/>
+            </a:endParaRPr>
+          </a:p>
+          <a:p>
+            <a:pPr algn="just">
+              <a:lnSpc>
+                <a:spcPct val="100000"/>
+              </a:lnSpc>
+              <a:spcBef>
+                <a:spcPts val="879"/>
+              </a:spcBef>
+            </a:pPr>
+            <a:endParaRPr b="0" lang="en-US" sz="4400" spc="-1" strike="noStrike">
+              <a:latin typeface="Arial"/>
+            </a:endParaRPr>
+          </a:p>
+          <a:p>
+            <a:pPr algn="just">
+              <a:lnSpc>
+                <a:spcPct val="100000"/>
+              </a:lnSpc>
+              <a:spcBef>
+                <a:spcPts val="879"/>
+              </a:spcBef>
+            </a:pPr>
+            <a:endParaRPr b="0" lang="en-US" sz="4400" spc="-1" strike="noStrike">
+              <a:latin typeface="Arial"/>
+            </a:endParaRPr>
+          </a:p>
+          <a:p>
+            <a:pPr algn="just">
+              <a:lnSpc>
+                <a:spcPct val="100000"/>
+              </a:lnSpc>
+              <a:spcBef>
+                <a:spcPts val="879"/>
+              </a:spcBef>
+            </a:pPr>
+            <a:endParaRPr b="0" lang="en-US" sz="4400" spc="-1" strike="noStrike">
+              <a:latin typeface="Arial"/>
+            </a:endParaRPr>
+          </a:p>
+          <a:p>
+            <a:pPr algn="just">
+              <a:lnSpc>
+                <a:spcPct val="100000"/>
+              </a:lnSpc>
+              <a:spcBef>
+                <a:spcPts val="879"/>
+              </a:spcBef>
+            </a:pPr>
+            <a:endParaRPr b="0" lang="en-US" sz="4400" spc="-1" strike="noStrike">
+              <a:latin typeface="Arial"/>
+            </a:endParaRPr>
+          </a:p>
+          <a:p>
+            <a:pPr algn="just">
+              <a:lnSpc>
+                <a:spcPct val="100000"/>
+              </a:lnSpc>
+              <a:spcBef>
+                <a:spcPts val="879"/>
+              </a:spcBef>
+            </a:pPr>
+            <a:endParaRPr b="0" lang="en-US" sz="4400" spc="-1" strike="noStrike">
+              <a:latin typeface="Arial"/>
+            </a:endParaRPr>
+          </a:p>
+          <a:p>
+            <a:pPr algn="just">
+              <a:lnSpc>
+                <a:spcPct val="100000"/>
+              </a:lnSpc>
+              <a:spcBef>
+                <a:spcPts val="879"/>
+              </a:spcBef>
+            </a:pPr>
+            <a:r>
+              <a:rPr b="0" lang="en-US" sz="4400" spc="-1" strike="noStrike">
+                <a:solidFill>
+                  <a:srgbClr val="000000"/>
+                </a:solidFill>
+                <a:latin typeface="Arial Narrow"/>
+              </a:rPr>
+              <a:t> </a:t>
+            </a:r>
+            <a:endParaRPr b="0" lang="en-US" sz="4400" spc="-1" strike="noStrike">
+              <a:latin typeface="Arial"/>
+            </a:endParaRPr>
+          </a:p>
+          <a:p>
+            <a:pPr algn="just">
+              <a:lnSpc>
+                <a:spcPct val="100000"/>
+              </a:lnSpc>
+              <a:spcBef>
+                <a:spcPts val="879"/>
+              </a:spcBef>
+            </a:pPr>
+            <a:endParaRPr b="0" lang="en-US" sz="4400" spc="-1" strike="noStrike">
+              <a:latin typeface="Arial"/>
+            </a:endParaRPr>
+          </a:p>
+          <a:p>
+            <a:pPr algn="just">
+              <a:lnSpc>
+                <a:spcPct val="100000"/>
+              </a:lnSpc>
+              <a:spcBef>
+                <a:spcPts val="879"/>
+              </a:spcBef>
+            </a:pPr>
+            <a:endParaRPr b="0" lang="en-US" sz="4400" spc="-1" strike="noStrike">
+              <a:latin typeface="Arial"/>
+            </a:endParaRPr>
+          </a:p>
+          <a:p>
+            <a:pPr marL="1566720" indent="-1566000">
+              <a:lnSpc>
+                <a:spcPct val="100000"/>
+              </a:lnSpc>
+              <a:spcBef>
+                <a:spcPts val="879"/>
+              </a:spcBef>
+            </a:pPr>
+            <a:r>
+              <a:rPr b="1" lang="en-US" sz="4400" spc="-1" strike="noStrike">
+                <a:solidFill>
+                  <a:srgbClr val="000000"/>
+                </a:solidFill>
+                <a:latin typeface="Arial Narrow"/>
+              </a:rPr>
+              <a:t>Poster Content</a:t>
+            </a:r>
+            <a:endParaRPr b="0" lang="en-US" sz="4400" spc="-1" strike="noStrike">
+              <a:latin typeface="Arial"/>
+            </a:endParaRPr>
+          </a:p>
+          <a:p>
+            <a:pPr marL="895320" indent="-894600">
+              <a:lnSpc>
+                <a:spcPct val="100000"/>
+              </a:lnSpc>
+              <a:spcBef>
+                <a:spcPts val="879"/>
+              </a:spcBef>
+              <a:buClr>
+                <a:srgbClr val="000000"/>
+              </a:buClr>
+              <a:buFont typeface="Arial"/>
+              <a:buChar char="•"/>
+            </a:pPr>
+            <a:r>
+              <a:rPr b="0" lang="en-US" sz="4400" spc="-1" strike="noStrike">
+                <a:solidFill>
+                  <a:srgbClr val="000000"/>
+                </a:solidFill>
+                <a:latin typeface="Arial Narrow"/>
+              </a:rPr>
+              <a:t>The text should be limited to brief statements.</a:t>
+            </a:r>
+            <a:endParaRPr b="0" lang="en-US" sz="4400" spc="-1" strike="noStrike">
+              <a:latin typeface="Arial"/>
+            </a:endParaRPr>
+          </a:p>
+          <a:p>
+            <a:pPr marL="895320" indent="-894600">
+              <a:lnSpc>
+                <a:spcPct val="100000"/>
+              </a:lnSpc>
+              <a:spcBef>
+                <a:spcPts val="879"/>
+              </a:spcBef>
+              <a:buClr>
+                <a:srgbClr val="000000"/>
+              </a:buClr>
+              <a:buFont typeface="Arial"/>
+              <a:buChar char="•"/>
+            </a:pPr>
+            <a:r>
+              <a:rPr b="0" lang="en-US" sz="4400" spc="-1" strike="noStrike">
+                <a:solidFill>
+                  <a:srgbClr val="000000"/>
+                </a:solidFill>
+                <a:latin typeface="Arial Narrow"/>
+              </a:rPr>
+              <a:t>Font: Arial Narrow</a:t>
+            </a:r>
+            <a:endParaRPr b="0" lang="en-US" sz="4400" spc="-1" strike="noStrike">
+              <a:latin typeface="Arial"/>
+            </a:endParaRPr>
+          </a:p>
+          <a:p>
+            <a:pPr marL="895320" indent="-894600">
+              <a:lnSpc>
+                <a:spcPct val="100000"/>
+              </a:lnSpc>
+              <a:spcBef>
+                <a:spcPts val="879"/>
+              </a:spcBef>
+              <a:buClr>
+                <a:srgbClr val="000000"/>
+              </a:buClr>
+              <a:buFont typeface="Arial"/>
+              <a:buChar char="•"/>
+            </a:pPr>
+            <a:r>
+              <a:rPr b="0" lang="en-US" sz="4400" spc="-1" strike="noStrike">
+                <a:solidFill>
+                  <a:srgbClr val="000000"/>
+                </a:solidFill>
+                <a:latin typeface="Arial Narrow"/>
+              </a:rPr>
+              <a:t>Font Size: min. 44 pt.</a:t>
+            </a:r>
+            <a:endParaRPr b="0" lang="en-US" sz="4400" spc="-1" strike="noStrike">
+              <a:latin typeface="Arial"/>
+            </a:endParaRPr>
+          </a:p>
+          <a:p>
+            <a:pPr marL="895320" indent="-894600">
+              <a:lnSpc>
+                <a:spcPct val="100000"/>
+              </a:lnSpc>
+              <a:spcBef>
+                <a:spcPts val="879"/>
+              </a:spcBef>
+              <a:buClr>
+                <a:srgbClr val="000000"/>
+              </a:buClr>
+              <a:buFont typeface="Arial"/>
+              <a:buChar char="•"/>
+            </a:pPr>
+            <a:r>
+              <a:rPr b="0" lang="en-US" sz="4400" spc="-1" strike="noStrike">
+                <a:solidFill>
+                  <a:srgbClr val="000000"/>
+                </a:solidFill>
+                <a:latin typeface="Arial Narrow"/>
+              </a:rPr>
+              <a:t>max. 4.000 characters (including spaces) </a:t>
+            </a:r>
+            <a:endParaRPr b="0" lang="en-US" sz="4400" spc="-1" strike="noStrike">
+              <a:latin typeface="Arial"/>
+            </a:endParaRPr>
+          </a:p>
+          <a:p>
+            <a:pPr marL="895320" indent="-894600">
+              <a:lnSpc>
+                <a:spcPct val="100000"/>
+              </a:lnSpc>
+              <a:spcBef>
+                <a:spcPts val="879"/>
+              </a:spcBef>
+              <a:buClr>
+                <a:srgbClr val="000000"/>
+              </a:buClr>
+              <a:buFont typeface="Arial"/>
+              <a:buChar char="•"/>
+            </a:pPr>
+            <a:r>
+              <a:rPr b="0" lang="en-US" sz="4400" spc="-1" strike="noStrike">
+                <a:solidFill>
+                  <a:srgbClr val="000000"/>
+                </a:solidFill>
+                <a:latin typeface="Arial Narrow"/>
+              </a:rPr>
+              <a:t>Structure: Introduction, Objective, Material &amp; Methods, Results, Discussion, Conclusion</a:t>
+            </a:r>
+            <a:endParaRPr b="0" lang="en-US" sz="4400" spc="-1" strike="noStrike">
+              <a:latin typeface="Arial"/>
+            </a:endParaRPr>
+          </a:p>
+          <a:p>
+            <a:pPr marL="895320" indent="-894600">
+              <a:lnSpc>
+                <a:spcPct val="100000"/>
+              </a:lnSpc>
+              <a:spcBef>
+                <a:spcPts val="879"/>
+              </a:spcBef>
+              <a:buClr>
+                <a:srgbClr val="000000"/>
+              </a:buClr>
+              <a:buFont typeface="Arial"/>
+              <a:buChar char="•"/>
+            </a:pPr>
+            <a:r>
+              <a:rPr b="0" lang="en-US" sz="4400" spc="-1" strike="noStrike">
+                <a:solidFill>
+                  <a:srgbClr val="000000"/>
+                </a:solidFill>
+                <a:latin typeface="Arial Narrow"/>
+              </a:rPr>
+              <a:t>The use of figures as well as tables is very welcome. Please make sure that the font size of their description is sufficient.</a:t>
+            </a:r>
+            <a:endParaRPr b="0" lang="en-US" sz="4400" spc="-1" strike="noStrike">
+              <a:latin typeface="Arial"/>
+            </a:endParaRPr>
+          </a:p>
+          <a:p>
+            <a:pPr marL="1566720" indent="-1566000">
+              <a:lnSpc>
+                <a:spcPct val="100000"/>
+              </a:lnSpc>
+              <a:spcBef>
+                <a:spcPts val="879"/>
+              </a:spcBef>
+            </a:pPr>
+            <a:r>
+              <a:rPr b="1" lang="en-US" sz="4400" spc="-1" strike="noStrike">
+                <a:solidFill>
+                  <a:srgbClr val="000000"/>
+                </a:solidFill>
+                <a:latin typeface="Arial Narrow"/>
+              </a:rPr>
+              <a:t> </a:t>
+            </a:r>
+            <a:endParaRPr b="0" lang="en-US" sz="4400" spc="-1" strike="noStrike">
+              <a:latin typeface="Arial"/>
+            </a:endParaRPr>
+          </a:p>
+          <a:p>
+            <a:pPr marL="1566720" indent="-1566000">
+              <a:lnSpc>
+                <a:spcPct val="100000"/>
+              </a:lnSpc>
+              <a:spcBef>
+                <a:spcPts val="879"/>
+              </a:spcBef>
+            </a:pPr>
+            <a:r>
+              <a:rPr b="1" lang="en-US" sz="4400" spc="-1" strike="noStrike">
+                <a:solidFill>
+                  <a:srgbClr val="000000"/>
+                </a:solidFill>
+                <a:latin typeface="Arial Narrow"/>
+              </a:rPr>
+              <a:t>Tagging</a:t>
+            </a:r>
+            <a:endParaRPr b="0" lang="en-US" sz="4400" spc="-1" strike="noStrike">
+              <a:latin typeface="Arial"/>
+            </a:endParaRPr>
+          </a:p>
+          <a:p>
+            <a:pPr marL="895320" indent="-894600">
+              <a:lnSpc>
+                <a:spcPct val="100000"/>
+              </a:lnSpc>
+              <a:spcBef>
+                <a:spcPts val="879"/>
+              </a:spcBef>
+              <a:buClr>
+                <a:srgbClr val="000000"/>
+              </a:buClr>
+              <a:buFont typeface="Arial"/>
+              <a:buChar char="•"/>
+            </a:pPr>
+            <a:r>
+              <a:rPr b="0" lang="en-US" sz="4400" spc="-1" strike="noStrike">
+                <a:solidFill>
+                  <a:srgbClr val="000000"/>
+                </a:solidFill>
+                <a:latin typeface="Arial Narrow"/>
+              </a:rPr>
+              <a:t>Please list the professional and popular science keywords from your application for a hashtag line in the footer of your poster. Write an double cross in front of each keyword without a space character (see the examples below).</a:t>
+            </a:r>
+            <a:endParaRPr b="0" lang="en-US" sz="4400" spc="-1" strike="noStrike">
+              <a:latin typeface="Arial"/>
+            </a:endParaRPr>
+          </a:p>
+          <a:p>
+            <a:pPr marL="895320" indent="-894600">
+              <a:lnSpc>
+                <a:spcPct val="100000"/>
+              </a:lnSpc>
+              <a:spcBef>
+                <a:spcPts val="879"/>
+              </a:spcBef>
+              <a:buClr>
+                <a:srgbClr val="000000"/>
+              </a:buClr>
+              <a:buFont typeface="Arial"/>
+              <a:buChar char="•"/>
+            </a:pPr>
+            <a:r>
+              <a:rPr b="0" lang="en-US" sz="4400" spc="-1" strike="noStrike">
+                <a:solidFill>
+                  <a:srgbClr val="000000"/>
+                </a:solidFill>
+                <a:latin typeface="Arial Narrow"/>
+              </a:rPr>
+              <a:t>Font: Verdana</a:t>
+            </a:r>
+            <a:endParaRPr b="0" lang="en-US" sz="4400" spc="-1" strike="noStrike">
+              <a:latin typeface="Arial"/>
+            </a:endParaRPr>
+          </a:p>
+          <a:p>
+            <a:pPr marL="895320" indent="-894600">
+              <a:lnSpc>
+                <a:spcPct val="100000"/>
+              </a:lnSpc>
+              <a:spcBef>
+                <a:spcPts val="879"/>
+              </a:spcBef>
+              <a:buClr>
+                <a:srgbClr val="000000"/>
+              </a:buClr>
+              <a:buFont typeface="Arial"/>
+              <a:buChar char="•"/>
+            </a:pPr>
+            <a:r>
+              <a:rPr b="0" lang="en-US" sz="4400" spc="-1" strike="noStrike">
+                <a:solidFill>
+                  <a:srgbClr val="000000"/>
+                </a:solidFill>
+                <a:latin typeface="Arial Narrow"/>
+              </a:rPr>
+              <a:t>Font Size: 44 pt.</a:t>
+            </a:r>
+            <a:endParaRPr b="0" lang="en-US" sz="4400" spc="-1" strike="noStrike">
+              <a:latin typeface="Arial"/>
+            </a:endParaRPr>
+          </a:p>
+          <a:p>
+            <a:pPr>
+              <a:lnSpc>
+                <a:spcPct val="100000"/>
+              </a:lnSpc>
+            </a:pPr>
+            <a:endParaRPr b="0" lang="en-US" sz="4400" spc="-1" strike="noStrike">
+              <a:latin typeface="Arial"/>
+            </a:endParaRPr>
+          </a:p>
+          <a:p>
+            <a:pPr>
+              <a:lnSpc>
+                <a:spcPct val="100000"/>
+              </a:lnSpc>
+            </a:pPr>
+            <a:endParaRPr b="0" lang="en-US" sz="4400" spc="-1" strike="noStrike">
+              <a:latin typeface="Arial"/>
+            </a:endParaRPr>
+          </a:p>
+        </p:txBody>
+      </p:sp>
+      <p:sp>
+        <p:nvSpPr>
+          <p:cNvPr id="52" name="CustomShape 10"/>
+          <p:cNvSpPr/>
+          <p:nvPr/>
+        </p:nvSpPr>
+        <p:spPr>
+          <a:xfrm>
+            <a:off x="2743200" y="25603200"/>
+            <a:ext cx="7589520" cy="2834640"/>
+          </a:xfrm>
+          <a:prstGeom prst="rect">
+            <a:avLst/>
+          </a:prstGeom>
+          <a:solidFill>
+            <a:srgbClr val="ffffff"/>
+          </a:solidFill>
+          <a:ln>
+            <a:solidFill>
+              <a:srgbClr val="3465a4"/>
+            </a:solidFill>
+          </a:ln>
+        </p:spPr>
+        <p:style>
+          <a:lnRef idx="0"/>
+          <a:fillRef idx="0"/>
+          <a:effectRef idx="0"/>
+          <a:fontRef idx="minor"/>
+        </p:style>
+      </p:sp>
+      <p:sp>
+        <p:nvSpPr>
+          <p:cNvPr id="53" name="CustomShape 11"/>
+          <p:cNvSpPr/>
+          <p:nvPr/>
+        </p:nvSpPr>
+        <p:spPr>
+          <a:xfrm>
+            <a:off x="2743200" y="29671200"/>
+            <a:ext cx="7589520" cy="2834640"/>
+          </a:xfrm>
+          <a:prstGeom prst="rect">
+            <a:avLst/>
+          </a:prstGeom>
+          <a:solidFill>
+            <a:srgbClr val="ffffff"/>
+          </a:solidFill>
+          <a:ln>
+            <a:solidFill>
+              <a:srgbClr val="3465a4"/>
+            </a:solidFill>
+          </a:ln>
+        </p:spPr>
+        <p:style>
+          <a:lnRef idx="0"/>
+          <a:fillRef idx="0"/>
+          <a:effectRef idx="0"/>
+          <a:fontRef idx="minor"/>
+        </p:style>
+      </p:sp>
+      <p:sp>
+        <p:nvSpPr>
+          <p:cNvPr id="54" name="CustomShape 12"/>
+          <p:cNvSpPr/>
+          <p:nvPr/>
+        </p:nvSpPr>
+        <p:spPr>
+          <a:xfrm>
+            <a:off x="2743200" y="33847200"/>
+            <a:ext cx="7589520" cy="2834640"/>
+          </a:xfrm>
+          <a:prstGeom prst="rect">
+            <a:avLst/>
+          </a:prstGeom>
+          <a:solidFill>
+            <a:srgbClr val="ffffff"/>
+          </a:solidFill>
+          <a:ln>
+            <a:solidFill>
+              <a:srgbClr val="3465a4"/>
+            </a:solidFill>
+          </a:ln>
+        </p:spPr>
+        <p:style>
+          <a:lnRef idx="0"/>
+          <a:fillRef idx="0"/>
+          <a:effectRef idx="0"/>
+          <a:fontRef idx="minor"/>
+        </p:style>
+      </p:sp>
+      <p:sp>
+        <p:nvSpPr>
+          <p:cNvPr id="55" name="TextShape 13"/>
+          <p:cNvSpPr txBox="1"/>
+          <p:nvPr/>
+        </p:nvSpPr>
+        <p:spPr>
+          <a:xfrm>
+            <a:off x="2928960" y="26364960"/>
+            <a:ext cx="7292880" cy="1499040"/>
+          </a:xfrm>
+          <a:prstGeom prst="rect">
+            <a:avLst/>
+          </a:prstGeom>
+          <a:noFill/>
+          <a:ln>
+            <a:noFill/>
+          </a:ln>
+        </p:spPr>
+        <p:txBody>
+          <a:bodyPr lIns="90000" rIns="90000" tIns="45000" bIns="45000"/>
+          <a:p>
+            <a:pPr algn="ctr">
+              <a:lnSpc>
+                <a:spcPct val="115000"/>
+              </a:lnSpc>
+              <a:spcBef>
+                <a:spcPts val="850"/>
+              </a:spcBef>
+              <a:spcAft>
+                <a:spcPts val="850"/>
+              </a:spcAft>
+            </a:pPr>
+            <a:r>
+              <a:rPr b="0" lang="en-US" sz="4400" spc="-1" strike="noStrike">
+                <a:latin typeface="Arial Narrow"/>
+              </a:rPr>
+              <a:t>Tool chaining and parametrization  through Galaxy’s interactive tours</a:t>
+            </a:r>
+            <a:endParaRPr b="0" lang="en-US" sz="4400" spc="-1" strike="noStrike">
+              <a:latin typeface="Arial Narrow"/>
+              <a:ea typeface="Noto Sans CJK SC Regular"/>
+            </a:endParaRPr>
+          </a:p>
+        </p:txBody>
+      </p:sp>
+      <p:sp>
+        <p:nvSpPr>
+          <p:cNvPr id="56" name="TextShape 14"/>
+          <p:cNvSpPr txBox="1"/>
+          <p:nvPr/>
+        </p:nvSpPr>
+        <p:spPr>
+          <a:xfrm>
+            <a:off x="2931840" y="30540960"/>
+            <a:ext cx="7290000" cy="1662840"/>
+          </a:xfrm>
+          <a:prstGeom prst="rect">
+            <a:avLst/>
+          </a:prstGeom>
+          <a:noFill/>
+          <a:ln>
+            <a:noFill/>
+          </a:ln>
+        </p:spPr>
+        <p:txBody>
+          <a:bodyPr lIns="90000" rIns="90000" tIns="45000" bIns="45000"/>
+          <a:p>
+            <a:pPr algn="ctr"/>
+            <a:r>
+              <a:rPr b="0" lang="en-US" sz="4400" spc="-1" strike="noStrike">
+                <a:latin typeface="Arial Narrow"/>
+              </a:rPr>
+              <a:t>T</a:t>
+            </a:r>
+            <a:r>
+              <a:rPr b="0" lang="en-US" sz="4400" spc="-1" strike="noStrike">
+                <a:latin typeface="Arial Narrow"/>
+              </a:rPr>
+              <a:t>o</a:t>
+            </a:r>
+            <a:r>
+              <a:rPr b="0" lang="en-US" sz="4400" spc="-1" strike="noStrike">
+                <a:latin typeface="Arial Narrow"/>
+              </a:rPr>
+              <a:t>o</a:t>
+            </a:r>
+            <a:r>
+              <a:rPr b="0" lang="en-US" sz="4400" spc="-1" strike="noStrike">
+                <a:latin typeface="Arial Narrow"/>
+              </a:rPr>
+              <a:t>l </a:t>
+            </a:r>
+            <a:r>
+              <a:rPr b="0" lang="en-US" sz="4400" spc="-1" strike="noStrike">
+                <a:latin typeface="Arial Narrow"/>
+              </a:rPr>
+              <a:t>o</a:t>
+            </a:r>
+            <a:r>
+              <a:rPr b="0" lang="en-US" sz="4400" spc="-1" strike="noStrike">
+                <a:latin typeface="Arial Narrow"/>
+              </a:rPr>
+              <a:t>p</a:t>
+            </a:r>
+            <a:r>
+              <a:rPr b="0" lang="en-US" sz="4400" spc="-1" strike="noStrike">
+                <a:latin typeface="Arial Narrow"/>
+              </a:rPr>
+              <a:t>e</a:t>
+            </a:r>
+            <a:r>
+              <a:rPr b="0" lang="en-US" sz="4400" spc="-1" strike="noStrike">
+                <a:latin typeface="Arial Narrow"/>
+              </a:rPr>
+              <a:t>r</a:t>
+            </a:r>
+            <a:r>
+              <a:rPr b="0" lang="en-US" sz="4400" spc="-1" strike="noStrike">
+                <a:latin typeface="Arial Narrow"/>
+              </a:rPr>
+              <a:t>a</a:t>
+            </a:r>
+            <a:r>
+              <a:rPr b="0" lang="en-US" sz="4400" spc="-1" strike="noStrike">
+                <a:latin typeface="Arial Narrow"/>
+              </a:rPr>
+              <a:t>t</a:t>
+            </a:r>
+            <a:r>
+              <a:rPr b="0" lang="en-US" sz="4400" spc="-1" strike="noStrike">
+                <a:latin typeface="Arial Narrow"/>
+              </a:rPr>
+              <a:t>i</a:t>
+            </a:r>
+            <a:r>
+              <a:rPr b="0" lang="en-US" sz="4400" spc="-1" strike="noStrike">
+                <a:latin typeface="Arial Narrow"/>
+              </a:rPr>
+              <a:t>o</a:t>
+            </a:r>
+            <a:r>
+              <a:rPr b="0" lang="en-US" sz="4400" spc="-1" strike="noStrike">
+                <a:latin typeface="Arial Narrow"/>
+              </a:rPr>
+              <a:t>n</a:t>
+            </a:r>
+            <a:r>
+              <a:rPr b="0" lang="en-US" sz="4400" spc="-1" strike="noStrike">
+                <a:latin typeface="Arial Narrow"/>
+              </a:rPr>
+              <a:t>s</a:t>
+            </a:r>
+            <a:r>
+              <a:rPr b="0" lang="en-US" sz="4400" spc="-1" strike="noStrike">
+                <a:latin typeface="Arial Narrow"/>
+              </a:rPr>
+              <a:t> </a:t>
+            </a:r>
+            <a:r>
+              <a:rPr b="0" lang="en-US" sz="4400" spc="-1" strike="noStrike">
+                <a:latin typeface="Arial Narrow"/>
+              </a:rPr>
+              <a:t>a</a:t>
+            </a:r>
+            <a:r>
+              <a:rPr b="0" lang="en-US" sz="4400" spc="-1" strike="noStrike">
+                <a:latin typeface="Arial Narrow"/>
+              </a:rPr>
+              <a:t>n</a:t>
+            </a:r>
+            <a:r>
+              <a:rPr b="0" lang="en-US" sz="4400" spc="-1" strike="noStrike">
+                <a:latin typeface="Arial Narrow"/>
+              </a:rPr>
+              <a:t>d</a:t>
+            </a:r>
+            <a:r>
+              <a:rPr b="0" lang="en-US" sz="4400" spc="-1" strike="noStrike">
+                <a:latin typeface="Arial Narrow"/>
+              </a:rPr>
+              <a:t> </a:t>
+            </a:r>
+            <a:r>
+              <a:rPr b="0" lang="en-US" sz="4400" spc="-1" strike="noStrike">
+                <a:latin typeface="Arial Narrow"/>
+              </a:rPr>
+              <a:t>i</a:t>
+            </a:r>
+            <a:r>
+              <a:rPr b="0" lang="en-US" sz="4400" spc="-1" strike="noStrike">
+                <a:latin typeface="Arial Narrow"/>
+              </a:rPr>
+              <a:t>n</a:t>
+            </a:r>
+            <a:r>
+              <a:rPr b="0" lang="en-US" sz="4400" spc="-1" strike="noStrike">
+                <a:latin typeface="Arial Narrow"/>
+              </a:rPr>
+              <a:t>p</a:t>
+            </a:r>
+            <a:r>
+              <a:rPr b="0" lang="en-US" sz="4400" spc="-1" strike="noStrike">
+                <a:latin typeface="Arial Narrow"/>
+              </a:rPr>
+              <a:t>u</a:t>
+            </a:r>
+            <a:r>
+              <a:rPr b="0" lang="en-US" sz="4400" spc="-1" strike="noStrike">
+                <a:latin typeface="Arial Narrow"/>
+              </a:rPr>
+              <a:t>t </a:t>
+            </a:r>
+            <a:r>
+              <a:rPr b="0" lang="en-US" sz="4400" spc="-1" strike="noStrike">
+                <a:latin typeface="Arial Narrow"/>
+              </a:rPr>
+              <a:t>/ </a:t>
+            </a:r>
+            <a:r>
+              <a:rPr b="0" lang="en-US" sz="4400" spc="-1" strike="noStrike">
+                <a:latin typeface="Arial Narrow"/>
+              </a:rPr>
+              <a:t>o</a:t>
+            </a:r>
+            <a:r>
+              <a:rPr b="0" lang="en-US" sz="4400" spc="-1" strike="noStrike">
+                <a:latin typeface="Arial Narrow"/>
+              </a:rPr>
+              <a:t>u</a:t>
+            </a:r>
+            <a:r>
+              <a:rPr b="0" lang="en-US" sz="4400" spc="-1" strike="noStrike">
+                <a:latin typeface="Arial Narrow"/>
+              </a:rPr>
+              <a:t>t</a:t>
+            </a:r>
+            <a:r>
+              <a:rPr b="0" lang="en-US" sz="4400" spc="-1" strike="noStrike">
+                <a:latin typeface="Arial Narrow"/>
+              </a:rPr>
+              <a:t>p</a:t>
+            </a:r>
+            <a:r>
+              <a:rPr b="0" lang="en-US" sz="4400" spc="-1" strike="noStrike">
+                <a:latin typeface="Arial Narrow"/>
+              </a:rPr>
+              <a:t>u</a:t>
+            </a:r>
+            <a:r>
+              <a:rPr b="0" lang="en-US" sz="4400" spc="-1" strike="noStrike">
+                <a:latin typeface="Arial Narrow"/>
+              </a:rPr>
+              <a:t>t </a:t>
+            </a:r>
+            <a:r>
+              <a:rPr b="0" lang="en-US" sz="4400" spc="-1" strike="noStrike">
+                <a:latin typeface="Arial Narrow"/>
+              </a:rPr>
+              <a:t>f</a:t>
+            </a:r>
+            <a:r>
+              <a:rPr b="0" lang="en-US" sz="4400" spc="-1" strike="noStrike">
+                <a:latin typeface="Arial Narrow"/>
+              </a:rPr>
+              <a:t>o</a:t>
+            </a:r>
+            <a:r>
+              <a:rPr b="0" lang="en-US" sz="4400" spc="-1" strike="noStrike">
+                <a:latin typeface="Arial Narrow"/>
+              </a:rPr>
+              <a:t>r</a:t>
+            </a:r>
+            <a:r>
+              <a:rPr b="0" lang="en-US" sz="4400" spc="-1" strike="noStrike">
+                <a:latin typeface="Arial Narrow"/>
+              </a:rPr>
+              <a:t>m</a:t>
+            </a:r>
+            <a:r>
+              <a:rPr b="0" lang="en-US" sz="4400" spc="-1" strike="noStrike">
+                <a:latin typeface="Arial Narrow"/>
+              </a:rPr>
+              <a:t>a</a:t>
+            </a:r>
+            <a:r>
+              <a:rPr b="0" lang="en-US" sz="4400" spc="-1" strike="noStrike">
+                <a:latin typeface="Arial Narrow"/>
+              </a:rPr>
+              <a:t>t</a:t>
+            </a:r>
+            <a:r>
+              <a:rPr b="0" lang="en-US" sz="4400" spc="-1" strike="noStrike">
+                <a:latin typeface="Arial Narrow"/>
+              </a:rPr>
+              <a:t>s</a:t>
+            </a:r>
+            <a:r>
+              <a:rPr b="0" lang="en-US" sz="4400" spc="-1" strike="noStrike">
+                <a:latin typeface="Arial Narrow"/>
+              </a:rPr>
+              <a:t> </a:t>
+            </a:r>
+            <a:r>
+              <a:rPr b="0" lang="en-US" sz="4400" spc="-1" strike="noStrike">
+                <a:latin typeface="Arial Narrow"/>
+              </a:rPr>
+              <a:t>t</a:t>
+            </a:r>
+            <a:r>
+              <a:rPr b="0" lang="en-US" sz="4400" spc="-1" strike="noStrike">
+                <a:latin typeface="Arial Narrow"/>
+              </a:rPr>
+              <a:t>h</a:t>
+            </a:r>
+            <a:r>
+              <a:rPr b="0" lang="en-US" sz="4400" spc="-1" strike="noStrike">
+                <a:latin typeface="Arial Narrow"/>
+              </a:rPr>
+              <a:t>r</a:t>
+            </a:r>
+            <a:r>
+              <a:rPr b="0" lang="en-US" sz="4400" spc="-1" strike="noStrike">
+                <a:latin typeface="Arial Narrow"/>
+              </a:rPr>
+              <a:t>o</a:t>
+            </a:r>
+            <a:r>
+              <a:rPr b="0" lang="en-US" sz="4400" spc="-1" strike="noStrike">
+                <a:latin typeface="Arial Narrow"/>
+              </a:rPr>
+              <a:t>u</a:t>
+            </a:r>
+            <a:r>
+              <a:rPr b="0" lang="en-US" sz="4400" spc="-1" strike="noStrike">
+                <a:latin typeface="Arial Narrow"/>
+              </a:rPr>
+              <a:t>g</a:t>
+            </a:r>
+            <a:r>
+              <a:rPr b="0" lang="en-US" sz="4400" spc="-1" strike="noStrike">
+                <a:latin typeface="Arial Narrow"/>
+              </a:rPr>
+              <a:t>h</a:t>
+            </a:r>
+            <a:r>
+              <a:rPr b="0" lang="en-US" sz="4400" spc="-1" strike="noStrike">
+                <a:latin typeface="Arial Narrow"/>
+              </a:rPr>
+              <a:t> </a:t>
+            </a:r>
+            <a:r>
+              <a:rPr b="0" lang="en-US" sz="4400" spc="-1" strike="noStrike">
+                <a:latin typeface="Arial Narrow"/>
+              </a:rPr>
+              <a:t>E</a:t>
+            </a:r>
+            <a:r>
+              <a:rPr b="0" lang="en-US" sz="4400" spc="-1" strike="noStrike">
+                <a:latin typeface="Arial Narrow"/>
+              </a:rPr>
+              <a:t>l</a:t>
+            </a:r>
+            <a:r>
+              <a:rPr b="0" lang="en-US" sz="4400" spc="-1" strike="noStrike">
+                <a:latin typeface="Arial Narrow"/>
+              </a:rPr>
+              <a:t>i</a:t>
+            </a:r>
+            <a:r>
+              <a:rPr b="0" lang="en-US" sz="4400" spc="-1" strike="noStrike">
+                <a:latin typeface="Arial Narrow"/>
+              </a:rPr>
+              <a:t>x</a:t>
+            </a:r>
+            <a:r>
+              <a:rPr b="0" lang="en-US" sz="4400" spc="-1" strike="noStrike">
+                <a:latin typeface="Arial Narrow"/>
+              </a:rPr>
+              <a:t>i</a:t>
+            </a:r>
+            <a:r>
+              <a:rPr b="0" lang="en-US" sz="4400" spc="-1" strike="noStrike">
+                <a:latin typeface="Arial Narrow"/>
+              </a:rPr>
+              <a:t>r</a:t>
+            </a:r>
+            <a:r>
+              <a:rPr b="0" lang="en-US" sz="4400" spc="-1" strike="noStrike">
+                <a:latin typeface="Arial Narrow"/>
+              </a:rPr>
+              <a:t>’</a:t>
+            </a:r>
+            <a:r>
+              <a:rPr b="0" lang="en-US" sz="4400" spc="-1" strike="noStrike">
+                <a:latin typeface="Arial Narrow"/>
+              </a:rPr>
+              <a:t>s</a:t>
+            </a:r>
+            <a:r>
+              <a:rPr b="0" lang="en-US" sz="4400" spc="-1" strike="noStrike">
+                <a:latin typeface="Arial Narrow"/>
+              </a:rPr>
+              <a:t> </a:t>
+            </a:r>
+            <a:r>
+              <a:rPr b="0" lang="en-US" sz="4400" spc="-1" strike="noStrike">
+                <a:latin typeface="Arial Narrow"/>
+              </a:rPr>
+              <a:t>b</a:t>
+            </a:r>
+            <a:r>
+              <a:rPr b="0" lang="en-US" sz="4400" spc="-1" strike="noStrike">
+                <a:latin typeface="Arial Narrow"/>
+              </a:rPr>
+              <a:t>i</a:t>
+            </a:r>
+            <a:r>
+              <a:rPr b="0" lang="en-US" sz="4400" spc="-1" strike="noStrike">
+                <a:latin typeface="Arial Narrow"/>
+              </a:rPr>
+              <a:t>o</a:t>
+            </a:r>
+            <a:r>
+              <a:rPr b="0" lang="en-US" sz="4400" spc="-1" strike="noStrike">
+                <a:latin typeface="Arial Narrow"/>
+              </a:rPr>
+              <a:t>.</a:t>
+            </a:r>
+            <a:r>
+              <a:rPr b="0" lang="en-US" sz="4400" spc="-1" strike="noStrike">
+                <a:latin typeface="Arial Narrow"/>
+              </a:rPr>
+              <a:t>t</a:t>
+            </a:r>
+            <a:r>
+              <a:rPr b="0" lang="en-US" sz="4400" spc="-1" strike="noStrike">
+                <a:latin typeface="Arial Narrow"/>
+              </a:rPr>
+              <a:t>o</a:t>
+            </a:r>
+            <a:r>
+              <a:rPr b="0" lang="en-US" sz="4400" spc="-1" strike="noStrike">
+                <a:latin typeface="Arial Narrow"/>
+              </a:rPr>
+              <a:t>o</a:t>
+            </a:r>
+            <a:r>
+              <a:rPr b="0" lang="en-US" sz="4400" spc="-1" strike="noStrike">
+                <a:latin typeface="Arial Narrow"/>
+              </a:rPr>
+              <a:t>l</a:t>
+            </a:r>
+            <a:r>
+              <a:rPr b="0" lang="en-US" sz="4400" spc="-1" strike="noStrike">
+                <a:latin typeface="Arial Narrow"/>
+              </a:rPr>
+              <a:t>s</a:t>
+            </a:r>
+            <a:endParaRPr b="0" lang="en-US" sz="4400" spc="-1" strike="noStrike">
+              <a:latin typeface="Arial"/>
+            </a:endParaRPr>
+          </a:p>
+          <a:p>
+            <a:pPr algn="just"/>
+            <a:endParaRPr b="0" lang="en-US" sz="4400" spc="-1" strike="noStrike">
+              <a:latin typeface="Arial"/>
+            </a:endParaRPr>
+          </a:p>
+        </p:txBody>
+      </p:sp>
+      <p:sp>
+        <p:nvSpPr>
+          <p:cNvPr id="57" name="TextShape 15"/>
+          <p:cNvSpPr txBox="1"/>
+          <p:nvPr/>
+        </p:nvSpPr>
+        <p:spPr>
+          <a:xfrm>
+            <a:off x="2926080" y="34683120"/>
+            <a:ext cx="7223760" cy="1662840"/>
+          </a:xfrm>
+          <a:prstGeom prst="rect">
+            <a:avLst/>
+          </a:prstGeom>
+          <a:noFill/>
+          <a:ln>
+            <a:noFill/>
+          </a:ln>
+        </p:spPr>
+        <p:txBody>
+          <a:bodyPr lIns="90000" rIns="90000" tIns="45000" bIns="45000"/>
+          <a:p>
+            <a:pPr algn="ctr"/>
+            <a:r>
+              <a:rPr b="0" lang="en-US" sz="4400" spc="-1" strike="noStrike">
+                <a:latin typeface="Arial Narrow"/>
+              </a:rPr>
+              <a:t>Best practices and user-tracked data of RBC’s Galaxy instance</a:t>
+            </a:r>
+            <a:endParaRPr b="0" lang="en-US" sz="4400" spc="-1" strike="noStrike">
+              <a:latin typeface="Arial Narrow"/>
+            </a:endParaRPr>
+          </a:p>
+          <a:p>
+            <a:pPr algn="just"/>
+            <a:endParaRPr b="0" lang="en-US" sz="4400" spc="-1" strike="noStrike">
+              <a:latin typeface="Arial Narrow"/>
+            </a:endParaRPr>
+          </a:p>
+        </p:txBody>
+      </p:sp>
     </p:spTree>
   </p:cSld>
   <p:timing>

</xml_diff>

<commit_message>
results section + better footer
</commit_message>
<xml_diff>
--- a/2017-11-23__rostock__forschungscamp/poster.pptx
+++ b/2017-11-23__rostock__forschungscamp/poster.pptx
@@ -1693,7 +1693,13 @@
               <a:rPr b="0" lang="en-US" sz="4400" spc="-1" strike="noStrike">
                 <a:latin typeface="Arial"/>
               </a:rPr>
-              <a:t>Click to edit the title text format</a:t>
+              <a:t>Click to edit the title text </a:t>
+            </a:r>
+            <a:r>
+              <a:rPr b="0" lang="en-US" sz="4400" spc="-1" strike="noStrike">
+                <a:latin typeface="Arial"/>
+              </a:rPr>
+              <a:t>format</a:t>
             </a:r>
             <a:endParaRPr b="0" lang="en-US" sz="4400" spc="-1" strike="noStrike">
               <a:latin typeface="Arial"/>
@@ -1917,9 +1923,39 @@
           <a:chExt cx="0" cy="0"/>
         </a:xfrm>
       </p:grpSpPr>
+      <p:sp>
+        <p:nvSpPr>
+          <p:cNvPr id="41" name="CustomShape 1"/>
+          <p:cNvSpPr/>
+          <p:nvPr/>
+        </p:nvSpPr>
+        <p:spPr>
+          <a:xfrm>
+            <a:off x="22020480" y="39355200"/>
+            <a:ext cx="3436920" cy="1828800"/>
+          </a:xfrm>
+          <a:prstGeom prst="rect">
+            <a:avLst/>
+          </a:prstGeom>
+          <a:solidFill>
+            <a:srgbClr val="ffffff"/>
+          </a:solidFill>
+          <a:ln>
+            <a:solidFill>
+              <a:srgbClr val="ffffff"/>
+            </a:solidFill>
+          </a:ln>
+        </p:spPr>
+        <p:style>
+          <a:lnRef idx="0"/>
+          <a:fillRef idx="0"/>
+          <a:effectRef idx="0"/>
+          <a:fontRef idx="minor"/>
+        </p:style>
+      </p:sp>
       <p:pic>
         <p:nvPicPr>
-          <p:cNvPr id="41" name="Bild 4" descr=""/>
+          <p:cNvPr id="42" name="Bild 4" descr=""/>
           <p:cNvPicPr/>
           <p:nvPr/>
         </p:nvPicPr>
@@ -1942,7 +1978,7 @@
       </p:pic>
       <p:sp>
         <p:nvSpPr>
-          <p:cNvPr id="42" name="CustomShape 1"/>
+          <p:cNvPr id="43" name="CustomShape 2"/>
           <p:cNvSpPr/>
           <p:nvPr/>
         </p:nvSpPr>
@@ -1990,7 +2026,7 @@
       </p:sp>
       <p:sp>
         <p:nvSpPr>
-          <p:cNvPr id="43" name="CustomShape 2"/>
+          <p:cNvPr id="44" name="CustomShape 3"/>
           <p:cNvSpPr/>
           <p:nvPr/>
         </p:nvSpPr>
@@ -2281,7 +2317,7 @@
       </p:sp>
       <p:sp>
         <p:nvSpPr>
-          <p:cNvPr id="44" name="CustomShape 3"/>
+          <p:cNvPr id="45" name="CustomShape 4"/>
           <p:cNvSpPr/>
           <p:nvPr/>
         </p:nvSpPr>
@@ -2332,7 +2368,7 @@
       </p:sp>
       <p:sp>
         <p:nvSpPr>
-          <p:cNvPr id="45" name="CustomShape 4"/>
+          <p:cNvPr id="46" name="CustomShape 5"/>
           <p:cNvSpPr/>
           <p:nvPr/>
         </p:nvSpPr>
@@ -2392,20 +2428,10 @@
                 <a:latin typeface="Verdana"/>
                 <a:ea typeface="DejaVu Sans"/>
               </a:rPr>
-              <a:t>, Markus Wolfien, Martin Scharm, Olaf Wolkenhauer</a:t>
-            </a:r>
-            <a:endParaRPr b="0" lang="en-US" sz="4400" spc="-1" strike="noStrike">
-              <a:latin typeface="Arial"/>
-            </a:endParaRPr>
-          </a:p>
-          <a:p>
-            <a:pPr>
-              <a:lnSpc>
-                <a:spcPct val="100000"/>
-              </a:lnSpc>
-            </a:pPr>
-            <a:r>
-              <a:rPr b="0" i="1" lang="en-US" sz="3200" spc="-1" strike="noStrike" baseline="30000">
+              <a:t>, Markus Wolfien</a:t>
+            </a:r>
+            <a:r>
+              <a:rPr b="0" i="1" lang="en-US" sz="4400" spc="-1" strike="noStrike" baseline="30000">
                 <a:solidFill>
                   <a:srgbClr val="004a99"/>
                 </a:solidFill>
@@ -2415,13 +2441,73 @@
               <a:t>1</a:t>
             </a:r>
             <a:r>
-              <a:rPr b="0" i="1" lang="en-US" sz="3200" spc="-1" strike="noStrike">
+              <a:rPr b="0" i="1" lang="en-US" sz="4400" spc="-1" strike="noStrike">
                 <a:solidFill>
                   <a:srgbClr val="004a99"/>
                 </a:solidFill>
                 <a:latin typeface="Verdana"/>
                 <a:ea typeface="DejaVu Sans"/>
               </a:rPr>
+              <a:t>, Martin Scharm</a:t>
+            </a:r>
+            <a:r>
+              <a:rPr b="0" i="1" lang="en-US" sz="4400" spc="-1" strike="noStrike" baseline="30000">
+                <a:solidFill>
+                  <a:srgbClr val="004a99"/>
+                </a:solidFill>
+                <a:latin typeface="Verdana"/>
+                <a:ea typeface="DejaVu Sans"/>
+              </a:rPr>
+              <a:t>1</a:t>
+            </a:r>
+            <a:r>
+              <a:rPr b="0" i="1" lang="en-US" sz="4400" spc="-1" strike="noStrike">
+                <a:solidFill>
+                  <a:srgbClr val="004a99"/>
+                </a:solidFill>
+                <a:latin typeface="Verdana"/>
+                <a:ea typeface="DejaVu Sans"/>
+              </a:rPr>
+              <a:t>, Olaf Wolkenhauer</a:t>
+            </a:r>
+            <a:r>
+              <a:rPr b="0" i="1" lang="en-US" sz="4400" spc="-1" strike="noStrike" baseline="30000">
+                <a:solidFill>
+                  <a:srgbClr val="004a99"/>
+                </a:solidFill>
+                <a:latin typeface="Verdana"/>
+                <a:ea typeface="DejaVu Sans"/>
+              </a:rPr>
+              <a:t>1</a:t>
+            </a:r>
+            <a:endParaRPr b="0" lang="en-US" sz="4400" spc="-1" strike="noStrike">
+              <a:latin typeface="Arial"/>
+            </a:endParaRPr>
+          </a:p>
+          <a:p>
+            <a:pPr>
+              <a:lnSpc>
+                <a:spcPct val="100000"/>
+              </a:lnSpc>
+            </a:pPr>
+            <a:r>
+              <a:rPr b="0" i="1" lang="en-US" sz="3200" spc="-1" strike="noStrike" baseline="30000">
+                <a:solidFill>
+                  <a:srgbClr val="004a99"/>
+                </a:solidFill>
+                <a:latin typeface="Verdana"/>
+                <a:ea typeface="DejaVu Sans"/>
+              </a:rPr>
+              <a:t>1</a:t>
+            </a:r>
+            <a:r>
+              <a:rPr b="0" i="1" lang="en-US" sz="3200" spc="-1" strike="noStrike">
+                <a:solidFill>
+                  <a:srgbClr val="004a99"/>
+                </a:solidFill>
+                <a:latin typeface="Verdana"/>
+                <a:ea typeface="DejaVu Sans"/>
+              </a:rPr>
               <a:t>Systems Biology and Bioinformatics, University of Rostock, Ulmenstr. 69, 18051 Rostock</a:t>
             </a:r>
             <a:endParaRPr b="0" lang="en-US" sz="3200" spc="-1" strike="noStrike">
@@ -2432,7 +2518,7 @@
       </p:sp>
       <p:sp>
         <p:nvSpPr>
-          <p:cNvPr id="46" name="CustomShape 5"/>
+          <p:cNvPr id="47" name="CustomShape 6"/>
           <p:cNvSpPr/>
           <p:nvPr/>
         </p:nvSpPr>
@@ -2458,7 +2544,7 @@
       </p:sp>
       <p:sp>
         <p:nvSpPr>
-          <p:cNvPr id="47" name="CustomShape 6"/>
+          <p:cNvPr id="48" name="CustomShape 7"/>
           <p:cNvSpPr/>
           <p:nvPr/>
         </p:nvSpPr>
@@ -2484,7 +2570,7 @@
       </p:sp>
       <p:sp>
         <p:nvSpPr>
-          <p:cNvPr id="48" name="CustomShape 7"/>
+          <p:cNvPr id="49" name="CustomShape 8"/>
           <p:cNvSpPr/>
           <p:nvPr/>
         </p:nvSpPr>
@@ -2510,7 +2596,7 @@
       </p:sp>
       <p:pic>
         <p:nvPicPr>
-          <p:cNvPr id="49" name="Picture 6" descr=""/>
+          <p:cNvPr id="50" name="Picture 6" descr=""/>
           <p:cNvPicPr/>
           <p:nvPr/>
         </p:nvPicPr>
@@ -2520,7 +2606,7 @@
         </p:blipFill>
         <p:spPr>
           <a:xfrm>
-            <a:off x="17726040" y="25511760"/>
+            <a:off x="17726040" y="25547760"/>
             <a:ext cx="8242920" cy="5879880"/>
           </a:xfrm>
           <a:prstGeom prst="rect">
@@ -2533,13 +2619,13 @@
       </p:pic>
       <p:sp>
         <p:nvSpPr>
-          <p:cNvPr id="50" name="CustomShape 8"/>
+          <p:cNvPr id="51" name="CustomShape 9"/>
           <p:cNvSpPr/>
           <p:nvPr/>
         </p:nvSpPr>
         <p:spPr>
           <a:xfrm>
-            <a:off x="17647920" y="31391640"/>
+            <a:off x="17647920" y="31427640"/>
             <a:ext cx="8242920" cy="1570320"/>
           </a:xfrm>
           <a:prstGeom prst="rect">
@@ -2608,7 +2694,7 @@
       </p:sp>
       <p:pic>
         <p:nvPicPr>
-          <p:cNvPr id="51" name="" descr=""/>
+          <p:cNvPr id="52" name="" descr=""/>
           <p:cNvPicPr/>
           <p:nvPr/>
         </p:nvPicPr>
@@ -2631,14 +2717,14 @@
       </p:pic>
       <p:sp>
         <p:nvSpPr>
-          <p:cNvPr id="52" name="CustomShape 9"/>
+          <p:cNvPr id="53" name="CustomShape 10"/>
           <p:cNvSpPr/>
           <p:nvPr/>
         </p:nvSpPr>
         <p:spPr>
           <a:xfrm>
-            <a:off x="15475680" y="10041840"/>
-            <a:ext cx="11795760" cy="26030160"/>
+            <a:off x="15475680" y="10077840"/>
+            <a:ext cx="11864880" cy="26030160"/>
           </a:xfrm>
           <a:prstGeom prst="rect">
             <a:avLst/>
@@ -2672,8 +2758,112 @@
                 </a:solidFill>
                 <a:latin typeface="Arial Narrow"/>
               </a:rPr>
-              <a:t>Poster Content</a:t>
-            </a:r>
+              <a:t>Results</a:t>
+            </a:r>
+            <a:endParaRPr b="0" lang="en-US" sz="5400" spc="-1" strike="noStrike">
+              <a:latin typeface="Arial"/>
+            </a:endParaRPr>
+          </a:p>
+          <a:p>
+            <a:pPr algn="just">
+              <a:lnSpc>
+                <a:spcPct val="100000"/>
+              </a:lnSpc>
+              <a:spcBef>
+                <a:spcPts val="879"/>
+              </a:spcBef>
+            </a:pPr>
+            <a:endParaRPr b="0" lang="en-US" sz="5400" spc="-1" strike="noStrike">
+              <a:latin typeface="Arial"/>
+            </a:endParaRPr>
+          </a:p>
+          <a:p>
+            <a:pPr algn="just">
+              <a:lnSpc>
+                <a:spcPct val="100000"/>
+              </a:lnSpc>
+              <a:spcBef>
+                <a:spcPts val="879"/>
+              </a:spcBef>
+            </a:pPr>
+            <a:endParaRPr b="0" lang="en-US" sz="5400" spc="-1" strike="noStrike">
+              <a:latin typeface="Arial"/>
+            </a:endParaRPr>
+          </a:p>
+          <a:p>
+            <a:pPr algn="just">
+              <a:lnSpc>
+                <a:spcPct val="100000"/>
+              </a:lnSpc>
+              <a:spcBef>
+                <a:spcPts val="879"/>
+              </a:spcBef>
+            </a:pPr>
+            <a:endParaRPr b="0" lang="en-US" sz="5400" spc="-1" strike="noStrike">
+              <a:latin typeface="Arial"/>
+            </a:endParaRPr>
+          </a:p>
+          <a:p>
+            <a:pPr algn="just">
+              <a:lnSpc>
+                <a:spcPct val="100000"/>
+              </a:lnSpc>
+              <a:spcBef>
+                <a:spcPts val="879"/>
+              </a:spcBef>
+            </a:pPr>
+            <a:endParaRPr b="0" lang="en-US" sz="5400" spc="-1" strike="noStrike">
+              <a:latin typeface="Arial"/>
+            </a:endParaRPr>
+          </a:p>
+          <a:p>
+            <a:pPr algn="just">
+              <a:lnSpc>
+                <a:spcPct val="100000"/>
+              </a:lnSpc>
+              <a:spcBef>
+                <a:spcPts val="879"/>
+              </a:spcBef>
+            </a:pPr>
+            <a:endParaRPr b="0" lang="en-US" sz="5400" spc="-1" strike="noStrike">
+              <a:latin typeface="Arial"/>
+            </a:endParaRPr>
+          </a:p>
+          <a:p>
+            <a:pPr algn="just">
+              <a:lnSpc>
+                <a:spcPct val="100000"/>
+              </a:lnSpc>
+              <a:spcBef>
+                <a:spcPts val="879"/>
+              </a:spcBef>
+            </a:pPr>
+            <a:endParaRPr b="0" lang="en-US" sz="5400" spc="-1" strike="noStrike">
+              <a:latin typeface="Arial"/>
+            </a:endParaRPr>
+          </a:p>
+          <a:p>
+            <a:pPr algn="just">
+              <a:lnSpc>
+                <a:spcPct val="100000"/>
+              </a:lnSpc>
+              <a:spcBef>
+                <a:spcPts val="879"/>
+              </a:spcBef>
+            </a:pPr>
+            <a:endParaRPr b="0" lang="en-US" sz="5400" spc="-1" strike="noStrike">
+              <a:latin typeface="Arial"/>
+            </a:endParaRPr>
+          </a:p>
+          <a:p>
+            <a:pPr algn="just">
+              <a:lnSpc>
+                <a:spcPct val="100000"/>
+              </a:lnSpc>
+              <a:spcBef>
+                <a:spcPts val="879"/>
+              </a:spcBef>
+            </a:pPr>
             <a:endParaRPr b="0" lang="en-US" sz="5400" spc="-1" strike="noStrike">
               <a:latin typeface="Arial"/>
             </a:endParaRPr>
@@ -2692,16 +2882,7 @@
               <a:buFont typeface="Arial"/>
               <a:buChar char="•"/>
             </a:pPr>
-            <a:r>
-              <a:rPr b="0" lang="en-US" sz="4400" spc="-1" strike="noStrike">
-                <a:solidFill>
-                  <a:srgbClr val="000000"/>
-                </a:solidFill>
-                <a:latin typeface="Arial Narrow"/>
-              </a:rPr>
-              <a:t>The text should be limited to brief statements.</a:t>
-            </a:r>
-            <a:endParaRPr b="0" lang="en-US" sz="4400" spc="-1" strike="noStrike">
+            <a:endParaRPr b="0" lang="en-US" sz="5400" spc="-1" strike="noStrike">
               <a:latin typeface="Arial"/>
             </a:endParaRPr>
           </a:p>
@@ -2726,7 +2907,7 @@
                 </a:solidFill>
                 <a:latin typeface="Arial Narrow"/>
               </a:rPr>
-              <a:t>Font: Arial Narrow</a:t>
+              <a:t>Galaxy tools are grouped by function</a:t>
             </a:r>
             <a:endParaRPr b="0" lang="en-US" sz="4400" spc="-1" strike="noStrike">
               <a:latin typeface="Arial"/>
@@ -2753,7 +2934,7 @@
                 </a:solidFill>
                 <a:latin typeface="Arial Narrow"/>
               </a:rPr>
-              <a:t>Font Size: min. 44 pt.</a:t>
+              <a:t>Each tool function bridges two different states of data</a:t>
             </a:r>
             <a:endParaRPr b="0" lang="en-US" sz="4400" spc="-1" strike="noStrike">
               <a:latin typeface="Arial"/>
@@ -2780,7 +2961,7 @@
                 </a:solidFill>
                 <a:latin typeface="Arial Narrow"/>
               </a:rPr>
-              <a:t>max. 4.000 characters (including spaces) </a:t>
+              <a:t>Tools are chained on their input / output data formats</a:t>
             </a:r>
             <a:endParaRPr b="0" lang="en-US" sz="4400" spc="-1" strike="noStrike">
               <a:latin typeface="Arial"/>
@@ -2807,7 +2988,7 @@
                 </a:solidFill>
                 <a:latin typeface="Arial Narrow"/>
               </a:rPr>
-              <a:t>Structure: Introduction, Objective, Material &amp; Methods, Results, Discussion, Conclusion</a:t>
+              <a:t>Galaxy tours recommends pertinent tools step by step</a:t>
             </a:r>
             <a:endParaRPr b="0" lang="en-US" sz="4400" spc="-1" strike="noStrike">
               <a:latin typeface="Arial"/>
@@ -2834,51 +3015,7 @@
                 </a:solidFill>
                 <a:latin typeface="Arial Narrow"/>
               </a:rPr>
-              <a:t>The use of figures as well as tables is very welcome. Please make sure that the font size of their description is sufficient.</a:t>
-            </a:r>
-            <a:endParaRPr b="0" lang="en-US" sz="4400" spc="-1" strike="noStrike">
-              <a:latin typeface="Arial"/>
-            </a:endParaRPr>
-          </a:p>
-          <a:p>
-            <a:pPr marL="1566720" indent="-1566000">
-              <a:lnSpc>
-                <a:spcPct val="100000"/>
-              </a:lnSpc>
-              <a:spcBef>
-                <a:spcPts val="879"/>
-              </a:spcBef>
-            </a:pPr>
-            <a:r>
-              <a:rPr b="1" lang="en-US" sz="4400" spc="-1" strike="noStrike">
-                <a:solidFill>
-                  <a:srgbClr val="000000"/>
-                </a:solidFill>
-                <a:latin typeface="Arial Narrow"/>
-              </a:rPr>
-              <a:t> </a:t>
-            </a:r>
-            <a:endParaRPr b="0" lang="en-US" sz="4400" spc="-1" strike="noStrike">
-              <a:latin typeface="Arial"/>
-            </a:endParaRPr>
-          </a:p>
-          <a:p>
-            <a:pPr marL="1566720" indent="-1566000">
-              <a:lnSpc>
-                <a:spcPct val="100000"/>
-              </a:lnSpc>
-              <a:spcBef>
-                <a:spcPts val="879"/>
-              </a:spcBef>
-            </a:pPr>
-            <a:r>
-              <a:rPr b="1" lang="en-US" sz="4400" spc="-1" strike="noStrike">
-                <a:solidFill>
-                  <a:srgbClr val="000000"/>
-                </a:solidFill>
-                <a:latin typeface="Arial Narrow"/>
-              </a:rPr>
-              <a:t>Tagging</a:t>
+              <a:t>Users decide which tool to select and parametrize </a:t>
             </a:r>
             <a:endParaRPr b="0" lang="en-US" sz="4400" spc="-1" strike="noStrike">
               <a:latin typeface="Arial"/>
@@ -2898,15 +3035,6 @@
               <a:buFont typeface="Arial"/>
               <a:buChar char="•"/>
             </a:pPr>
-            <a:r>
-              <a:rPr b="0" lang="en-US" sz="4400" spc="-1" strike="noStrike">
-                <a:solidFill>
-                  <a:srgbClr val="000000"/>
-                </a:solidFill>
-                <a:latin typeface="Arial Narrow"/>
-              </a:rPr>
-              <a:t>Please list the professional and popular science keywords from your application for a hashtag line in the footer of your poster. Write an double cross in front of each keyword without a space character (see the examples below).</a:t>
-            </a:r>
             <a:endParaRPr b="0" lang="en-US" sz="4400" spc="-1" strike="noStrike">
               <a:latin typeface="Arial"/>
             </a:endParaRPr>
@@ -2932,7 +3060,7 @@
                 </a:solidFill>
                 <a:latin typeface="Arial Narrow"/>
               </a:rPr>
-              <a:t>Font: Verdana</a:t>
+              <a:t>Font: Arial Narrow</a:t>
             </a:r>
             <a:endParaRPr b="0" lang="en-US" sz="4400" spc="-1" strike="noStrike">
               <a:latin typeface="Arial"/>
@@ -2959,6 +3087,212 @@
                 </a:solidFill>
                 <a:latin typeface="Arial Narrow"/>
               </a:rPr>
+              <a:t>Font Size: min. 44 pt.</a:t>
+            </a:r>
+            <a:endParaRPr b="0" lang="en-US" sz="4400" spc="-1" strike="noStrike">
+              <a:latin typeface="Arial"/>
+            </a:endParaRPr>
+          </a:p>
+          <a:p>
+            <a:pPr marL="895320" indent="-894600">
+              <a:lnSpc>
+                <a:spcPct val="100000"/>
+              </a:lnSpc>
+              <a:spcBef>
+                <a:spcPts val="879"/>
+              </a:spcBef>
+              <a:buClr>
+                <a:srgbClr val="000000"/>
+              </a:buClr>
+              <a:buFont typeface="Arial"/>
+              <a:buChar char="•"/>
+            </a:pPr>
+            <a:r>
+              <a:rPr b="0" lang="en-US" sz="4400" spc="-1" strike="noStrike">
+                <a:solidFill>
+                  <a:srgbClr val="000000"/>
+                </a:solidFill>
+                <a:latin typeface="Arial Narrow"/>
+              </a:rPr>
+              <a:t>max. 4.000 characters (including spaces) </a:t>
+            </a:r>
+            <a:endParaRPr b="0" lang="en-US" sz="4400" spc="-1" strike="noStrike">
+              <a:latin typeface="Arial"/>
+            </a:endParaRPr>
+          </a:p>
+          <a:p>
+            <a:pPr marL="895320" indent="-894600">
+              <a:lnSpc>
+                <a:spcPct val="100000"/>
+              </a:lnSpc>
+              <a:spcBef>
+                <a:spcPts val="879"/>
+              </a:spcBef>
+              <a:buClr>
+                <a:srgbClr val="000000"/>
+              </a:buClr>
+              <a:buFont typeface="Arial"/>
+              <a:buChar char="•"/>
+            </a:pPr>
+            <a:r>
+              <a:rPr b="0" lang="en-US" sz="4400" spc="-1" strike="noStrike">
+                <a:solidFill>
+                  <a:srgbClr val="000000"/>
+                </a:solidFill>
+                <a:latin typeface="Arial Narrow"/>
+              </a:rPr>
+              <a:t>Structure: Introduction, Objective, Material &amp; Methods, Results, Discussion, Conclusion</a:t>
+            </a:r>
+            <a:endParaRPr b="0" lang="en-US" sz="4400" spc="-1" strike="noStrike">
+              <a:latin typeface="Arial"/>
+            </a:endParaRPr>
+          </a:p>
+          <a:p>
+            <a:pPr marL="895320" indent="-894600">
+              <a:lnSpc>
+                <a:spcPct val="100000"/>
+              </a:lnSpc>
+              <a:spcBef>
+                <a:spcPts val="879"/>
+              </a:spcBef>
+              <a:buClr>
+                <a:srgbClr val="000000"/>
+              </a:buClr>
+              <a:buFont typeface="Arial"/>
+              <a:buChar char="•"/>
+            </a:pPr>
+            <a:r>
+              <a:rPr b="0" lang="en-US" sz="4400" spc="-1" strike="noStrike">
+                <a:solidFill>
+                  <a:srgbClr val="000000"/>
+                </a:solidFill>
+                <a:latin typeface="Arial Narrow"/>
+              </a:rPr>
+              <a:t>The use of figures as well as tables is very welcome. Please make sure that the font size of their description is sufficient.</a:t>
+            </a:r>
+            <a:endParaRPr b="0" lang="en-US" sz="4400" spc="-1" strike="noStrike">
+              <a:latin typeface="Arial"/>
+            </a:endParaRPr>
+          </a:p>
+          <a:p>
+            <a:pPr marL="1566720" indent="-1566000">
+              <a:lnSpc>
+                <a:spcPct val="100000"/>
+              </a:lnSpc>
+              <a:spcBef>
+                <a:spcPts val="879"/>
+              </a:spcBef>
+            </a:pPr>
+            <a:r>
+              <a:rPr b="1" lang="en-US" sz="4400" spc="-1" strike="noStrike">
+                <a:solidFill>
+                  <a:srgbClr val="000000"/>
+                </a:solidFill>
+                <a:latin typeface="Arial Narrow"/>
+              </a:rPr>
+              <a:t> </a:t>
+            </a:r>
+            <a:endParaRPr b="0" lang="en-US" sz="4400" spc="-1" strike="noStrike">
+              <a:latin typeface="Arial"/>
+            </a:endParaRPr>
+          </a:p>
+          <a:p>
+            <a:pPr marL="1566720" indent="-1566000">
+              <a:lnSpc>
+                <a:spcPct val="100000"/>
+              </a:lnSpc>
+              <a:spcBef>
+                <a:spcPts val="879"/>
+              </a:spcBef>
+            </a:pPr>
+            <a:r>
+              <a:rPr b="1" lang="en-US" sz="4400" spc="-1" strike="noStrike">
+                <a:solidFill>
+                  <a:srgbClr val="000000"/>
+                </a:solidFill>
+                <a:latin typeface="Arial Narrow"/>
+              </a:rPr>
+              <a:t>Tagging</a:t>
+            </a:r>
+            <a:endParaRPr b="0" lang="en-US" sz="4400" spc="-1" strike="noStrike">
+              <a:latin typeface="Arial"/>
+            </a:endParaRPr>
+          </a:p>
+          <a:p>
+            <a:pPr marL="895320" indent="-894600">
+              <a:lnSpc>
+                <a:spcPct val="100000"/>
+              </a:lnSpc>
+              <a:spcBef>
+                <a:spcPts val="879"/>
+              </a:spcBef>
+              <a:buClr>
+                <a:srgbClr val="000000"/>
+              </a:buClr>
+              <a:buFont typeface="Arial"/>
+              <a:buChar char="•"/>
+            </a:pPr>
+            <a:r>
+              <a:rPr b="0" lang="en-US" sz="4400" spc="-1" strike="noStrike">
+                <a:solidFill>
+                  <a:srgbClr val="000000"/>
+                </a:solidFill>
+                <a:latin typeface="Arial Narrow"/>
+              </a:rPr>
+              <a:t>Please list the professional and popular science keywords from your application for a hashtag line in the footer of your poster. Write an double cross in front of each keyword without a space character (see the examples below).</a:t>
+            </a:r>
+            <a:endParaRPr b="0" lang="en-US" sz="4400" spc="-1" strike="noStrike">
+              <a:latin typeface="Arial"/>
+            </a:endParaRPr>
+          </a:p>
+          <a:p>
+            <a:pPr marL="895320" indent="-894600">
+              <a:lnSpc>
+                <a:spcPct val="100000"/>
+              </a:lnSpc>
+              <a:spcBef>
+                <a:spcPts val="879"/>
+              </a:spcBef>
+              <a:buClr>
+                <a:srgbClr val="000000"/>
+              </a:buClr>
+              <a:buFont typeface="Arial"/>
+              <a:buChar char="•"/>
+            </a:pPr>
+            <a:r>
+              <a:rPr b="0" lang="en-US" sz="4400" spc="-1" strike="noStrike">
+                <a:solidFill>
+                  <a:srgbClr val="000000"/>
+                </a:solidFill>
+                <a:latin typeface="Arial Narrow"/>
+              </a:rPr>
+              <a:t>Font: Verdana</a:t>
+            </a:r>
+            <a:endParaRPr b="0" lang="en-US" sz="4400" spc="-1" strike="noStrike">
+              <a:latin typeface="Arial"/>
+            </a:endParaRPr>
+          </a:p>
+          <a:p>
+            <a:pPr marL="895320" indent="-894600">
+              <a:lnSpc>
+                <a:spcPct val="100000"/>
+              </a:lnSpc>
+              <a:spcBef>
+                <a:spcPts val="879"/>
+              </a:spcBef>
+              <a:buClr>
+                <a:srgbClr val="000000"/>
+              </a:buClr>
+              <a:buFont typeface="Arial"/>
+              <a:buChar char="•"/>
+            </a:pPr>
+            <a:r>
+              <a:rPr b="0" lang="en-US" sz="4400" spc="-1" strike="noStrike">
+                <a:solidFill>
+                  <a:srgbClr val="000000"/>
+                </a:solidFill>
+                <a:latin typeface="Arial Narrow"/>
+              </a:rPr>
               <a:t>Font Size: 44 pt.</a:t>
             </a:r>
             <a:endParaRPr b="0" lang="en-US" sz="4400" spc="-1" strike="noStrike">
@@ -2989,7 +3323,7 @@
       </p:sp>
       <p:sp>
         <p:nvSpPr>
-          <p:cNvPr id="53" name="CustomShape 10"/>
+          <p:cNvPr id="54" name="CustomShape 11"/>
           <p:cNvSpPr/>
           <p:nvPr/>
         </p:nvSpPr>
@@ -3020,7 +3354,7 @@
       </p:sp>
       <p:sp>
         <p:nvSpPr>
-          <p:cNvPr id="54" name="CustomShape 11"/>
+          <p:cNvPr id="55" name="CustomShape 12"/>
           <p:cNvSpPr/>
           <p:nvPr/>
         </p:nvSpPr>
@@ -3051,7 +3385,7 @@
       </p:sp>
       <p:sp>
         <p:nvSpPr>
-          <p:cNvPr id="55" name="CustomShape 12"/>
+          <p:cNvPr id="56" name="CustomShape 13"/>
           <p:cNvSpPr/>
           <p:nvPr/>
         </p:nvSpPr>
@@ -3082,7 +3416,7 @@
       </p:sp>
       <p:sp>
         <p:nvSpPr>
-          <p:cNvPr id="56" name="TextShape 13"/>
+          <p:cNvPr id="57" name="TextShape 14"/>
           <p:cNvSpPr txBox="1"/>
           <p:nvPr/>
         </p:nvSpPr>
@@ -3117,7 +3451,55 @@
               <a:rPr b="0" lang="en-US" sz="4400" spc="-1" strike="noStrike">
                 <a:latin typeface="Arial Narrow"/>
               </a:rPr>
-              <a:t>Tool chaining and parametrization  through Galaxy’s interactive tours</a:t>
+              <a:t>Tool </a:t>
+            </a:r>
+            <a:r>
+              <a:rPr b="0" lang="en-US" sz="4400" spc="-1" strike="noStrike">
+                <a:latin typeface="Arial Narrow"/>
+              </a:rPr>
+              <a:t>chaining </a:t>
+            </a:r>
+            <a:r>
+              <a:rPr b="0" lang="en-US" sz="4400" spc="-1" strike="noStrike">
+                <a:latin typeface="Arial Narrow"/>
+              </a:rPr>
+              <a:t>and </a:t>
+            </a:r>
+            <a:r>
+              <a:rPr b="0" lang="en-US" sz="4400" spc="-1" strike="noStrike">
+                <a:latin typeface="Arial Narrow"/>
+              </a:rPr>
+              <a:t>paramet</a:t>
+            </a:r>
+            <a:r>
+              <a:rPr b="0" lang="en-US" sz="4400" spc="-1" strike="noStrike">
+                <a:latin typeface="Arial Narrow"/>
+              </a:rPr>
+              <a:t>rization  </a:t>
+            </a:r>
+            <a:r>
+              <a:rPr b="0" lang="en-US" sz="4400" spc="-1" strike="noStrike">
+                <a:latin typeface="Arial Narrow"/>
+              </a:rPr>
+              <a:t>through </a:t>
+            </a:r>
+            <a:r>
+              <a:rPr b="0" lang="en-US" sz="4400" spc="-1" strike="noStrike">
+                <a:latin typeface="Arial Narrow"/>
+              </a:rPr>
+              <a:t>Galaxy’s </a:t>
+            </a:r>
+            <a:r>
+              <a:rPr b="0" lang="en-US" sz="4400" spc="-1" strike="noStrike">
+                <a:latin typeface="Arial Narrow"/>
+              </a:rPr>
+              <a:t>interacti</a:t>
+            </a:r>
+            <a:r>
+              <a:rPr b="0" lang="en-US" sz="4400" spc="-1" strike="noStrike">
+                <a:latin typeface="Arial Narrow"/>
+              </a:rPr>
+              <a:t>ve tours</a:t>
             </a:r>
             <a:endParaRPr b="0" lang="en-US" sz="4400" spc="-1" strike="noStrike">
               <a:latin typeface="Arial Narrow"/>
@@ -3128,7 +3510,7 @@
       </p:sp>
       <p:sp>
         <p:nvSpPr>
-          <p:cNvPr id="57" name="TextShape 14"/>
+          <p:cNvPr id="58" name="TextShape 15"/>
           <p:cNvSpPr txBox="1"/>
           <p:nvPr/>
         </p:nvSpPr>
@@ -3153,55 +3535,13 @@
               <a:rPr b="0" lang="en-US" sz="4400" spc="-1" strike="noStrike">
                 <a:latin typeface="Arial Narrow"/>
               </a:rPr>
-              <a:t>Tool </a:t>
+              <a:t>Tool operations and input / output </a:t>
             </a:r>
             <a:r>
               <a:rPr b="0" lang="en-US" sz="4400" spc="-1" strike="noStrike">
                 <a:latin typeface="Arial Narrow"/>
               </a:rPr>
-              <a:t>operatio</a:t>
-            </a:r>
-            <a:r>
-              <a:rPr b="0" lang="en-US" sz="4400" spc="-1" strike="noStrike">
-                <a:latin typeface="Arial Narrow"/>
-              </a:rPr>
-              <a:t>ns and </a:t>
-            </a:r>
-            <a:r>
-              <a:rPr b="0" lang="en-US" sz="4400" spc="-1" strike="noStrike">
-                <a:latin typeface="Arial Narrow"/>
-              </a:rPr>
-              <a:t>input / </a:t>
-            </a:r>
-            <a:r>
-              <a:rPr b="0" lang="en-US" sz="4400" spc="-1" strike="noStrike">
-                <a:latin typeface="Arial Narrow"/>
-              </a:rPr>
-              <a:t>output </a:t>
-            </a:r>
-            <a:r>
-              <a:rPr b="0" lang="en-US" sz="4400" spc="-1" strike="noStrike">
-                <a:latin typeface="Arial Narrow"/>
-              </a:rPr>
-              <a:t>formats </a:t>
-            </a:r>
-            <a:r>
-              <a:rPr b="0" lang="en-US" sz="4400" spc="-1" strike="noStrike">
-                <a:latin typeface="Arial Narrow"/>
-              </a:rPr>
-              <a:t>through </a:t>
-            </a:r>
-            <a:r>
-              <a:rPr b="0" lang="en-US" sz="4400" spc="-1" strike="noStrike">
-                <a:latin typeface="Arial Narrow"/>
-              </a:rPr>
-              <a:t>Elixir’s </a:t>
-            </a:r>
-            <a:r>
-              <a:rPr b="0" lang="en-US" sz="4400" spc="-1" strike="noStrike">
-                <a:latin typeface="Arial Narrow"/>
-              </a:rPr>
-              <a:t>bio.tools</a:t>
+              <a:t>formats through Elixir’s bio.tools</a:t>
             </a:r>
             <a:endParaRPr b="0" lang="en-US" sz="4400" spc="-1" strike="noStrike">
               <a:latin typeface="Arial"/>
@@ -3217,7 +3557,7 @@
       </p:sp>
       <p:sp>
         <p:nvSpPr>
-          <p:cNvPr id="58" name="TextShape 15"/>
+          <p:cNvPr id="59" name="TextShape 16"/>
           <p:cNvSpPr txBox="1"/>
           <p:nvPr/>
         </p:nvSpPr>
@@ -3242,7 +3582,13 @@
               <a:rPr b="0" lang="en-US" sz="4400" spc="-1" strike="noStrike">
                 <a:latin typeface="Arial Narrow"/>
               </a:rPr>
-              <a:t>Best practices and user-tracked data of RBC’s Galaxy instance</a:t>
+              <a:t>Best practices and user-tracked </a:t>
+            </a:r>
+            <a:r>
+              <a:rPr b="0" lang="en-US" sz="4400" spc="-1" strike="noStrike">
+                <a:latin typeface="Arial Narrow"/>
+              </a:rPr>
+              <a:t>data of RBC’s Galaxy instance</a:t>
             </a:r>
             <a:endParaRPr b="0" lang="en-US" sz="4400" spc="-1" strike="noStrike">
               <a:latin typeface="Arial Narrow"/>
@@ -3258,7 +3604,7 @@
       </p:sp>
       <p:pic>
         <p:nvPicPr>
-          <p:cNvPr id="59" name="" descr=""/>
+          <p:cNvPr id="60" name="" descr=""/>
           <p:cNvPicPr/>
           <p:nvPr/>
         </p:nvPicPr>
@@ -3279,9 +3625,165 @@
           </a:ln>
         </p:spPr>
       </p:pic>
+      <p:sp>
+        <p:nvSpPr>
+          <p:cNvPr id="61" name="TextShape 17"/>
+          <p:cNvSpPr txBox="1"/>
+          <p:nvPr/>
+        </p:nvSpPr>
+        <p:spPr>
+          <a:xfrm>
+            <a:off x="11801880" y="39322080"/>
+            <a:ext cx="6267960" cy="1996200"/>
+          </a:xfrm>
+          <a:prstGeom prst="rect">
+            <a:avLst/>
+          </a:prstGeom>
+          <a:noFill/>
+          <a:ln>
+            <a:noFill/>
+          </a:ln>
+        </p:spPr>
+        <p:txBody>
+          <a:bodyPr lIns="90000" rIns="90000" tIns="45000" bIns="45000"/>
+          <a:p>
+            <a:pPr algn="just">
+              <a:lnSpc>
+                <a:spcPct val="115000"/>
+              </a:lnSpc>
+            </a:pPr>
+            <a:r>
+              <a:rPr b="0" lang="en-US" sz="3600" spc="-1" strike="noStrike">
+                <a:solidFill>
+                  <a:srgbClr val="ffffff"/>
+                </a:solidFill>
+                <a:latin typeface="Arial Narrow"/>
+              </a:rPr>
+              <a:t>Systems </a:t>
+            </a:r>
+            <a:r>
+              <a:rPr b="0" lang="en-US" sz="3600" spc="-1" strike="noStrike">
+                <a:solidFill>
+                  <a:srgbClr val="ffffff"/>
+                </a:solidFill>
+                <a:latin typeface="Arial Narrow"/>
+              </a:rPr>
+              <a:t>Biology and </a:t>
+            </a:r>
+            <a:r>
+              <a:rPr b="0" lang="en-US" sz="3600" spc="-1" strike="noStrike">
+                <a:solidFill>
+                  <a:srgbClr val="ffffff"/>
+                </a:solidFill>
+                <a:latin typeface="Arial Narrow"/>
+              </a:rPr>
+              <a:t>Bioinformatics</a:t>
+            </a:r>
+            <a:endParaRPr b="0" lang="en-US" sz="3600" spc="-1" strike="noStrike">
+              <a:solidFill>
+                <a:srgbClr val="ffffff"/>
+              </a:solidFill>
+              <a:latin typeface="Arial Narrow"/>
+            </a:endParaRPr>
+          </a:p>
+          <a:p>
+            <a:pPr algn="just">
+              <a:lnSpc>
+                <a:spcPct val="115000"/>
+              </a:lnSpc>
+            </a:pPr>
+            <a:r>
+              <a:rPr b="0" lang="en-US" sz="3600" spc="-1" strike="noStrike">
+                <a:solidFill>
+                  <a:srgbClr val="ffffff"/>
+                </a:solidFill>
+                <a:latin typeface="Arial Narrow"/>
+              </a:rPr>
+              <a:t>University of </a:t>
+            </a:r>
+            <a:r>
+              <a:rPr b="0" lang="en-US" sz="3600" spc="-1" strike="noStrike">
+                <a:solidFill>
+                  <a:srgbClr val="ffffff"/>
+                </a:solidFill>
+                <a:latin typeface="Arial Narrow"/>
+              </a:rPr>
+              <a:t>Rostock</a:t>
+            </a:r>
+            <a:endParaRPr b="0" lang="en-US" sz="3600" spc="-1" strike="noStrike">
+              <a:solidFill>
+                <a:srgbClr val="ffffff"/>
+              </a:solidFill>
+              <a:latin typeface="Arial Narrow"/>
+            </a:endParaRPr>
+          </a:p>
+          <a:p>
+            <a:pPr algn="just">
+              <a:lnSpc>
+                <a:spcPct val="115000"/>
+              </a:lnSpc>
+            </a:pPr>
+            <a:r>
+              <a:rPr b="0" lang="en-US" sz="3600" spc="-1" strike="noStrike">
+                <a:solidFill>
+                  <a:srgbClr val="ffffff"/>
+                </a:solidFill>
+                <a:latin typeface="Arial Narrow"/>
+              </a:rPr>
+              <a:t>Ulmenstr. 69, </a:t>
+            </a:r>
+            <a:r>
+              <a:rPr b="0" lang="en-US" sz="3600" spc="-1" strike="noStrike">
+                <a:solidFill>
+                  <a:srgbClr val="ffffff"/>
+                </a:solidFill>
+                <a:latin typeface="Arial Narrow"/>
+              </a:rPr>
+              <a:t>18051 Rostock</a:t>
+            </a:r>
+            <a:endParaRPr b="0" lang="en-US" sz="3600" spc="-1" strike="noStrike">
+              <a:solidFill>
+                <a:srgbClr val="ffffff"/>
+              </a:solidFill>
+              <a:latin typeface="Arial Narrow"/>
+            </a:endParaRPr>
+          </a:p>
+          <a:p>
+            <a:pPr algn="just">
+              <a:lnSpc>
+                <a:spcPct val="115000"/>
+              </a:lnSpc>
+            </a:pPr>
+            <a:r>
+              <a:rPr b="1" lang="en-US" sz="3600" spc="-1" strike="noStrike">
+                <a:solidFill>
+                  <a:srgbClr val="ffffff"/>
+                </a:solidFill>
+                <a:latin typeface="Arial Narrow"/>
+              </a:rPr>
+              <a:t>www.sbi.uni-</a:t>
+            </a:r>
+            <a:r>
+              <a:rPr b="1" lang="en-US" sz="3600" spc="-1" strike="noStrike">
+                <a:solidFill>
+                  <a:srgbClr val="ffffff"/>
+                </a:solidFill>
+                <a:latin typeface="Arial Narrow"/>
+              </a:rPr>
+              <a:t>rostock.de</a:t>
+            </a:r>
+            <a:endParaRPr b="0" lang="en-US" sz="3600" spc="-1" strike="noStrike">
+              <a:solidFill>
+                <a:srgbClr val="ffffff"/>
+              </a:solidFill>
+              <a:latin typeface="Arial Narrow"/>
+            </a:endParaRPr>
+          </a:p>
+        </p:txBody>
+      </p:sp>
       <p:pic>
         <p:nvPicPr>
-          <p:cNvPr id="60" name="" descr=""/>
+          <p:cNvPr id="62" name="" descr=""/>
           <p:cNvPicPr/>
           <p:nvPr/>
         </p:nvPicPr>
@@ -3291,8 +3793,8 @@
         </p:blipFill>
         <p:spPr>
           <a:xfrm>
-            <a:off x="22492800" y="39322080"/>
-            <a:ext cx="2764080" cy="1920240"/>
+            <a:off x="11266560" y="29322000"/>
+            <a:ext cx="1807560" cy="1792800"/>
           </a:xfrm>
           <a:prstGeom prst="rect">
             <a:avLst/>
@@ -3304,7 +3806,7 @@
       </p:pic>
       <p:pic>
         <p:nvPicPr>
-          <p:cNvPr id="61" name="" descr=""/>
+          <p:cNvPr id="63" name="" descr=""/>
           <p:cNvPicPr/>
           <p:nvPr/>
         </p:nvPicPr>
@@ -3314,187 +3816,8 @@
         </p:blipFill>
         <p:spPr>
           <a:xfrm>
-            <a:off x="25313760" y="39322080"/>
-            <a:ext cx="2786040" cy="1920240"/>
-          </a:xfrm>
-          <a:prstGeom prst="rect">
-            <a:avLst/>
-          </a:prstGeom>
-          <a:ln>
-            <a:noFill/>
-          </a:ln>
-        </p:spPr>
-      </p:pic>
-      <p:sp>
-        <p:nvSpPr>
-          <p:cNvPr id="62" name="TextShape 16"/>
-          <p:cNvSpPr txBox="1"/>
-          <p:nvPr/>
-        </p:nvSpPr>
-        <p:spPr>
-          <a:xfrm>
-            <a:off x="11801880" y="39322080"/>
-            <a:ext cx="6267960" cy="1996200"/>
-          </a:xfrm>
-          <a:prstGeom prst="rect">
-            <a:avLst/>
-          </a:prstGeom>
-          <a:noFill/>
-          <a:ln>
-            <a:noFill/>
-          </a:ln>
-        </p:spPr>
-        <p:txBody>
-          <a:bodyPr lIns="90000" rIns="90000" tIns="45000" bIns="45000"/>
-          <a:p>
-            <a:pPr algn="just">
-              <a:lnSpc>
-                <a:spcPct val="115000"/>
-              </a:lnSpc>
-            </a:pPr>
-            <a:r>
-              <a:rPr b="0" lang="en-US" sz="3600" spc="-1" strike="noStrike">
-                <a:solidFill>
-                  <a:srgbClr val="ffffff"/>
-                </a:solidFill>
-                <a:latin typeface="Arial Narrow"/>
-              </a:rPr>
-              <a:t>Systems </a:t>
-            </a:r>
-            <a:r>
-              <a:rPr b="0" lang="en-US" sz="3600" spc="-1" strike="noStrike">
-                <a:solidFill>
-                  <a:srgbClr val="ffffff"/>
-                </a:solidFill>
-                <a:latin typeface="Arial Narrow"/>
-              </a:rPr>
-              <a:t>Biology and </a:t>
-            </a:r>
-            <a:r>
-              <a:rPr b="0" lang="en-US" sz="3600" spc="-1" strike="noStrike">
-                <a:solidFill>
-                  <a:srgbClr val="ffffff"/>
-                </a:solidFill>
-                <a:latin typeface="Arial Narrow"/>
-              </a:rPr>
-              <a:t>Bioinformatics</a:t>
-            </a:r>
-            <a:endParaRPr b="0" lang="en-US" sz="3600" spc="-1" strike="noStrike">
-              <a:solidFill>
-                <a:srgbClr val="ffffff"/>
-              </a:solidFill>
-              <a:latin typeface="Arial Narrow"/>
-            </a:endParaRPr>
-          </a:p>
-          <a:p>
-            <a:pPr algn="just">
-              <a:lnSpc>
-                <a:spcPct val="115000"/>
-              </a:lnSpc>
-            </a:pPr>
-            <a:r>
-              <a:rPr b="0" lang="en-US" sz="3600" spc="-1" strike="noStrike">
-                <a:solidFill>
-                  <a:srgbClr val="ffffff"/>
-                </a:solidFill>
-                <a:latin typeface="Arial Narrow"/>
-              </a:rPr>
-              <a:t>University of </a:t>
-            </a:r>
-            <a:r>
-              <a:rPr b="0" lang="en-US" sz="3600" spc="-1" strike="noStrike">
-                <a:solidFill>
-                  <a:srgbClr val="ffffff"/>
-                </a:solidFill>
-                <a:latin typeface="Arial Narrow"/>
-              </a:rPr>
-              <a:t>Rostock</a:t>
-            </a:r>
-            <a:endParaRPr b="0" lang="en-US" sz="3600" spc="-1" strike="noStrike">
-              <a:solidFill>
-                <a:srgbClr val="ffffff"/>
-              </a:solidFill>
-              <a:latin typeface="Arial Narrow"/>
-            </a:endParaRPr>
-          </a:p>
-          <a:p>
-            <a:pPr algn="just">
-              <a:lnSpc>
-                <a:spcPct val="115000"/>
-              </a:lnSpc>
-            </a:pPr>
-            <a:r>
-              <a:rPr b="0" lang="en-US" sz="3600" spc="-1" strike="noStrike">
-                <a:solidFill>
-                  <a:srgbClr val="ffffff"/>
-                </a:solidFill>
-                <a:latin typeface="Arial Narrow"/>
-              </a:rPr>
-              <a:t>Ulmenstr. 69, </a:t>
-            </a:r>
-            <a:r>
-              <a:rPr b="0" lang="en-US" sz="3600" spc="-1" strike="noStrike">
-                <a:solidFill>
-                  <a:srgbClr val="ffffff"/>
-                </a:solidFill>
-                <a:latin typeface="Arial Narrow"/>
-              </a:rPr>
-              <a:t>18051 Rostock</a:t>
-            </a:r>
-            <a:endParaRPr b="0" lang="en-US" sz="3600" spc="-1" strike="noStrike">
-              <a:solidFill>
-                <a:srgbClr val="ffffff"/>
-              </a:solidFill>
-              <a:latin typeface="Arial Narrow"/>
-            </a:endParaRPr>
-          </a:p>
-          <a:p>
-            <a:pPr algn="just">
-              <a:lnSpc>
-                <a:spcPct val="115000"/>
-              </a:lnSpc>
-            </a:pPr>
-            <a:r>
-              <a:rPr b="1" lang="en-US" sz="3600" spc="-1" strike="noStrike">
-                <a:solidFill>
-                  <a:srgbClr val="ffffff"/>
-                </a:solidFill>
-                <a:latin typeface="Arial Narrow"/>
-              </a:rPr>
-              <a:t>www.sbi.uni-</a:t>
-            </a:r>
-            <a:r>
-              <a:rPr b="1" lang="en-US" sz="3600" spc="-1" strike="noStrike">
-                <a:solidFill>
-                  <a:srgbClr val="ffffff"/>
-                </a:solidFill>
-                <a:latin typeface="Arial Narrow"/>
-              </a:rPr>
-              <a:t>rostock.de</a:t>
-            </a:r>
-            <a:endParaRPr b="0" lang="en-US" sz="3600" spc="-1" strike="noStrike">
-              <a:solidFill>
-                <a:srgbClr val="ffffff"/>
-              </a:solidFill>
-              <a:latin typeface="Arial Narrow"/>
-            </a:endParaRPr>
-          </a:p>
-        </p:txBody>
-      </p:sp>
-      <p:pic>
-        <p:nvPicPr>
-          <p:cNvPr id="63" name="" descr=""/>
-          <p:cNvPicPr/>
-          <p:nvPr/>
-        </p:nvPicPr>
-        <p:blipFill>
-          <a:blip r:embed="rId7"/>
-          <a:stretch/>
-        </p:blipFill>
-        <p:spPr>
-          <a:xfrm>
-            <a:off x="11266560" y="29322000"/>
-            <a:ext cx="1807560" cy="1792800"/>
+            <a:off x="11208240" y="25610760"/>
+            <a:ext cx="1981080" cy="2004120"/>
           </a:xfrm>
           <a:prstGeom prst="rect">
             <a:avLst/>
@@ -3511,13 +3834,168 @@
           <p:nvPr/>
         </p:nvPicPr>
         <p:blipFill>
+          <a:blip r:embed="rId7"/>
+          <a:stretch/>
+        </p:blipFill>
+        <p:spPr>
+          <a:xfrm>
+            <a:off x="11162160" y="32932800"/>
+            <a:ext cx="2129760" cy="3011040"/>
+          </a:xfrm>
+          <a:prstGeom prst="rect">
+            <a:avLst/>
+          </a:prstGeom>
+          <a:ln>
+            <a:noFill/>
+          </a:ln>
+        </p:spPr>
+      </p:pic>
+      <p:sp>
+        <p:nvSpPr>
+          <p:cNvPr id="65" name="TextShape 18"/>
+          <p:cNvSpPr txBox="1"/>
+          <p:nvPr/>
+        </p:nvSpPr>
+        <p:spPr>
+          <a:xfrm>
+            <a:off x="11169360" y="35307360"/>
+            <a:ext cx="2286000" cy="640080"/>
+          </a:xfrm>
+          <a:prstGeom prst="rect">
+            <a:avLst/>
+          </a:prstGeom>
+          <a:noFill/>
+          <a:ln>
+            <a:noFill/>
+          </a:ln>
+        </p:spPr>
+        <p:txBody>
+          <a:bodyPr lIns="90000" rIns="90000" tIns="45000" bIns="45000"/>
+          <a:p>
+            <a:pPr algn="just"/>
+            <a:r>
+              <a:rPr b="0" lang="en-US" sz="3200" spc="-1" strike="noStrike">
+                <a:solidFill>
+                  <a:srgbClr val="3465a4"/>
+                </a:solidFill>
+                <a:latin typeface="Arial Narrow"/>
+              </a:rPr>
+              <a:t>denbi.de/rbc</a:t>
+            </a:r>
+            <a:endParaRPr b="0" lang="en-US" sz="3200" spc="-1" strike="noStrike">
+              <a:solidFill>
+                <a:srgbClr val="3465a4"/>
+              </a:solidFill>
+              <a:latin typeface="Arial Narrow"/>
+            </a:endParaRPr>
+          </a:p>
+        </p:txBody>
+      </p:sp>
+      <p:sp>
+        <p:nvSpPr>
+          <p:cNvPr id="66" name="TextShape 19"/>
+          <p:cNvSpPr txBox="1"/>
+          <p:nvPr/>
+        </p:nvSpPr>
+        <p:spPr>
+          <a:xfrm>
+            <a:off x="11169360" y="31671360"/>
+            <a:ext cx="3108960" cy="852120"/>
+          </a:xfrm>
+          <a:prstGeom prst="rect">
+            <a:avLst/>
+          </a:prstGeom>
+          <a:noFill/>
+          <a:ln>
+            <a:noFill/>
+          </a:ln>
+        </p:spPr>
+        <p:txBody>
+          <a:bodyPr lIns="90000" rIns="90000" tIns="45000" bIns="45000"/>
+          <a:p>
+            <a:pPr algn="just"/>
+            <a:r>
+              <a:rPr b="0" lang="en-US" sz="3200" spc="-1" strike="noStrike">
+                <a:solidFill>
+                  <a:srgbClr val="3465a4"/>
+                </a:solidFill>
+                <a:latin typeface="Arial Narrow"/>
+              </a:rPr>
+              <a:t>edamontology.or</a:t>
+            </a:r>
+            <a:r>
+              <a:rPr b="0" lang="en-US" sz="3200" spc="-1" strike="noStrike">
+                <a:solidFill>
+                  <a:srgbClr val="3465a4"/>
+                </a:solidFill>
+                <a:latin typeface="Arial Narrow"/>
+              </a:rPr>
+              <a:t>g</a:t>
+            </a:r>
+            <a:endParaRPr b="0" lang="en-US" sz="3200" spc="-1" strike="noStrike">
+              <a:solidFill>
+                <a:srgbClr val="3465a4"/>
+              </a:solidFill>
+              <a:latin typeface="Arial Narrow"/>
+            </a:endParaRPr>
+          </a:p>
+        </p:txBody>
+      </p:sp>
+      <p:sp>
+        <p:nvSpPr>
+          <p:cNvPr id="67" name="TextShape 20"/>
+          <p:cNvSpPr txBox="1"/>
+          <p:nvPr/>
+        </p:nvSpPr>
+        <p:spPr>
+          <a:xfrm>
+            <a:off x="11169360" y="27999720"/>
+            <a:ext cx="3108960" cy="852120"/>
+          </a:xfrm>
+          <a:prstGeom prst="rect">
+            <a:avLst/>
+          </a:prstGeom>
+          <a:noFill/>
+          <a:ln>
+            <a:noFill/>
+          </a:ln>
+        </p:spPr>
+        <p:txBody>
+          <a:bodyPr lIns="90000" rIns="90000" tIns="45000" bIns="45000"/>
+          <a:p>
+            <a:pPr algn="just"/>
+            <a:r>
+              <a:rPr b="0" lang="en-US" sz="3200" spc="-1" strike="noStrike">
+                <a:solidFill>
+                  <a:srgbClr val="3465a4"/>
+                </a:solidFill>
+                <a:latin typeface="Arial Narrow"/>
+              </a:rPr>
+              <a:t>galaxyproject.org</a:t>
+            </a:r>
+            <a:endParaRPr b="0" lang="en-US" sz="3200" spc="-1" strike="noStrike">
+              <a:solidFill>
+                <a:srgbClr val="3465a4"/>
+              </a:solidFill>
+              <a:latin typeface="Arial Narrow"/>
+            </a:endParaRPr>
+          </a:p>
+        </p:txBody>
+      </p:sp>
+      <p:pic>
+        <p:nvPicPr>
+          <p:cNvPr id="68" name="" descr=""/>
+          <p:cNvPicPr/>
+          <p:nvPr/>
+        </p:nvPicPr>
+        <p:blipFill>
           <a:blip r:embed="rId8"/>
           <a:stretch/>
         </p:blipFill>
         <p:spPr>
           <a:xfrm>
-            <a:off x="11208240" y="25610760"/>
-            <a:ext cx="1981080" cy="2004120"/>
+            <a:off x="3096360" y="36635760"/>
+            <a:ext cx="1671480" cy="1671480"/>
           </a:xfrm>
           <a:prstGeom prst="rect">
             <a:avLst/>
@@ -3527,9 +4005,91 @@
           </a:ln>
         </p:spPr>
       </p:pic>
+      <p:sp>
+        <p:nvSpPr>
+          <p:cNvPr id="69" name="TextShape 21"/>
+          <p:cNvSpPr txBox="1"/>
+          <p:nvPr/>
+        </p:nvSpPr>
+        <p:spPr>
+          <a:xfrm>
+            <a:off x="5069520" y="36969840"/>
+            <a:ext cx="2907000" cy="614520"/>
+          </a:xfrm>
+          <a:prstGeom prst="rect">
+            <a:avLst/>
+          </a:prstGeom>
+          <a:noFill/>
+          <a:ln>
+            <a:noFill/>
+          </a:ln>
+        </p:spPr>
+        <p:txBody>
+          <a:bodyPr lIns="90000" rIns="90000" tIns="45000" bIns="45000"/>
+          <a:p>
+            <a:pPr algn="just"/>
+            <a:r>
+              <a:rPr b="1" lang="en-US" sz="4400" spc="-1" strike="noStrike">
+                <a:latin typeface="Arial Narrow"/>
+              </a:rPr>
+              <a:t>destai</a:t>
+            </a:r>
+            <a:r>
+              <a:rPr b="1" lang="en-US" sz="4400" spc="-1" strike="noStrike">
+                <a:latin typeface="Arial Narrow"/>
+              </a:rPr>
+              <a:t>rdenbi</a:t>
+            </a:r>
+            <a:endParaRPr b="0" lang="en-US" sz="4400" spc="-1" strike="noStrike">
+              <a:latin typeface="Arial"/>
+            </a:endParaRPr>
+          </a:p>
+        </p:txBody>
+      </p:sp>
+      <p:sp>
+        <p:nvSpPr>
+          <p:cNvPr id="70" name="TextShape 22"/>
+          <p:cNvSpPr txBox="1"/>
+          <p:nvPr/>
+        </p:nvSpPr>
+        <p:spPr>
+          <a:xfrm>
+            <a:off x="5069880" y="37582200"/>
+            <a:ext cx="4124880" cy="471240"/>
+          </a:xfrm>
+          <a:prstGeom prst="rect">
+            <a:avLst/>
+          </a:prstGeom>
+          <a:noFill/>
+          <a:ln>
+            <a:noFill/>
+          </a:ln>
+        </p:spPr>
+        <p:txBody>
+          <a:bodyPr lIns="90000" rIns="90000" tIns="45000" bIns="45000"/>
+          <a:p>
+            <a:pPr algn="just"/>
+            <a:r>
+              <a:rPr b="0" lang="en-US" sz="3200" spc="-1" strike="noStrike">
+                <a:latin typeface="Arial Narrow"/>
+              </a:rPr>
+              <a:t>destair.bioinf.uni-</a:t>
+            </a:r>
+            <a:r>
+              <a:rPr b="0" lang="en-US" sz="3200" spc="-1" strike="noStrike">
+                <a:latin typeface="Arial Narrow"/>
+              </a:rPr>
+              <a:t>leipzig.de</a:t>
+            </a:r>
+            <a:endParaRPr b="0" lang="en-US" sz="3200" spc="-1" strike="noStrike">
+              <a:latin typeface="Arial"/>
+            </a:endParaRPr>
+          </a:p>
+        </p:txBody>
+      </p:sp>
       <p:pic>
         <p:nvPicPr>
-          <p:cNvPr id="65" name="" descr=""/>
+          <p:cNvPr id="71" name="" descr=""/>
           <p:cNvPicPr/>
           <p:nvPr/>
         </p:nvPicPr>
@@ -3539,8 +4099,8 @@
         </p:blipFill>
         <p:spPr>
           <a:xfrm>
-            <a:off x="11162160" y="32932800"/>
-            <a:ext cx="2129760" cy="3011040"/>
+            <a:off x="9047880" y="35589600"/>
+            <a:ext cx="5564520" cy="3931920"/>
           </a:xfrm>
           <a:prstGeom prst="rect">
             <a:avLst/>
@@ -3552,139 +4112,63 @@
       </p:pic>
       <p:sp>
         <p:nvSpPr>
-          <p:cNvPr id="66" name="TextShape 17"/>
-          <p:cNvSpPr txBox="1"/>
+          <p:cNvPr id="72" name="Line 23"/>
+          <p:cNvSpPr/>
           <p:nvPr/>
         </p:nvSpPr>
         <p:spPr>
           <a:xfrm>
-            <a:off x="11169360" y="35307360"/>
-            <a:ext cx="2286000" cy="640080"/>
-          </a:xfrm>
-          <a:prstGeom prst="rect">
-            <a:avLst/>
-          </a:prstGeom>
-          <a:noFill/>
-          <a:ln>
-            <a:noFill/>
+            <a:off x="6858000" y="28437840"/>
+            <a:ext cx="0" cy="837360"/>
+          </a:xfrm>
+          <a:prstGeom prst="line">
+            <a:avLst/>
+          </a:prstGeom>
+          <a:ln w="19080">
+            <a:solidFill>
+              <a:srgbClr val="3465a4"/>
+            </a:solidFill>
+            <a:round/>
           </a:ln>
         </p:spPr>
-        <p:txBody>
-          <a:bodyPr lIns="90000" rIns="90000" tIns="45000" bIns="45000"/>
-          <a:p>
-            <a:pPr algn="just"/>
-            <a:r>
-              <a:rPr b="0" lang="en-US" sz="3200" spc="-1" strike="noStrike">
-                <a:solidFill>
-                  <a:srgbClr val="3465a4"/>
-                </a:solidFill>
-                <a:latin typeface="Arial Narrow"/>
-              </a:rPr>
-              <a:t>denbi.de/rbc</a:t>
-            </a:r>
-            <a:endParaRPr b="0" lang="en-US" sz="3200" spc="-1" strike="noStrike">
-              <a:solidFill>
-                <a:srgbClr val="3465a4"/>
-              </a:solidFill>
-              <a:latin typeface="Arial Narrow"/>
-            </a:endParaRPr>
-          </a:p>
-        </p:txBody>
-      </p:sp>
-      <p:sp>
-        <p:nvSpPr>
-          <p:cNvPr id="67" name="TextShape 18"/>
-          <p:cNvSpPr txBox="1"/>
+        <p:style>
+          <a:lnRef idx="0"/>
+          <a:fillRef idx="0"/>
+          <a:effectRef idx="0"/>
+          <a:fontRef idx="minor"/>
+        </p:style>
+      </p:sp>
+      <p:sp>
+        <p:nvSpPr>
+          <p:cNvPr id="73" name="Line 24"/>
+          <p:cNvSpPr/>
           <p:nvPr/>
         </p:nvSpPr>
         <p:spPr>
           <a:xfrm>
-            <a:off x="11169360" y="31671360"/>
-            <a:ext cx="3108960" cy="852120"/>
-          </a:xfrm>
-          <a:prstGeom prst="rect">
-            <a:avLst/>
-          </a:prstGeom>
-          <a:noFill/>
-          <a:ln>
-            <a:noFill/>
+            <a:off x="6858000" y="32123160"/>
+            <a:ext cx="0" cy="837360"/>
+          </a:xfrm>
+          <a:prstGeom prst="line">
+            <a:avLst/>
+          </a:prstGeom>
+          <a:ln w="19080">
+            <a:solidFill>
+              <a:srgbClr val="3465a4"/>
+            </a:solidFill>
+            <a:round/>
           </a:ln>
         </p:spPr>
-        <p:txBody>
-          <a:bodyPr lIns="90000" rIns="90000" tIns="45000" bIns="45000"/>
-          <a:p>
-            <a:pPr algn="just"/>
-            <a:r>
-              <a:rPr b="0" lang="en-US" sz="3200" spc="-1" strike="noStrike">
-                <a:solidFill>
-                  <a:srgbClr val="3465a4"/>
-                </a:solidFill>
-                <a:latin typeface="Arial Narrow"/>
-              </a:rPr>
-              <a:t>edamontology.or</a:t>
-            </a:r>
-            <a:r>
-              <a:rPr b="0" lang="en-US" sz="3200" spc="-1" strike="noStrike">
-                <a:solidFill>
-                  <a:srgbClr val="3465a4"/>
-                </a:solidFill>
-                <a:latin typeface="Arial Narrow"/>
-              </a:rPr>
-              <a:t>g</a:t>
-            </a:r>
-            <a:endParaRPr b="0" lang="en-US" sz="3200" spc="-1" strike="noStrike">
-              <a:solidFill>
-                <a:srgbClr val="3465a4"/>
-              </a:solidFill>
-              <a:latin typeface="Arial Narrow"/>
-            </a:endParaRPr>
-          </a:p>
-        </p:txBody>
-      </p:sp>
-      <p:sp>
-        <p:nvSpPr>
-          <p:cNvPr id="68" name="TextShape 19"/>
-          <p:cNvSpPr txBox="1"/>
-          <p:nvPr/>
-        </p:nvSpPr>
-        <p:spPr>
-          <a:xfrm>
-            <a:off x="11169360" y="27999720"/>
-            <a:ext cx="3108960" cy="852120"/>
-          </a:xfrm>
-          <a:prstGeom prst="rect">
-            <a:avLst/>
-          </a:prstGeom>
-          <a:noFill/>
-          <a:ln>
-            <a:noFill/>
-          </a:ln>
-        </p:spPr>
-        <p:txBody>
-          <a:bodyPr lIns="90000" rIns="90000" tIns="45000" bIns="45000"/>
-          <a:p>
-            <a:pPr algn="just"/>
-            <a:r>
-              <a:rPr b="0" lang="en-US" sz="3200" spc="-1" strike="noStrike">
-                <a:solidFill>
-                  <a:srgbClr val="3465a4"/>
-                </a:solidFill>
-                <a:latin typeface="Arial Narrow"/>
-              </a:rPr>
-              <a:t>galaxyproject.org</a:t>
-            </a:r>
-            <a:endParaRPr b="0" lang="en-US" sz="3200" spc="-1" strike="noStrike">
-              <a:solidFill>
-                <a:srgbClr val="3465a4"/>
-              </a:solidFill>
-              <a:latin typeface="Arial Narrow"/>
-            </a:endParaRPr>
-          </a:p>
-        </p:txBody>
+        <p:style>
+          <a:lnRef idx="0"/>
+          <a:fillRef idx="0"/>
+          <a:effectRef idx="0"/>
+          <a:fontRef idx="minor"/>
+        </p:style>
       </p:sp>
       <p:pic>
         <p:nvPicPr>
-          <p:cNvPr id="69" name="" descr=""/>
+          <p:cNvPr id="74" name="" descr=""/>
           <p:cNvPicPr/>
           <p:nvPr/>
         </p:nvPicPr>
@@ -3694,8 +4178,8 @@
         </p:blipFill>
         <p:spPr>
           <a:xfrm>
-            <a:off x="3096360" y="36635760"/>
-            <a:ext cx="1671480" cy="1671480"/>
+            <a:off x="25584480" y="39359520"/>
+            <a:ext cx="2484000" cy="1856880"/>
           </a:xfrm>
           <a:prstGeom prst="rect">
             <a:avLst/>
@@ -3705,85 +4189,9 @@
           </a:ln>
         </p:spPr>
       </p:pic>
-      <p:sp>
-        <p:nvSpPr>
-          <p:cNvPr id="70" name="TextShape 20"/>
-          <p:cNvSpPr txBox="1"/>
-          <p:nvPr/>
-        </p:nvSpPr>
-        <p:spPr>
-          <a:xfrm>
-            <a:off x="5069520" y="36969840"/>
-            <a:ext cx="2907000" cy="614520"/>
-          </a:xfrm>
-          <a:prstGeom prst="rect">
-            <a:avLst/>
-          </a:prstGeom>
-          <a:noFill/>
-          <a:ln>
-            <a:noFill/>
-          </a:ln>
-        </p:spPr>
-        <p:txBody>
-          <a:bodyPr lIns="90000" rIns="90000" tIns="45000" bIns="45000"/>
-          <a:p>
-            <a:pPr algn="just"/>
-            <a:r>
-              <a:rPr b="1" lang="en-US" sz="4400" spc="-1" strike="noStrike">
-                <a:latin typeface="Arial Narrow"/>
-              </a:rPr>
-              <a:t>destairdenbi</a:t>
-            </a:r>
-            <a:endParaRPr b="0" lang="en-US" sz="4400" spc="-1" strike="noStrike">
-              <a:latin typeface="Arial"/>
-            </a:endParaRPr>
-          </a:p>
-        </p:txBody>
-      </p:sp>
-      <p:sp>
-        <p:nvSpPr>
-          <p:cNvPr id="71" name="TextShape 21"/>
-          <p:cNvSpPr txBox="1"/>
-          <p:nvPr/>
-        </p:nvSpPr>
-        <p:spPr>
-          <a:xfrm>
-            <a:off x="5069880" y="37582200"/>
-            <a:ext cx="4124880" cy="471240"/>
-          </a:xfrm>
-          <a:prstGeom prst="rect">
-            <a:avLst/>
-          </a:prstGeom>
-          <a:noFill/>
-          <a:ln>
-            <a:noFill/>
-          </a:ln>
-        </p:spPr>
-        <p:txBody>
-          <a:bodyPr lIns="90000" rIns="90000" tIns="45000" bIns="45000"/>
-          <a:p>
-            <a:pPr algn="just"/>
-            <a:r>
-              <a:rPr b="0" lang="en-US" sz="3200" spc="-1" strike="noStrike">
-                <a:latin typeface="Arial Narrow"/>
-              </a:rPr>
-              <a:t>destair.bioinf.uni-</a:t>
-            </a:r>
-            <a:r>
-              <a:rPr b="0" lang="en-US" sz="3200" spc="-1" strike="noStrike">
-                <a:latin typeface="Arial Narrow"/>
-              </a:rPr>
-              <a:t>leipzig.de</a:t>
-            </a:r>
-            <a:endParaRPr b="0" lang="en-US" sz="3200" spc="-1" strike="noStrike">
-              <a:latin typeface="Arial"/>
-            </a:endParaRPr>
-          </a:p>
-        </p:txBody>
-      </p:sp>
       <p:pic>
         <p:nvPicPr>
-          <p:cNvPr id="72" name="" descr=""/>
+          <p:cNvPr id="75" name="" descr=""/>
           <p:cNvPicPr/>
           <p:nvPr/>
         </p:nvPicPr>
@@ -3793,8 +4201,8 @@
         </p:blipFill>
         <p:spPr>
           <a:xfrm>
-            <a:off x="9047880" y="35589600"/>
-            <a:ext cx="5564520" cy="3931920"/>
+            <a:off x="22020480" y="39410640"/>
+            <a:ext cx="3436920" cy="1773360"/>
           </a:xfrm>
           <a:prstGeom prst="rect">
             <a:avLst/>
@@ -3804,62 +4212,29 @@
           </a:ln>
         </p:spPr>
       </p:pic>
-      <p:sp>
-        <p:nvSpPr>
-          <p:cNvPr id="73" name="Line 22"/>
-          <p:cNvSpPr/>
+      <p:pic>
+        <p:nvPicPr>
+          <p:cNvPr id="76" name="" descr=""/>
+          <p:cNvPicPr/>
           <p:nvPr/>
-        </p:nvSpPr>
-        <p:spPr>
-          <a:xfrm>
-            <a:off x="6858000" y="28437840"/>
-            <a:ext cx="0" cy="837360"/>
-          </a:xfrm>
-          <a:prstGeom prst="line">
-            <a:avLst/>
-          </a:prstGeom>
-          <a:ln w="19080">
-            <a:solidFill>
-              <a:srgbClr val="3465a4"/>
-            </a:solidFill>
-            <a:round/>
+        </p:nvPicPr>
+        <p:blipFill>
+          <a:blip r:embed="rId12"/>
+          <a:stretch/>
+        </p:blipFill>
+        <p:spPr>
+          <a:xfrm>
+            <a:off x="15365160" y="11352600"/>
+            <a:ext cx="12715920" cy="7849800"/>
+          </a:xfrm>
+          <a:prstGeom prst="rect">
+            <a:avLst/>
+          </a:prstGeom>
+          <a:ln>
+            <a:noFill/>
           </a:ln>
         </p:spPr>
-        <p:style>
-          <a:lnRef idx="0"/>
-          <a:fillRef idx="0"/>
-          <a:effectRef idx="0"/>
-          <a:fontRef idx="minor"/>
-        </p:style>
-      </p:sp>
-      <p:sp>
-        <p:nvSpPr>
-          <p:cNvPr id="74" name="Line 23"/>
-          <p:cNvSpPr/>
-          <p:nvPr/>
-        </p:nvSpPr>
-        <p:spPr>
-          <a:xfrm>
-            <a:off x="6858000" y="32123160"/>
-            <a:ext cx="0" cy="837360"/>
-          </a:xfrm>
-          <a:prstGeom prst="line">
-            <a:avLst/>
-          </a:prstGeom>
-          <a:ln w="19080">
-            <a:solidFill>
-              <a:srgbClr val="3465a4"/>
-            </a:solidFill>
-            <a:round/>
-          </a:ln>
-        </p:spPr>
-        <p:style>
-          <a:lnRef idx="0"/>
-          <a:fillRef idx="0"/>
-          <a:effectRef idx="0"/>
-          <a:fontRef idx="minor"/>
-        </p:style>
-      </p:sp>
+      </p:pic>
     </p:spTree>
   </p:cSld>
   <p:timing>

</xml_diff>

<commit_message>
removed bullet points from the conclusion section
</commit_message>
<xml_diff>
--- a/2017-11-23__rostock__forschungscamp/poster.pptx
+++ b/2017-11-23__rostock__forschungscamp/poster.pptx
@@ -1693,13 +1693,7 @@
               <a:rPr b="0" lang="en-US" sz="4400" spc="-1" strike="noStrike">
                 <a:latin typeface="Arial"/>
               </a:rPr>
-              <a:t>Click to edit the title text </a:t>
-            </a:r>
-            <a:r>
-              <a:rPr b="0" lang="en-US" sz="4400" spc="-1" strike="noStrike">
-                <a:latin typeface="Arial"/>
-              </a:rPr>
-              <a:t>format</a:t>
+              <a:t>Click to edit the title text format</a:t>
             </a:r>
             <a:endParaRPr b="0" lang="en-US" sz="4400" spc="-1" strike="noStrike">
               <a:latin typeface="Arial"/>
@@ -3041,102 +3035,6 @@
                 <a:spcPts val="879"/>
               </a:spcBef>
             </a:pPr>
-            <a:endParaRPr b="0" lang="en-US" sz="5400" spc="-1" strike="noStrike">
-              <a:latin typeface="Arial"/>
-            </a:endParaRPr>
-          </a:p>
-          <a:p>
-            <a:pPr algn="just">
-              <a:lnSpc>
-                <a:spcPct val="100000"/>
-              </a:lnSpc>
-              <a:spcBef>
-                <a:spcPts val="879"/>
-              </a:spcBef>
-            </a:pPr>
-            <a:endParaRPr b="0" lang="en-US" sz="5400" spc="-1" strike="noStrike">
-              <a:latin typeface="Arial"/>
-            </a:endParaRPr>
-          </a:p>
-          <a:p>
-            <a:pPr algn="just">
-              <a:lnSpc>
-                <a:spcPct val="100000"/>
-              </a:lnSpc>
-              <a:spcBef>
-                <a:spcPts val="879"/>
-              </a:spcBef>
-            </a:pPr>
-            <a:endParaRPr b="0" lang="en-US" sz="5400" spc="-1" strike="noStrike">
-              <a:latin typeface="Arial"/>
-            </a:endParaRPr>
-          </a:p>
-          <a:p>
-            <a:pPr algn="just">
-              <a:lnSpc>
-                <a:spcPct val="100000"/>
-              </a:lnSpc>
-              <a:spcBef>
-                <a:spcPts val="879"/>
-              </a:spcBef>
-            </a:pPr>
-            <a:endParaRPr b="0" lang="en-US" sz="5400" spc="-1" strike="noStrike">
-              <a:latin typeface="Arial"/>
-            </a:endParaRPr>
-          </a:p>
-          <a:p>
-            <a:pPr algn="just">
-              <a:lnSpc>
-                <a:spcPct val="100000"/>
-              </a:lnSpc>
-              <a:spcBef>
-                <a:spcPts val="879"/>
-              </a:spcBef>
-            </a:pPr>
-            <a:endParaRPr b="0" lang="en-US" sz="5400" spc="-1" strike="noStrike">
-              <a:latin typeface="Arial"/>
-            </a:endParaRPr>
-          </a:p>
-          <a:p>
-            <a:pPr algn="just">
-              <a:lnSpc>
-                <a:spcPct val="100000"/>
-              </a:lnSpc>
-              <a:spcBef>
-                <a:spcPts val="879"/>
-              </a:spcBef>
-            </a:pPr>
-            <a:endParaRPr b="0" lang="en-US" sz="5400" spc="-1" strike="noStrike">
-              <a:latin typeface="Arial"/>
-            </a:endParaRPr>
-          </a:p>
-          <a:p>
-            <a:pPr algn="just">
-              <a:lnSpc>
-                <a:spcPct val="100000"/>
-              </a:lnSpc>
-              <a:spcBef>
-                <a:spcPts val="879"/>
-              </a:spcBef>
-            </a:pPr>
-            <a:endParaRPr b="0" lang="en-US" sz="5400" spc="-1" strike="noStrike">
-              <a:latin typeface="Arial"/>
-            </a:endParaRPr>
-          </a:p>
-          <a:p>
-            <a:pPr marL="895320" indent="-894600" algn="just">
-              <a:lnSpc>
-                <a:spcPct val="100000"/>
-              </a:lnSpc>
-              <a:spcBef>
-                <a:spcPts val="879"/>
-              </a:spcBef>
-              <a:buClr>
-                <a:srgbClr val="000000"/>
-              </a:buClr>
-              <a:buFont typeface="Arial"/>
-              <a:buChar char="•"/>
-            </a:pPr>
             <a:r>
               <a:rPr b="0" lang="en-US" sz="4400" spc="-1" strike="noStrike">
                 <a:solidFill>
@@ -3151,18 +3049,442 @@
             </a:endParaRPr>
           </a:p>
           <a:p>
-            <a:pPr marL="895320" indent="-894600" algn="just">
-              <a:lnSpc>
-                <a:spcPct val="100000"/>
-              </a:lnSpc>
-              <a:spcBef>
-                <a:spcPts val="879"/>
-              </a:spcBef>
-              <a:buClr>
-                <a:srgbClr val="000000"/>
-              </a:buClr>
-              <a:buFont typeface="Arial"/>
-              <a:buChar char="•"/>
+            <a:pPr algn="just">
+              <a:lnSpc>
+                <a:spcPct val="100000"/>
+              </a:lnSpc>
+              <a:spcBef>
+                <a:spcPts val="879"/>
+              </a:spcBef>
+            </a:pPr>
+            <a:endParaRPr b="0" lang="en-US" sz="4400" spc="-1" strike="noStrike">
+              <a:latin typeface="Arial"/>
+            </a:endParaRPr>
+          </a:p>
+          <a:p>
+            <a:pPr algn="just">
+              <a:lnSpc>
+                <a:spcPct val="100000"/>
+              </a:lnSpc>
+              <a:spcBef>
+                <a:spcPts val="879"/>
+              </a:spcBef>
+            </a:pPr>
+            <a:endParaRPr b="0" lang="en-US" sz="4400" spc="-1" strike="noStrike">
+              <a:latin typeface="Arial"/>
+            </a:endParaRPr>
+          </a:p>
+          <a:p>
+            <a:pPr algn="just">
+              <a:lnSpc>
+                <a:spcPct val="100000"/>
+              </a:lnSpc>
+              <a:spcBef>
+                <a:spcPts val="879"/>
+              </a:spcBef>
+            </a:pPr>
+            <a:endParaRPr b="0" lang="en-US" sz="4400" spc="-1" strike="noStrike">
+              <a:latin typeface="Arial"/>
+            </a:endParaRPr>
+          </a:p>
+          <a:p>
+            <a:pPr algn="just">
+              <a:lnSpc>
+                <a:spcPct val="100000"/>
+              </a:lnSpc>
+              <a:spcBef>
+                <a:spcPts val="879"/>
+              </a:spcBef>
+            </a:pPr>
+            <a:endParaRPr b="0" lang="en-US" sz="4400" spc="-1" strike="noStrike">
+              <a:latin typeface="Arial"/>
+            </a:endParaRPr>
+          </a:p>
+          <a:p>
+            <a:pPr algn="just">
+              <a:lnSpc>
+                <a:spcPct val="100000"/>
+              </a:lnSpc>
+              <a:spcBef>
+                <a:spcPts val="879"/>
+              </a:spcBef>
+            </a:pPr>
+            <a:endParaRPr b="0" lang="en-US" sz="4400" spc="-1" strike="noStrike">
+              <a:latin typeface="Arial"/>
+            </a:endParaRPr>
+          </a:p>
+          <a:p>
+            <a:pPr algn="just">
+              <a:lnSpc>
+                <a:spcPct val="100000"/>
+              </a:lnSpc>
+              <a:spcBef>
+                <a:spcPts val="879"/>
+              </a:spcBef>
+            </a:pPr>
+            <a:endParaRPr b="0" lang="en-US" sz="4400" spc="-1" strike="noStrike">
+              <a:latin typeface="Arial"/>
+            </a:endParaRPr>
+          </a:p>
+          <a:p>
+            <a:pPr algn="just">
+              <a:lnSpc>
+                <a:spcPct val="100000"/>
+              </a:lnSpc>
+              <a:spcBef>
+                <a:spcPts val="879"/>
+              </a:spcBef>
+            </a:pPr>
+            <a:endParaRPr b="0" lang="en-US" sz="4400" spc="-1" strike="noStrike">
+              <a:latin typeface="Arial"/>
+            </a:endParaRPr>
+          </a:p>
+          <a:p>
+            <a:pPr algn="just">
+              <a:lnSpc>
+                <a:spcPct val="100000"/>
+              </a:lnSpc>
+              <a:spcBef>
+                <a:spcPts val="879"/>
+              </a:spcBef>
+            </a:pPr>
+            <a:endParaRPr b="0" lang="en-US" sz="4400" spc="-1" strike="noStrike">
+              <a:latin typeface="Arial"/>
+            </a:endParaRPr>
+          </a:p>
+          <a:p>
+            <a:pPr algn="just">
+              <a:lnSpc>
+                <a:spcPct val="100000"/>
+              </a:lnSpc>
+              <a:spcBef>
+                <a:spcPts val="879"/>
+              </a:spcBef>
+            </a:pPr>
+            <a:endParaRPr b="0" lang="en-US" sz="4400" spc="-1" strike="noStrike">
+              <a:latin typeface="Arial"/>
+            </a:endParaRPr>
+          </a:p>
+          <a:p>
+            <a:pPr algn="just">
+              <a:lnSpc>
+                <a:spcPct val="100000"/>
+              </a:lnSpc>
+              <a:spcBef>
+                <a:spcPts val="879"/>
+              </a:spcBef>
+            </a:pPr>
+            <a:endParaRPr b="0" lang="en-US" sz="4400" spc="-1" strike="noStrike">
+              <a:latin typeface="Arial"/>
+            </a:endParaRPr>
+          </a:p>
+          <a:p>
+            <a:pPr algn="just">
+              <a:lnSpc>
+                <a:spcPct val="100000"/>
+              </a:lnSpc>
+              <a:spcBef>
+                <a:spcPts val="879"/>
+              </a:spcBef>
+            </a:pPr>
+            <a:endParaRPr b="0" lang="en-US" sz="4400" spc="-1" strike="noStrike">
+              <a:latin typeface="Arial"/>
+            </a:endParaRPr>
+          </a:p>
+          <a:p>
+            <a:pPr algn="just">
+              <a:lnSpc>
+                <a:spcPct val="100000"/>
+              </a:lnSpc>
+              <a:spcBef>
+                <a:spcPts val="879"/>
+              </a:spcBef>
+            </a:pPr>
+            <a:endParaRPr b="0" lang="en-US" sz="4400" spc="-1" strike="noStrike">
+              <a:latin typeface="Arial"/>
+            </a:endParaRPr>
+          </a:p>
+          <a:p>
+            <a:pPr algn="just">
+              <a:lnSpc>
+                <a:spcPct val="100000"/>
+              </a:lnSpc>
+              <a:spcBef>
+                <a:spcPts val="879"/>
+              </a:spcBef>
+            </a:pPr>
+            <a:endParaRPr b="0" lang="en-US" sz="4400" spc="-1" strike="noStrike">
+              <a:latin typeface="Arial"/>
+            </a:endParaRPr>
+          </a:p>
+          <a:p>
+            <a:pPr algn="just">
+              <a:lnSpc>
+                <a:spcPct val="100000"/>
+              </a:lnSpc>
+              <a:spcBef>
+                <a:spcPts val="879"/>
+              </a:spcBef>
+            </a:pPr>
+            <a:endParaRPr b="0" lang="en-US" sz="4400" spc="-1" strike="noStrike">
+              <a:latin typeface="Arial"/>
+            </a:endParaRPr>
+          </a:p>
+          <a:p>
+            <a:pPr algn="just">
+              <a:lnSpc>
+                <a:spcPct val="100000"/>
+              </a:lnSpc>
+              <a:spcBef>
+                <a:spcPts val="879"/>
+              </a:spcBef>
+            </a:pPr>
+            <a:endParaRPr b="0" lang="en-US" sz="4400" spc="-1" strike="noStrike">
+              <a:latin typeface="Arial"/>
+            </a:endParaRPr>
+          </a:p>
+          <a:p>
+            <a:pPr algn="just">
+              <a:lnSpc>
+                <a:spcPct val="100000"/>
+              </a:lnSpc>
+              <a:spcBef>
+                <a:spcPts val="879"/>
+              </a:spcBef>
+            </a:pPr>
+            <a:endParaRPr b="0" lang="en-US" sz="4400" spc="-1" strike="noStrike">
+              <a:latin typeface="Arial"/>
+            </a:endParaRPr>
+          </a:p>
+          <a:p>
+            <a:pPr algn="just">
+              <a:lnSpc>
+                <a:spcPct val="100000"/>
+              </a:lnSpc>
+              <a:spcBef>
+                <a:spcPts val="879"/>
+              </a:spcBef>
+            </a:pPr>
+            <a:endParaRPr b="0" lang="en-US" sz="4400" spc="-1" strike="noStrike">
+              <a:latin typeface="Arial"/>
+            </a:endParaRPr>
+          </a:p>
+          <a:p>
+            <a:pPr algn="just">
+              <a:lnSpc>
+                <a:spcPct val="100000"/>
+              </a:lnSpc>
+              <a:spcBef>
+                <a:spcPts val="879"/>
+              </a:spcBef>
+            </a:pPr>
+            <a:endParaRPr b="0" lang="en-US" sz="4400" spc="-1" strike="noStrike">
+              <a:latin typeface="Arial"/>
+            </a:endParaRPr>
+          </a:p>
+          <a:p>
+            <a:pPr algn="just">
+              <a:lnSpc>
+                <a:spcPct val="100000"/>
+              </a:lnSpc>
+              <a:spcBef>
+                <a:spcPts val="879"/>
+              </a:spcBef>
+            </a:pPr>
+            <a:endParaRPr b="0" lang="en-US" sz="4400" spc="-1" strike="noStrike">
+              <a:latin typeface="Arial"/>
+            </a:endParaRPr>
+          </a:p>
+          <a:p>
+            <a:pPr algn="just">
+              <a:lnSpc>
+                <a:spcPct val="100000"/>
+              </a:lnSpc>
+              <a:spcBef>
+                <a:spcPts val="879"/>
+              </a:spcBef>
+            </a:pPr>
+            <a:endParaRPr b="0" lang="en-US" sz="4400" spc="-1" strike="noStrike">
+              <a:latin typeface="Arial"/>
+            </a:endParaRPr>
+          </a:p>
+          <a:p>
+            <a:pPr algn="just">
+              <a:lnSpc>
+                <a:spcPct val="100000"/>
+              </a:lnSpc>
+              <a:spcBef>
+                <a:spcPts val="879"/>
+              </a:spcBef>
+            </a:pPr>
+            <a:endParaRPr b="0" lang="en-US" sz="4400" spc="-1" strike="noStrike">
+              <a:latin typeface="Arial"/>
+            </a:endParaRPr>
+          </a:p>
+          <a:p>
+            <a:pPr algn="just">
+              <a:lnSpc>
+                <a:spcPct val="100000"/>
+              </a:lnSpc>
+              <a:spcBef>
+                <a:spcPts val="879"/>
+              </a:spcBef>
+            </a:pPr>
+            <a:endParaRPr b="0" lang="en-US" sz="4400" spc="-1" strike="noStrike">
+              <a:latin typeface="Arial"/>
+            </a:endParaRPr>
+          </a:p>
+          <a:p>
+            <a:pPr algn="just">
+              <a:lnSpc>
+                <a:spcPct val="100000"/>
+              </a:lnSpc>
+              <a:spcBef>
+                <a:spcPts val="879"/>
+              </a:spcBef>
+            </a:pPr>
+            <a:endParaRPr b="0" lang="en-US" sz="4400" spc="-1" strike="noStrike">
+              <a:latin typeface="Arial"/>
+            </a:endParaRPr>
+          </a:p>
+          <a:p>
+            <a:pPr algn="just">
+              <a:lnSpc>
+                <a:spcPct val="100000"/>
+              </a:lnSpc>
+              <a:spcBef>
+                <a:spcPts val="879"/>
+              </a:spcBef>
+            </a:pPr>
+            <a:endParaRPr b="0" lang="en-US" sz="4400" spc="-1" strike="noStrike">
+              <a:latin typeface="Arial"/>
+            </a:endParaRPr>
+          </a:p>
+          <a:p>
+            <a:pPr algn="just">
+              <a:lnSpc>
+                <a:spcPct val="100000"/>
+              </a:lnSpc>
+              <a:spcBef>
+                <a:spcPts val="879"/>
+              </a:spcBef>
+            </a:pPr>
+            <a:endParaRPr b="0" lang="en-US" sz="4400" spc="-1" strike="noStrike">
+              <a:latin typeface="Arial"/>
+            </a:endParaRPr>
+          </a:p>
+          <a:p>
+            <a:pPr algn="just">
+              <a:lnSpc>
+                <a:spcPct val="100000"/>
+              </a:lnSpc>
+              <a:spcBef>
+                <a:spcPts val="879"/>
+              </a:spcBef>
+            </a:pPr>
+            <a:endParaRPr b="0" lang="en-US" sz="4400" spc="-1" strike="noStrike">
+              <a:latin typeface="Arial"/>
+            </a:endParaRPr>
+          </a:p>
+          <a:p>
+            <a:pPr algn="just">
+              <a:lnSpc>
+                <a:spcPct val="100000"/>
+              </a:lnSpc>
+              <a:spcBef>
+                <a:spcPts val="879"/>
+              </a:spcBef>
+            </a:pPr>
+            <a:endParaRPr b="0" lang="en-US" sz="4400" spc="-1" strike="noStrike">
+              <a:latin typeface="Arial"/>
+            </a:endParaRPr>
+          </a:p>
+          <a:p>
+            <a:pPr algn="just">
+              <a:lnSpc>
+                <a:spcPct val="100000"/>
+              </a:lnSpc>
+              <a:spcBef>
+                <a:spcPts val="879"/>
+              </a:spcBef>
+            </a:pPr>
+            <a:endParaRPr b="0" lang="en-US" sz="4400" spc="-1" strike="noStrike">
+              <a:latin typeface="Arial"/>
+            </a:endParaRPr>
+          </a:p>
+          <a:p>
+            <a:pPr algn="just">
+              <a:lnSpc>
+                <a:spcPct val="100000"/>
+              </a:lnSpc>
+              <a:spcBef>
+                <a:spcPts val="879"/>
+              </a:spcBef>
+            </a:pPr>
+            <a:endParaRPr b="0" lang="en-US" sz="4400" spc="-1" strike="noStrike">
+              <a:latin typeface="Arial"/>
+            </a:endParaRPr>
+          </a:p>
+          <a:p>
+            <a:pPr algn="just">
+              <a:lnSpc>
+                <a:spcPct val="100000"/>
+              </a:lnSpc>
+              <a:spcBef>
+                <a:spcPts val="879"/>
+              </a:spcBef>
+            </a:pPr>
+            <a:endParaRPr b="0" lang="en-US" sz="4400" spc="-1" strike="noStrike">
+              <a:latin typeface="Arial"/>
+            </a:endParaRPr>
+          </a:p>
+          <a:p>
+            <a:pPr algn="just">
+              <a:lnSpc>
+                <a:spcPct val="100000"/>
+              </a:lnSpc>
+              <a:spcBef>
+                <a:spcPts val="879"/>
+              </a:spcBef>
+            </a:pPr>
+            <a:endParaRPr b="0" lang="en-US" sz="4400" spc="-1" strike="noStrike">
+              <a:latin typeface="Arial"/>
+            </a:endParaRPr>
+          </a:p>
+          <a:p>
+            <a:pPr algn="just">
+              <a:lnSpc>
+                <a:spcPct val="100000"/>
+              </a:lnSpc>
+              <a:spcBef>
+                <a:spcPts val="879"/>
+              </a:spcBef>
+            </a:pPr>
+            <a:endParaRPr b="0" lang="en-US" sz="4400" spc="-1" strike="noStrike">
+              <a:latin typeface="Arial"/>
+            </a:endParaRPr>
+          </a:p>
+          <a:p>
+            <a:pPr algn="just">
+              <a:lnSpc>
+                <a:spcPct val="100000"/>
+              </a:lnSpc>
+              <a:spcBef>
+                <a:spcPts val="879"/>
+              </a:spcBef>
+            </a:pPr>
+            <a:endParaRPr b="0" lang="en-US" sz="4400" spc="-1" strike="noStrike">
+              <a:latin typeface="Arial"/>
+            </a:endParaRPr>
+          </a:p>
+          <a:p>
+            <a:pPr algn="just">
+              <a:lnSpc>
+                <a:spcPct val="100000"/>
+              </a:lnSpc>
+              <a:spcBef>
+                <a:spcPts val="879"/>
+              </a:spcBef>
             </a:pPr>
             <a:r>
               <a:rPr b="0" lang="en-US" sz="4400" spc="-1" strike="noStrike">
@@ -3653,43 +3975,7 @@
                 </a:solidFill>
                 <a:latin typeface="Arial Narrow"/>
               </a:rPr>
-              <a:t>Systems </a:t>
-            </a:r>
-            <a:r>
-              <a:rPr b="0" lang="en-US" sz="3600" spc="-1" strike="noStrike">
-                <a:solidFill>
-                  <a:srgbClr val="ffffff"/>
-                </a:solidFill>
-                <a:latin typeface="Arial Narrow"/>
-              </a:rPr>
-              <a:t>Biology </a:t>
-            </a:r>
-            <a:r>
-              <a:rPr b="0" lang="en-US" sz="3600" spc="-1" strike="noStrike">
-                <a:solidFill>
-                  <a:srgbClr val="ffffff"/>
-                </a:solidFill>
-                <a:latin typeface="Arial Narrow"/>
-              </a:rPr>
-              <a:t>and </a:t>
-            </a:r>
-            <a:r>
-              <a:rPr b="0" lang="en-US" sz="3600" spc="-1" strike="noStrike">
-                <a:solidFill>
-                  <a:srgbClr val="ffffff"/>
-                </a:solidFill>
-                <a:latin typeface="Arial Narrow"/>
-              </a:rPr>
-              <a:t>Bioinform</a:t>
-            </a:r>
-            <a:r>
-              <a:rPr b="0" lang="en-US" sz="3600" spc="-1" strike="noStrike">
-                <a:solidFill>
-                  <a:srgbClr val="ffffff"/>
-                </a:solidFill>
-                <a:latin typeface="Arial Narrow"/>
-              </a:rPr>
-              <a:t>atics</a:t>
+              <a:t>Systems Biology and Bioinformatics</a:t>
             </a:r>
             <a:endParaRPr b="0" lang="en-US" sz="3600" spc="-1" strike="noStrike">
               <a:solidFill>
@@ -3711,25 +3997,7 @@
                 </a:solidFill>
                 <a:latin typeface="Arial Narrow"/>
               </a:rPr>
-              <a:t>Universit</a:t>
-            </a:r>
-            <a:r>
-              <a:rPr b="0" lang="en-US" sz="3600" spc="-1" strike="noStrike">
-                <a:solidFill>
-                  <a:srgbClr val="ffffff"/>
-                </a:solidFill>
-                <a:latin typeface="Arial Narrow"/>
-              </a:rPr>
-              <a:t>y of </a:t>
-            </a:r>
-            <a:r>
-              <a:rPr b="0" lang="en-US" sz="3600" spc="-1" strike="noStrike">
-                <a:solidFill>
-                  <a:srgbClr val="ffffff"/>
-                </a:solidFill>
-                <a:latin typeface="Arial Narrow"/>
-              </a:rPr>
-              <a:t>Rostock</a:t>
+              <a:t>University of Rostock</a:t>
             </a:r>
             <a:endParaRPr b="0" lang="en-US" sz="3600" spc="-1" strike="noStrike">
               <a:solidFill>
@@ -3751,34 +4019,7 @@
                 </a:solidFill>
                 <a:latin typeface="Arial Narrow"/>
               </a:rPr>
-              <a:t>Ulmenstr. </a:t>
-            </a:r>
-            <a:r>
-              <a:rPr b="0" lang="en-US" sz="3600" spc="-1" strike="noStrike">
-                <a:solidFill>
-                  <a:srgbClr val="ffffff"/>
-                </a:solidFill>
-                <a:latin typeface="Arial Narrow"/>
-              </a:rPr>
-              <a:t>69, </a:t>
-            </a:r>
-            <a:r>
-              <a:rPr b="0" lang="en-US" sz="3600" spc="-1" strike="noStrike">
-                <a:solidFill>
-                  <a:srgbClr val="ffffff"/>
-                </a:solidFill>
-                <a:latin typeface="Arial Narrow"/>
-              </a:rPr>
-              <a:t>18051 </a:t>
-            </a:r>
-            <a:r>
-              <a:rPr b="0" lang="en-US" sz="3600" spc="-1" strike="noStrike">
-                <a:solidFill>
-                  <a:srgbClr val="ffffff"/>
-                </a:solidFill>
-                <a:latin typeface="Arial Narrow"/>
-              </a:rPr>
-              <a:t>Rostock</a:t>
+              <a:t>Ulmenstr. 69, 18051 Rostock</a:t>
             </a:r>
             <a:endParaRPr b="0" lang="en-US" sz="3600" spc="-1" strike="noStrike">
               <a:solidFill>
@@ -3800,34 +4041,7 @@
                 </a:solidFill>
                 <a:latin typeface="Arial Narrow"/>
               </a:rPr>
-              <a:t>www.sbi.</a:t>
-            </a:r>
-            <a:r>
-              <a:rPr b="1" lang="en-US" sz="3600" spc="-1" strike="noStrike">
-                <a:solidFill>
-                  <a:srgbClr val="ffffff"/>
-                </a:solidFill>
-                <a:latin typeface="Arial Narrow"/>
-              </a:rPr>
-              <a:t>uni-</a:t>
-            </a:r>
-            <a:r>
-              <a:rPr b="1" lang="en-US" sz="3600" spc="-1" strike="noStrike">
-                <a:solidFill>
-                  <a:srgbClr val="ffffff"/>
-                </a:solidFill>
-                <a:latin typeface="Arial Narrow"/>
-              </a:rPr>
-              <a:t>rostock.</a:t>
-            </a:r>
-            <a:r>
-              <a:rPr b="1" lang="en-US" sz="3600" spc="-1" strike="noStrike">
-                <a:solidFill>
-                  <a:srgbClr val="ffffff"/>
-                </a:solidFill>
-                <a:latin typeface="Arial Narrow"/>
-              </a:rPr>
-              <a:t>de</a:t>
+              <a:t>www.sbi.uni-rostock.de</a:t>
             </a:r>
             <a:endParaRPr b="0" lang="en-US" sz="3600" spc="-1" strike="noStrike">
               <a:solidFill>
@@ -4080,13 +4294,7 @@
               <a:rPr b="1" lang="en-US" sz="4400" spc="-1" strike="noStrike">
                 <a:latin typeface="Arial Narrow"/>
               </a:rPr>
-              <a:t>destairde</a:t>
-            </a:r>
-            <a:r>
-              <a:rPr b="1" lang="en-US" sz="4400" spc="-1" strike="noStrike">
-                <a:latin typeface="Arial Narrow"/>
-              </a:rPr>
-              <a:t>nbi</a:t>
+              <a:t>destairdenbi</a:t>
             </a:r>
             <a:endParaRPr b="0" lang="en-US" sz="4400" spc="-1" strike="noStrike">
               <a:latin typeface="Arial"/>
@@ -4285,7 +4493,7 @@
         </p:nvSpPr>
         <p:spPr>
           <a:xfrm>
-            <a:off x="15508800" y="26547120"/>
+            <a:off x="15472800" y="28779120"/>
             <a:ext cx="11247120" cy="914400"/>
           </a:xfrm>
           <a:prstGeom prst="rect">
@@ -4348,7 +4556,7 @@
         </p:blipFill>
         <p:spPr>
           <a:xfrm>
-            <a:off x="15536160" y="27489600"/>
+            <a:off x="15500160" y="29721600"/>
             <a:ext cx="12535920" cy="3494160"/>
           </a:xfrm>
           <a:prstGeom prst="rect">
@@ -4367,7 +4575,7 @@
         </p:nvSpPr>
         <p:spPr>
           <a:xfrm>
-            <a:off x="15508800" y="24711120"/>
+            <a:off x="15472800" y="26943120"/>
             <a:ext cx="11247120" cy="471240"/>
           </a:xfrm>
           <a:prstGeom prst="rect">
@@ -4412,7 +4620,7 @@
         </p:blipFill>
         <p:spPr>
           <a:xfrm>
-            <a:off x="15533280" y="25284240"/>
+            <a:off x="15497280" y="27516240"/>
             <a:ext cx="12538800" cy="759600"/>
           </a:xfrm>
           <a:prstGeom prst="rect">

</xml_diff>

<commit_message>
added de.NBI logo + improved layout
</commit_message>
<xml_diff>
--- a/2017-11-23__rostock__forschungscamp/poster.pptx
+++ b/2017-11-23__rostock__forschungscamp/poster.pptx
@@ -1377,7 +1377,7 @@
         <p:spPr>
           <a:xfrm>
             <a:off x="2145240" y="39298320"/>
-            <a:ext cx="26027280" cy="3480480"/>
+            <a:ext cx="26026920" cy="3480120"/>
           </a:xfrm>
           <a:prstGeom prst="rect">
             <a:avLst/>
@@ -1408,7 +1408,7 @@
         <p:spPr>
           <a:xfrm>
             <a:off x="2146320" y="6102720"/>
-            <a:ext cx="26026200" cy="33177960"/>
+            <a:ext cx="26025840" cy="33177600"/>
           </a:xfrm>
           <a:custGeom>
             <a:avLst/>
@@ -1656,7 +1656,7 @@
         <p:spPr>
           <a:xfrm>
             <a:off x="2155680" y="1386000"/>
-            <a:ext cx="15972120" cy="3276000"/>
+            <a:ext cx="15971760" cy="3275640"/>
           </a:xfrm>
           <a:prstGeom prst="rect">
             <a:avLst/>
@@ -1925,8 +1925,8 @@
         </p:nvSpPr>
         <p:spPr>
           <a:xfrm>
-            <a:off x="22020480" y="39355200"/>
-            <a:ext cx="3436920" cy="1828800"/>
+            <a:off x="18165600" y="39518640"/>
+            <a:ext cx="9902520" cy="1538280"/>
           </a:xfrm>
           <a:prstGeom prst="rect">
             <a:avLst/>
@@ -1959,8 +1959,8 @@
         </p:blipFill>
         <p:spPr>
           <a:xfrm rot="10795200">
-            <a:off x="2250000" y="41291640"/>
-            <a:ext cx="25857000" cy="1509480"/>
+            <a:off x="2250360" y="41292000"/>
+            <a:ext cx="25856640" cy="1509120"/>
           </a:xfrm>
           <a:prstGeom prst="rect">
             <a:avLst/>
@@ -1979,7 +1979,7 @@
         <p:spPr>
           <a:xfrm>
             <a:off x="2934720" y="6606720"/>
-            <a:ext cx="24119280" cy="2051640"/>
+            <a:ext cx="24118920" cy="2051280"/>
           </a:xfrm>
           <a:prstGeom prst="rect">
             <a:avLst/>
@@ -1998,7 +1998,7 @@
         <p:txBody>
           <a:bodyPr lIns="0" rIns="417600" tIns="208800" bIns="208800" anchor="ctr"/>
           <a:p>
-            <a:pPr>
+            <a:pPr algn="ctr">
               <a:lnSpc>
                 <a:spcPct val="100000"/>
               </a:lnSpc>
@@ -2009,11 +2009,12 @@
                   <a:srgbClr val="004a99"/>
                 </a:solidFill>
                 <a:latin typeface="Verdana"/>
+                <a:ea typeface="DejaVu Sans"/>
               </a:rPr>
               <a:t>Towards automating workflow analyses in Galaxy</a:t>
             </a:r>
             <a:endParaRPr b="0" lang="en-US" sz="6600" spc="-1" strike="noStrike">
-              <a:latin typeface="Verdana"/>
+              <a:latin typeface="Arial"/>
             </a:endParaRPr>
           </a:p>
         </p:txBody>
@@ -2027,7 +2028,7 @@
         <p:spPr>
           <a:xfrm>
             <a:off x="2928960" y="10063080"/>
-            <a:ext cx="11795760" cy="28981800"/>
+            <a:ext cx="11795400" cy="28981440"/>
           </a:xfrm>
           <a:prstGeom prst="rect">
             <a:avLst/>
@@ -2060,6 +2061,7 @@
                   <a:srgbClr val="000000"/>
                 </a:solidFill>
                 <a:latin typeface="Arial Narrow"/>
+                <a:ea typeface="DejaVu Sans"/>
               </a:rPr>
               <a:t>Introduction</a:t>
             </a:r>
@@ -2082,9 +2084,36 @@
                   <a:srgbClr val="000000"/>
                 </a:solidFill>
                 <a:latin typeface="Arial Narrow"/>
+                <a:ea typeface="DejaVu Sans"/>
               </a:rPr>
               <a:t>The Galaxy community is promoting RNA-Seq protocols and best practices through the reuse of existing tools, and the consolidation of a Training Network to provide guidance to researchers through example datasets, tutorials, and interactive tours. However, the more tools and techniques are showcased, the more complex the options for tool chaining and parametrization become.</a:t>
             </a:r>
+            <a:endParaRPr b="0" lang="en-US" sz="4400" spc="-1" strike="noStrike">
+              <a:latin typeface="Arial"/>
+            </a:endParaRPr>
+          </a:p>
+          <a:p>
+            <a:pPr algn="just">
+              <a:lnSpc>
+                <a:spcPct val="100000"/>
+              </a:lnSpc>
+              <a:spcBef>
+                <a:spcPts val="879"/>
+              </a:spcBef>
+            </a:pPr>
+            <a:endParaRPr b="0" lang="en-US" sz="4400" spc="-1" strike="noStrike">
+              <a:latin typeface="Arial"/>
+            </a:endParaRPr>
+          </a:p>
+          <a:p>
+            <a:pPr algn="just">
+              <a:lnSpc>
+                <a:spcPct val="100000"/>
+              </a:lnSpc>
+              <a:spcBef>
+                <a:spcPts val="879"/>
+              </a:spcBef>
+            </a:pPr>
             <a:endParaRPr b="0" lang="en-US" sz="4400" spc="-1" strike="noStrike">
               <a:latin typeface="Arial"/>
             </a:endParaRPr>
@@ -2117,6 +2146,7 @@
                   <a:srgbClr val="000000"/>
                 </a:solidFill>
                 <a:latin typeface="Arial Narrow"/>
+                <a:ea typeface="DejaVu Sans"/>
               </a:rPr>
               <a:t>Objectives</a:t>
             </a:r>
@@ -2125,7 +2155,7 @@
             </a:endParaRPr>
           </a:p>
           <a:p>
-            <a:pPr marL="895320" indent="-894600" algn="just">
+            <a:pPr marL="895320" indent="-894240" algn="just">
               <a:lnSpc>
                 <a:spcPct val="100000"/>
               </a:lnSpc>
@@ -2144,6 +2174,7 @@
                   <a:srgbClr val="000000"/>
                 </a:solidFill>
                 <a:latin typeface="Arial Narrow"/>
+                <a:ea typeface="DejaVu Sans"/>
               </a:rPr>
               <a:t>Assist researchers in carrying out their analyses</a:t>
             </a:r>
@@ -2152,7 +2183,7 @@
             </a:endParaRPr>
           </a:p>
           <a:p>
-            <a:pPr marL="895320" indent="-894600" algn="just">
+            <a:pPr marL="895320" indent="-894240" algn="just">
               <a:lnSpc>
                 <a:spcPct val="100000"/>
               </a:lnSpc>
@@ -2171,6 +2202,7 @@
                   <a:srgbClr val="000000"/>
                 </a:solidFill>
                 <a:latin typeface="Arial Narrow"/>
+                <a:ea typeface="DejaVu Sans"/>
               </a:rPr>
               <a:t>Integrate the Galaxy framework with an interactive recommendation system leveraging on community consolidated best practices as well as EDAM annotated tools</a:t>
             </a:r>
@@ -2179,7 +2211,7 @@
             </a:endParaRPr>
           </a:p>
           <a:p>
-            <a:pPr marL="895320" indent="-894600" algn="just">
+            <a:pPr marL="895320" indent="-894240" algn="just">
               <a:lnSpc>
                 <a:spcPct val="100000"/>
               </a:lnSpc>
@@ -2198,6 +2230,7 @@
                   <a:srgbClr val="000000"/>
                 </a:solidFill>
                 <a:latin typeface="Arial Narrow"/>
+                <a:ea typeface="DejaVu Sans"/>
               </a:rPr>
               <a:t>Promote the adoption of well established pipelines</a:t>
             </a:r>
@@ -2206,7 +2239,7 @@
             </a:endParaRPr>
           </a:p>
           <a:p>
-            <a:pPr marL="895320" indent="-894600" algn="just">
+            <a:pPr marL="895320" indent="-894240" algn="just">
               <a:lnSpc>
                 <a:spcPct val="100000"/>
               </a:lnSpc>
@@ -2225,6 +2258,7 @@
                   <a:srgbClr val="000000"/>
                 </a:solidFill>
                 <a:latin typeface="Arial Narrow"/>
+                <a:ea typeface="DejaVu Sans"/>
               </a:rPr>
               <a:t>Allow room for experimental tools</a:t>
             </a:r>
@@ -2233,7 +2267,7 @@
             </a:endParaRPr>
           </a:p>
           <a:p>
-            <a:pPr marL="895320" indent="-894600" algn="just">
+            <a:pPr marL="895320" indent="-894240" algn="just">
               <a:lnSpc>
                 <a:spcPct val="100000"/>
               </a:lnSpc>
@@ -2252,9 +2286,23 @@
                   <a:srgbClr val="000000"/>
                 </a:solidFill>
                 <a:latin typeface="Arial Narrow"/>
+                <a:ea typeface="DejaVu Sans"/>
               </a:rPr>
               <a:t>Consolidate protocols and reproducibility</a:t>
             </a:r>
+            <a:endParaRPr b="0" lang="en-US" sz="4400" spc="-1" strike="noStrike">
+              <a:latin typeface="Arial"/>
+            </a:endParaRPr>
+          </a:p>
+          <a:p>
+            <a:pPr algn="just">
+              <a:lnSpc>
+                <a:spcPct val="100000"/>
+              </a:lnSpc>
+              <a:spcBef>
+                <a:spcPts val="879"/>
+              </a:spcBef>
+            </a:pPr>
             <a:endParaRPr b="0" lang="en-US" sz="4400" spc="-1" strike="noStrike">
               <a:latin typeface="Arial"/>
             </a:endParaRPr>
@@ -2287,6 +2335,7 @@
                   <a:srgbClr val="000000"/>
                 </a:solidFill>
                 <a:latin typeface="Arial Narrow"/>
+                <a:ea typeface="DejaVu Sans"/>
               </a:rPr>
               <a:t>Materials and Methods</a:t>
             </a:r>
@@ -2317,8 +2366,8 @@
         </p:nvSpPr>
         <p:spPr>
           <a:xfrm>
-            <a:off x="16688880" y="41583240"/>
-            <a:ext cx="11295360" cy="844920"/>
+            <a:off x="16796880" y="41583240"/>
+            <a:ext cx="11295000" cy="844560"/>
           </a:xfrm>
           <a:prstGeom prst="rect">
             <a:avLst/>
@@ -2348,14 +2397,12 @@
                   <a:srgbClr val="ffffff"/>
                 </a:solidFill>
                 <a:latin typeface="Verdana"/>
+                <a:ea typeface="DejaVu Sans"/>
               </a:rPr>
               <a:t>#forschungscamp2017 #galaxy #elixir #RNA #EDAM  #AI  #denbi</a:t>
             </a:r>
-            <a:endParaRPr b="1" lang="en-US" sz="4400" spc="-1" strike="noStrike">
-              <a:solidFill>
-                <a:srgbClr val="ffffff"/>
-              </a:solidFill>
-              <a:latin typeface="Verdana"/>
+            <a:endParaRPr b="0" lang="en-US" sz="4400" spc="-1" strike="noStrike">
+              <a:latin typeface="Arial"/>
             </a:endParaRPr>
           </a:p>
         </p:txBody>
@@ -2369,7 +2416,7 @@
         <p:spPr>
           <a:xfrm>
             <a:off x="2934720" y="8298720"/>
-            <a:ext cx="24119280" cy="1583280"/>
+            <a:ext cx="24118920" cy="1582920"/>
           </a:xfrm>
           <a:prstGeom prst="rect">
             <a:avLst/>
@@ -2388,7 +2435,7 @@
         <p:txBody>
           <a:bodyPr lIns="0" rIns="417600" tIns="208800" bIns="208800" anchor="ctr"/>
           <a:p>
-            <a:pPr>
+            <a:pPr algn="ctr">
               <a:lnSpc>
                 <a:spcPct val="100000"/>
               </a:lnSpc>
@@ -2479,7 +2526,7 @@
             </a:endParaRPr>
           </a:p>
           <a:p>
-            <a:pPr>
+            <a:pPr algn="ctr">
               <a:lnSpc>
                 <a:spcPct val="100000"/>
               </a:lnSpc>
@@ -2519,7 +2566,7 @@
         <p:spPr>
           <a:xfrm>
             <a:off x="18920520" y="1602000"/>
-            <a:ext cx="9252360" cy="2915640"/>
+            <a:ext cx="9252000" cy="2915280"/>
           </a:xfrm>
           <a:prstGeom prst="rect">
             <a:avLst/>
@@ -2545,7 +2592,7 @@
         <p:spPr>
           <a:xfrm>
             <a:off x="155520" y="-144360"/>
-            <a:ext cx="304200" cy="304200"/>
+            <a:ext cx="303840" cy="303840"/>
           </a:xfrm>
           <a:prstGeom prst="rect">
             <a:avLst/>
@@ -2571,7 +2618,7 @@
         <p:spPr>
           <a:xfrm>
             <a:off x="307800" y="7920"/>
-            <a:ext cx="304200" cy="304200"/>
+            <a:ext cx="303840" cy="303840"/>
           </a:xfrm>
           <a:prstGeom prst="rect">
             <a:avLst/>
@@ -2601,7 +2648,7 @@
         <p:spPr>
           <a:xfrm>
             <a:off x="20684880" y="1828800"/>
-            <a:ext cx="7517880" cy="2688840"/>
+            <a:ext cx="7517520" cy="2688480"/>
           </a:xfrm>
           <a:prstGeom prst="rect">
             <a:avLst/>
@@ -2620,7 +2667,7 @@
         <p:spPr>
           <a:xfrm>
             <a:off x="15475680" y="10077840"/>
-            <a:ext cx="11864880" cy="26030160"/>
+            <a:ext cx="11864520" cy="26029800"/>
           </a:xfrm>
           <a:prstGeom prst="rect">
             <a:avLst/>
@@ -2653,6 +2700,7 @@
                   <a:srgbClr val="000000"/>
                 </a:solidFill>
                 <a:latin typeface="Arial Narrow"/>
+                <a:ea typeface="DejaVu Sans"/>
               </a:rPr>
               <a:t>Results and discussion</a:t>
             </a:r>
@@ -2830,6 +2878,344 @@
             </a:endParaRPr>
           </a:p>
           <a:p>
+            <a:pPr algn="just">
+              <a:lnSpc>
+                <a:spcPct val="100000"/>
+              </a:lnSpc>
+              <a:spcBef>
+                <a:spcPts val="879"/>
+              </a:spcBef>
+            </a:pPr>
+            <a:endParaRPr b="0" lang="en-US" sz="5400" spc="-1" strike="noStrike">
+              <a:latin typeface="Arial"/>
+            </a:endParaRPr>
+          </a:p>
+          <a:p>
+            <a:pPr algn="just">
+              <a:lnSpc>
+                <a:spcPct val="100000"/>
+              </a:lnSpc>
+              <a:spcBef>
+                <a:spcPts val="879"/>
+              </a:spcBef>
+            </a:pPr>
+            <a:endParaRPr b="0" lang="en-US" sz="5400" spc="-1" strike="noStrike">
+              <a:latin typeface="Arial"/>
+            </a:endParaRPr>
+          </a:p>
+          <a:p>
+            <a:pPr algn="just">
+              <a:lnSpc>
+                <a:spcPct val="100000"/>
+              </a:lnSpc>
+              <a:spcBef>
+                <a:spcPts val="879"/>
+              </a:spcBef>
+            </a:pPr>
+            <a:endParaRPr b="0" lang="en-US" sz="5400" spc="-1" strike="noStrike">
+              <a:latin typeface="Arial"/>
+            </a:endParaRPr>
+          </a:p>
+          <a:p>
+            <a:pPr algn="just">
+              <a:lnSpc>
+                <a:spcPct val="100000"/>
+              </a:lnSpc>
+              <a:spcBef>
+                <a:spcPts val="879"/>
+              </a:spcBef>
+            </a:pPr>
+            <a:endParaRPr b="0" lang="en-US" sz="5400" spc="-1" strike="noStrike">
+              <a:latin typeface="Arial"/>
+            </a:endParaRPr>
+          </a:p>
+          <a:p>
+            <a:pPr algn="just">
+              <a:lnSpc>
+                <a:spcPct val="100000"/>
+              </a:lnSpc>
+              <a:spcBef>
+                <a:spcPts val="879"/>
+              </a:spcBef>
+            </a:pPr>
+            <a:endParaRPr b="0" lang="en-US" sz="5400" spc="-1" strike="noStrike">
+              <a:latin typeface="Arial"/>
+            </a:endParaRPr>
+          </a:p>
+          <a:p>
+            <a:pPr algn="just">
+              <a:lnSpc>
+                <a:spcPct val="100000"/>
+              </a:lnSpc>
+              <a:spcBef>
+                <a:spcPts val="879"/>
+              </a:spcBef>
+            </a:pPr>
+            <a:endParaRPr b="0" lang="en-US" sz="5400" spc="-1" strike="noStrike">
+              <a:latin typeface="Arial"/>
+            </a:endParaRPr>
+          </a:p>
+          <a:p>
+            <a:pPr algn="just">
+              <a:lnSpc>
+                <a:spcPct val="100000"/>
+              </a:lnSpc>
+              <a:spcBef>
+                <a:spcPts val="879"/>
+              </a:spcBef>
+            </a:pPr>
+            <a:endParaRPr b="0" lang="en-US" sz="5400" spc="-1" strike="noStrike">
+              <a:latin typeface="Arial"/>
+            </a:endParaRPr>
+          </a:p>
+          <a:p>
+            <a:pPr algn="just">
+              <a:lnSpc>
+                <a:spcPct val="100000"/>
+              </a:lnSpc>
+              <a:spcBef>
+                <a:spcPts val="879"/>
+              </a:spcBef>
+            </a:pPr>
+            <a:endParaRPr b="0" lang="en-US" sz="5400" spc="-1" strike="noStrike">
+              <a:latin typeface="Arial"/>
+            </a:endParaRPr>
+          </a:p>
+          <a:p>
+            <a:pPr algn="just">
+              <a:lnSpc>
+                <a:spcPct val="100000"/>
+              </a:lnSpc>
+              <a:spcBef>
+                <a:spcPts val="879"/>
+              </a:spcBef>
+            </a:pPr>
+            <a:endParaRPr b="0" lang="en-US" sz="5400" spc="-1" strike="noStrike">
+              <a:latin typeface="Arial"/>
+            </a:endParaRPr>
+          </a:p>
+          <a:p>
+            <a:pPr algn="just">
+              <a:lnSpc>
+                <a:spcPct val="100000"/>
+              </a:lnSpc>
+              <a:spcBef>
+                <a:spcPts val="879"/>
+              </a:spcBef>
+            </a:pPr>
+            <a:endParaRPr b="0" lang="en-US" sz="5400" spc="-1" strike="noStrike">
+              <a:latin typeface="Arial"/>
+            </a:endParaRPr>
+          </a:p>
+          <a:p>
+            <a:pPr algn="just">
+              <a:lnSpc>
+                <a:spcPct val="100000"/>
+              </a:lnSpc>
+              <a:spcBef>
+                <a:spcPts val="879"/>
+              </a:spcBef>
+            </a:pPr>
+            <a:endParaRPr b="0" lang="en-US" sz="5400" spc="-1" strike="noStrike">
+              <a:latin typeface="Arial"/>
+            </a:endParaRPr>
+          </a:p>
+          <a:p>
+            <a:pPr algn="just">
+              <a:lnSpc>
+                <a:spcPct val="100000"/>
+              </a:lnSpc>
+              <a:spcBef>
+                <a:spcPts val="879"/>
+              </a:spcBef>
+            </a:pPr>
+            <a:endParaRPr b="0" lang="en-US" sz="5400" spc="-1" strike="noStrike">
+              <a:latin typeface="Arial"/>
+            </a:endParaRPr>
+          </a:p>
+          <a:p>
+            <a:pPr algn="just">
+              <a:lnSpc>
+                <a:spcPct val="100000"/>
+              </a:lnSpc>
+              <a:spcBef>
+                <a:spcPts val="879"/>
+              </a:spcBef>
+            </a:pPr>
+            <a:endParaRPr b="0" lang="en-US" sz="5400" spc="-1" strike="noStrike">
+              <a:latin typeface="Arial"/>
+            </a:endParaRPr>
+          </a:p>
+          <a:p>
+            <a:pPr algn="just">
+              <a:lnSpc>
+                <a:spcPct val="100000"/>
+              </a:lnSpc>
+              <a:spcBef>
+                <a:spcPts val="879"/>
+              </a:spcBef>
+            </a:pPr>
+            <a:endParaRPr b="0" lang="en-US" sz="5400" spc="-1" strike="noStrike">
+              <a:latin typeface="Arial"/>
+            </a:endParaRPr>
+          </a:p>
+          <a:p>
+            <a:pPr algn="just">
+              <a:lnSpc>
+                <a:spcPct val="100000"/>
+              </a:lnSpc>
+              <a:spcBef>
+                <a:spcPts val="879"/>
+              </a:spcBef>
+            </a:pPr>
+            <a:endParaRPr b="0" lang="en-US" sz="5400" spc="-1" strike="noStrike">
+              <a:latin typeface="Arial"/>
+            </a:endParaRPr>
+          </a:p>
+          <a:p>
+            <a:pPr algn="just">
+              <a:lnSpc>
+                <a:spcPct val="100000"/>
+              </a:lnSpc>
+              <a:spcBef>
+                <a:spcPts val="879"/>
+              </a:spcBef>
+            </a:pPr>
+            <a:endParaRPr b="0" lang="en-US" sz="5400" spc="-1" strike="noStrike">
+              <a:latin typeface="Arial"/>
+            </a:endParaRPr>
+          </a:p>
+          <a:p>
+            <a:pPr algn="just">
+              <a:lnSpc>
+                <a:spcPct val="100000"/>
+              </a:lnSpc>
+              <a:spcBef>
+                <a:spcPts val="879"/>
+              </a:spcBef>
+            </a:pPr>
+            <a:endParaRPr b="0" lang="en-US" sz="5400" spc="-1" strike="noStrike">
+              <a:latin typeface="Arial"/>
+            </a:endParaRPr>
+          </a:p>
+          <a:p>
+            <a:pPr algn="just">
+              <a:lnSpc>
+                <a:spcPct val="100000"/>
+              </a:lnSpc>
+              <a:spcBef>
+                <a:spcPts val="879"/>
+              </a:spcBef>
+            </a:pPr>
+            <a:endParaRPr b="0" lang="en-US" sz="5400" spc="-1" strike="noStrike">
+              <a:latin typeface="Arial"/>
+            </a:endParaRPr>
+          </a:p>
+          <a:p>
+            <a:pPr algn="just">
+              <a:lnSpc>
+                <a:spcPct val="100000"/>
+              </a:lnSpc>
+              <a:spcBef>
+                <a:spcPts val="879"/>
+              </a:spcBef>
+            </a:pPr>
+            <a:endParaRPr b="0" lang="en-US" sz="5400" spc="-1" strike="noStrike">
+              <a:latin typeface="Arial"/>
+            </a:endParaRPr>
+          </a:p>
+          <a:p>
+            <a:pPr algn="just">
+              <a:lnSpc>
+                <a:spcPct val="100000"/>
+              </a:lnSpc>
+              <a:spcBef>
+                <a:spcPts val="879"/>
+              </a:spcBef>
+            </a:pPr>
+            <a:endParaRPr b="0" lang="en-US" sz="5400" spc="-1" strike="noStrike">
+              <a:latin typeface="Arial"/>
+            </a:endParaRPr>
+          </a:p>
+          <a:p>
+            <a:pPr algn="just">
+              <a:lnSpc>
+                <a:spcPct val="100000"/>
+              </a:lnSpc>
+              <a:spcBef>
+                <a:spcPts val="879"/>
+              </a:spcBef>
+            </a:pPr>
+            <a:endParaRPr b="0" lang="en-US" sz="5400" spc="-1" strike="noStrike">
+              <a:latin typeface="Arial"/>
+            </a:endParaRPr>
+          </a:p>
+          <a:p>
+            <a:pPr algn="just">
+              <a:lnSpc>
+                <a:spcPct val="100000"/>
+              </a:lnSpc>
+              <a:spcBef>
+                <a:spcPts val="879"/>
+              </a:spcBef>
+            </a:pPr>
+            <a:endParaRPr b="0" lang="en-US" sz="5400" spc="-1" strike="noStrike">
+              <a:latin typeface="Arial"/>
+            </a:endParaRPr>
+          </a:p>
+          <a:p>
+            <a:pPr algn="just">
+              <a:lnSpc>
+                <a:spcPct val="100000"/>
+              </a:lnSpc>
+              <a:spcBef>
+                <a:spcPts val="879"/>
+              </a:spcBef>
+            </a:pPr>
+            <a:endParaRPr b="0" lang="en-US" sz="5400" spc="-1" strike="noStrike">
+              <a:latin typeface="Arial"/>
+            </a:endParaRPr>
+          </a:p>
+          <a:p>
+            <a:pPr algn="just">
+              <a:lnSpc>
+                <a:spcPct val="100000"/>
+              </a:lnSpc>
+              <a:spcBef>
+                <a:spcPts val="879"/>
+              </a:spcBef>
+            </a:pPr>
+            <a:endParaRPr b="0" lang="en-US" sz="5400" spc="-1" strike="noStrike">
+              <a:latin typeface="Arial"/>
+            </a:endParaRPr>
+          </a:p>
+          <a:p>
+            <a:pPr algn="just">
+              <a:lnSpc>
+                <a:spcPct val="100000"/>
+              </a:lnSpc>
+              <a:spcBef>
+                <a:spcPts val="879"/>
+              </a:spcBef>
+            </a:pPr>
+            <a:endParaRPr b="0" lang="en-US" sz="5400" spc="-1" strike="noStrike">
+              <a:latin typeface="Arial"/>
+            </a:endParaRPr>
+          </a:p>
+          <a:p>
+            <a:pPr algn="just">
+              <a:lnSpc>
+                <a:spcPct val="100000"/>
+              </a:lnSpc>
+              <a:spcBef>
+                <a:spcPts val="879"/>
+              </a:spcBef>
+            </a:pPr>
+            <a:endParaRPr b="0" lang="en-US" sz="5400" spc="-1" strike="noStrike">
+              <a:latin typeface="Arial"/>
+            </a:endParaRPr>
+          </a:p>
+          <a:p>
             <a:pPr>
               <a:lnSpc>
                 <a:spcPct val="100000"/>
@@ -2843,7 +3229,7 @@
             </a:endParaRPr>
           </a:p>
           <a:p>
-            <a:pPr marL="895320" indent="-894600">
+            <a:pPr marL="895320" indent="-894240">
               <a:lnSpc>
                 <a:spcPct val="100000"/>
               </a:lnSpc>
@@ -2862,6 +3248,7 @@
                   <a:srgbClr val="000000"/>
                 </a:solidFill>
                 <a:latin typeface="Arial Narrow"/>
+                <a:ea typeface="DejaVu Sans"/>
               </a:rPr>
               <a:t>Galaxy tools are grouped by function</a:t>
             </a:r>
@@ -2870,7 +3257,7 @@
             </a:endParaRPr>
           </a:p>
           <a:p>
-            <a:pPr marL="895320" indent="-894600">
+            <a:pPr marL="895320" indent="-894240">
               <a:lnSpc>
                 <a:spcPct val="100000"/>
               </a:lnSpc>
@@ -2889,6 +3276,7 @@
                   <a:srgbClr val="000000"/>
                 </a:solidFill>
                 <a:latin typeface="Arial Narrow"/>
+                <a:ea typeface="DejaVu Sans"/>
               </a:rPr>
               <a:t>Each tool function bridges two different states of data</a:t>
             </a:r>
@@ -2897,7 +3285,7 @@
             </a:endParaRPr>
           </a:p>
           <a:p>
-            <a:pPr marL="895320" indent="-894600">
+            <a:pPr marL="895320" indent="-894240">
               <a:lnSpc>
                 <a:spcPct val="100000"/>
               </a:lnSpc>
@@ -2916,6 +3304,7 @@
                   <a:srgbClr val="000000"/>
                 </a:solidFill>
                 <a:latin typeface="Arial Narrow"/>
+                <a:ea typeface="DejaVu Sans"/>
               </a:rPr>
               <a:t>Tools are chained on their input / output data formats</a:t>
             </a:r>
@@ -2924,7 +3313,7 @@
             </a:endParaRPr>
           </a:p>
           <a:p>
-            <a:pPr marL="895320" indent="-894600">
+            <a:pPr marL="895320" indent="-894240">
               <a:lnSpc>
                 <a:spcPct val="100000"/>
               </a:lnSpc>
@@ -2943,6 +3332,7 @@
                   <a:srgbClr val="000000"/>
                 </a:solidFill>
                 <a:latin typeface="Arial Narrow"/>
+                <a:ea typeface="DejaVu Sans"/>
               </a:rPr>
               <a:t>Galaxy tours recommends pertinent tools step by step</a:t>
             </a:r>
@@ -2951,7 +3341,7 @@
             </a:endParaRPr>
           </a:p>
           <a:p>
-            <a:pPr marL="895320" indent="-894600">
+            <a:pPr marL="895320" indent="-894240">
               <a:lnSpc>
                 <a:spcPct val="100000"/>
               </a:lnSpc>
@@ -2970,6 +3360,7 @@
                   <a:srgbClr val="000000"/>
                 </a:solidFill>
                 <a:latin typeface="Arial Narrow"/>
+                <a:ea typeface="DejaVu Sans"/>
               </a:rPr>
               <a:t>Users decide which tool to select and parametrize</a:t>
             </a:r>
@@ -2978,7 +3369,7 @@
             </a:endParaRPr>
           </a:p>
           <a:p>
-            <a:pPr marL="895320" indent="-894600">
+            <a:pPr marL="895320" indent="-894240">
               <a:lnSpc>
                 <a:spcPct val="100000"/>
               </a:lnSpc>
@@ -2997,9 +3388,56 @@
                   <a:srgbClr val="000000"/>
                 </a:solidFill>
                 <a:latin typeface="Arial Narrow"/>
+                <a:ea typeface="DejaVu Sans"/>
               </a:rPr>
               <a:t> </a:t>
             </a:r>
+            <a:endParaRPr b="0" lang="en-US" sz="600" spc="-1" strike="noStrike">
+              <a:latin typeface="Arial"/>
+            </a:endParaRPr>
+          </a:p>
+          <a:p>
+            <a:pPr marL="895320" indent="-894240">
+              <a:lnSpc>
+                <a:spcPct val="100000"/>
+              </a:lnSpc>
+              <a:spcBef>
+                <a:spcPts val="879"/>
+              </a:spcBef>
+              <a:buClr>
+                <a:srgbClr val="000000"/>
+              </a:buClr>
+              <a:buFont typeface="Arial"/>
+              <a:buChar char="•"/>
+            </a:pPr>
+            <a:r>
+              <a:rPr b="0" lang="en-US" sz="600" spc="-1" strike="noStrike">
+                <a:solidFill>
+                  <a:srgbClr val="000000"/>
+                </a:solidFill>
+                <a:latin typeface="Arial Narrow"/>
+                <a:ea typeface="DejaVu Sans"/>
+              </a:rPr>
+              <a:t> </a:t>
+            </a:r>
+            <a:endParaRPr b="0" lang="en-US" sz="600" spc="-1" strike="noStrike">
+              <a:latin typeface="Arial"/>
+            </a:endParaRPr>
+          </a:p>
+          <a:p>
+            <a:pPr marL="895320" indent="-894240">
+              <a:lnSpc>
+                <a:spcPct val="100000"/>
+              </a:lnSpc>
+              <a:spcBef>
+                <a:spcPts val="879"/>
+              </a:spcBef>
+              <a:buClr>
+                <a:srgbClr val="000000"/>
+              </a:buClr>
+              <a:buFont typeface="Arial"/>
+              <a:buChar char="•"/>
+            </a:pPr>
             <a:endParaRPr b="0" lang="en-US" sz="600" spc="-1" strike="noStrike">
               <a:latin typeface="Arial"/>
             </a:endParaRPr>
@@ -3019,6 +3457,7 @@
                   <a:srgbClr val="000000"/>
                 </a:solidFill>
                 <a:latin typeface="Arial Narrow"/>
+                <a:ea typeface="DejaVu Sans"/>
               </a:rPr>
               <a:t>Conclusion</a:t>
             </a:r>
@@ -3041,6 +3480,7 @@
                   <a:srgbClr val="000000"/>
                 </a:solidFill>
                 <a:latin typeface="Arial Narrow"/>
+                <a:ea typeface="DejaVu Sans"/>
               </a:rPr>
               <a:t>A recommendation system enhances the visibility of each Galaxy tool, relieving the user from browsing tool categories, or sticking to the usual analysis tools</a:t>
             </a:r>
@@ -3492,6 +3932,7 @@
                   <a:srgbClr val="000000"/>
                 </a:solidFill>
                 <a:latin typeface="Arial Narrow"/>
+                <a:ea typeface="DejaVu Sans"/>
               </a:rPr>
               <a:t>Tool pertinence is inferred from manually curated EDAM annotations, therefore a tool’s pertinence is as accurate as its bio.tools annotation</a:t>
             </a:r>
@@ -3500,7 +3941,20 @@
             </a:endParaRPr>
           </a:p>
           <a:p>
-            <a:pPr marL="895320" indent="-894600">
+            <a:pPr>
+              <a:lnSpc>
+                <a:spcPct val="100000"/>
+              </a:lnSpc>
+              <a:spcBef>
+                <a:spcPts val="879"/>
+              </a:spcBef>
+            </a:pPr>
+            <a:endParaRPr b="0" lang="en-US" sz="4400" spc="-1" strike="noStrike">
+              <a:latin typeface="Arial"/>
+            </a:endParaRPr>
+          </a:p>
+          <a:p>
+            <a:pPr marL="895320" indent="-894240">
               <a:lnSpc>
                 <a:spcPct val="100000"/>
               </a:lnSpc>
@@ -3513,12 +3967,22 @@
               <a:buFont typeface="Arial"/>
               <a:buChar char="•"/>
             </a:pPr>
-            <a:endParaRPr b="0" lang="en-US" sz="4400" spc="-1" strike="noStrike">
-              <a:latin typeface="Arial"/>
-            </a:endParaRPr>
-          </a:p>
-          <a:p>
-            <a:pPr marL="895320" indent="-894600">
+            <a:r>
+              <a:rPr b="0" lang="en-US" sz="600" spc="-1" strike="noStrike">
+                <a:solidFill>
+                  <a:srgbClr val="000000"/>
+                </a:solidFill>
+                <a:latin typeface="Arial Narrow"/>
+                <a:ea typeface="DejaVu Sans"/>
+              </a:rPr>
+              <a:t> </a:t>
+            </a:r>
+            <a:endParaRPr b="0" lang="en-US" sz="600" spc="-1" strike="noStrike">
+              <a:latin typeface="Arial"/>
+            </a:endParaRPr>
+          </a:p>
+          <a:p>
+            <a:pPr marL="895320" indent="-894240">
               <a:lnSpc>
                 <a:spcPct val="100000"/>
               </a:lnSpc>
@@ -3537,6 +4001,7 @@
                   <a:srgbClr val="000000"/>
                 </a:solidFill>
                 <a:latin typeface="Arial Narrow"/>
+                <a:ea typeface="DejaVu Sans"/>
               </a:rPr>
               <a:t> </a:t>
             </a:r>
@@ -3559,6 +4024,7 @@
                   <a:srgbClr val="000000"/>
                 </a:solidFill>
                 <a:latin typeface="Arial Narrow"/>
+                <a:ea typeface="DejaVu Sans"/>
               </a:rPr>
               <a:t>References</a:t>
             </a:r>
@@ -3581,6 +4047,7 @@
                   <a:srgbClr val="000000"/>
                 </a:solidFill>
                 <a:latin typeface="Arial Narrow"/>
+                <a:ea typeface="DejaVu Sans"/>
               </a:rPr>
               <a:t>Lott SC et al. Customized workflow development and data modularization concepts for RNA-Sequencing and metatranscriptome experiments. Journal of Biotechnology, 2017. </a:t>
             </a:r>
@@ -3590,6 +4057,7 @@
                   <a:srgbClr val="3465a4"/>
                 </a:solidFill>
                 <a:latin typeface="Arial Narrow"/>
+                <a:ea typeface="DejaVu Sans"/>
               </a:rPr>
               <a:t>10.1016/j.jbiotec.2017.06.1203</a:t>
             </a:r>
@@ -3607,8 +4075,8 @@
         </p:nvSpPr>
         <p:spPr>
           <a:xfrm>
-            <a:off x="2959200" y="24991200"/>
-            <a:ext cx="7589520" cy="2834640"/>
+            <a:off x="2959200" y="25387200"/>
+            <a:ext cx="7589160" cy="2834280"/>
           </a:xfrm>
           <a:prstGeom prst="rect">
             <a:avLst/>
@@ -3638,8 +4106,8 @@
         </p:nvSpPr>
         <p:spPr>
           <a:xfrm>
-            <a:off x="2959200" y="28843200"/>
-            <a:ext cx="7589520" cy="2834640"/>
+            <a:off x="2959200" y="29239200"/>
+            <a:ext cx="7589160" cy="2834280"/>
           </a:xfrm>
           <a:prstGeom prst="rect">
             <a:avLst/>
@@ -3669,8 +4137,8 @@
         </p:nvSpPr>
         <p:spPr>
           <a:xfrm>
-            <a:off x="2959200" y="32659200"/>
-            <a:ext cx="7589520" cy="2834640"/>
+            <a:off x="2959200" y="33055200"/>
+            <a:ext cx="7589160" cy="2834280"/>
           </a:xfrm>
           <a:prstGeom prst="rect">
             <a:avLst/>
@@ -3694,14 +4162,14 @@
       </p:sp>
       <p:sp>
         <p:nvSpPr>
-          <p:cNvPr id="55" name="TextShape 13"/>
-          <p:cNvSpPr txBox="1"/>
+          <p:cNvPr id="55" name="CustomShape 13"/>
+          <p:cNvSpPr/>
           <p:nvPr/>
         </p:nvSpPr>
         <p:spPr>
           <a:xfrm>
-            <a:off x="3144960" y="25752960"/>
-            <a:ext cx="7292880" cy="1499040"/>
+            <a:off x="3144960" y="26004960"/>
+            <a:ext cx="7292520" cy="1498680"/>
           </a:xfrm>
           <a:prstGeom prst="rect">
             <a:avLst/>
@@ -3711,6 +4179,12 @@
             <a:noFill/>
           </a:ln>
         </p:spPr>
+        <p:style>
+          <a:lnRef idx="0"/>
+          <a:fillRef idx="0"/>
+          <a:effectRef idx="0"/>
+          <a:fontRef idx="minor"/>
+        </p:style>
         <p:txBody>
           <a:bodyPr lIns="90000" rIns="90000" tIns="45000" bIns="45000"/>
           <a:p>
@@ -3732,22 +4206,21 @@
               <a:t>Tool chaining and parametrization  through Galaxy’s interactive tours</a:t>
             </a:r>
             <a:endParaRPr b="0" lang="en-US" sz="4400" spc="-1" strike="noStrike">
-              <a:latin typeface="Arial Narrow"/>
-              <a:ea typeface="Noto Sans CJK SC Regular"/>
+              <a:latin typeface="Arial"/>
             </a:endParaRPr>
           </a:p>
         </p:txBody>
       </p:sp>
       <p:sp>
         <p:nvSpPr>
-          <p:cNvPr id="56" name="TextShape 14"/>
-          <p:cNvSpPr txBox="1"/>
+          <p:cNvPr id="56" name="CustomShape 14"/>
+          <p:cNvSpPr/>
           <p:nvPr/>
         </p:nvSpPr>
         <p:spPr>
           <a:xfrm>
-            <a:off x="3147840" y="29676960"/>
-            <a:ext cx="7290000" cy="1217160"/>
+            <a:off x="3147840" y="29856960"/>
+            <a:ext cx="7289640" cy="1216800"/>
           </a:xfrm>
           <a:prstGeom prst="rect">
             <a:avLst/>
@@ -3757,6 +4230,12 @@
             <a:noFill/>
           </a:ln>
         </p:spPr>
+        <p:style>
+          <a:lnRef idx="0"/>
+          <a:fillRef idx="0"/>
+          <a:effectRef idx="0"/>
+          <a:fontRef idx="minor"/>
+        </p:style>
         <p:txBody>
           <a:bodyPr lIns="90000" rIns="90000" tIns="45000" bIns="45000"/>
           <a:p>
@@ -3769,49 +4248,7 @@
               <a:rPr b="0" lang="en-US" sz="4400" spc="-1" strike="noStrike">
                 <a:latin typeface="Arial Narrow"/>
               </a:rPr>
-              <a:t>Tool </a:t>
-            </a:r>
-            <a:r>
-              <a:rPr b="0" lang="en-US" sz="4400" spc="-1" strike="noStrike">
-                <a:latin typeface="Arial Narrow"/>
-              </a:rPr>
-              <a:t>operations </a:t>
-            </a:r>
-            <a:r>
-              <a:rPr b="0" lang="en-US" sz="4400" spc="-1" strike="noStrike">
-                <a:latin typeface="Arial Narrow"/>
-              </a:rPr>
-              <a:t>and input / </a:t>
-            </a:r>
-            <a:r>
-              <a:rPr b="0" lang="en-US" sz="4400" spc="-1" strike="noStrike">
-                <a:latin typeface="Arial Narrow"/>
-              </a:rPr>
-              <a:t>output </a:t>
-            </a:r>
-            <a:r>
-              <a:rPr b="0" lang="en-US" sz="4400" spc="-1" strike="noStrike">
-                <a:latin typeface="Arial Narrow"/>
-              </a:rPr>
-              <a:t>formats </a:t>
-            </a:r>
-            <a:r>
-              <a:rPr b="0" lang="en-US" sz="4400" spc="-1" strike="noStrike">
-                <a:latin typeface="Arial Narrow"/>
-              </a:rPr>
-              <a:t>through </a:t>
-            </a:r>
-            <a:r>
-              <a:rPr b="0" lang="en-US" sz="4400" spc="-1" strike="noStrike">
-                <a:latin typeface="Arial Narrow"/>
-              </a:rPr>
-              <a:t>Elixir’s </a:t>
-            </a:r>
-            <a:r>
-              <a:rPr b="0" lang="en-US" sz="4400" spc="-1" strike="noStrike">
-                <a:latin typeface="Arial Narrow"/>
-              </a:rPr>
-              <a:t>bio.tools</a:t>
+              <a:t>Tool operations and input / output formats through Elixir’s bio.tools</a:t>
             </a:r>
             <a:endParaRPr b="0" lang="en-US" sz="4400" spc="-1" strike="noStrike">
               <a:latin typeface="Arial"/>
@@ -3821,14 +4258,14 @@
       </p:sp>
       <p:sp>
         <p:nvSpPr>
-          <p:cNvPr id="57" name="TextShape 15"/>
-          <p:cNvSpPr txBox="1"/>
+          <p:cNvPr id="57" name="CustomShape 15"/>
+          <p:cNvSpPr/>
           <p:nvPr/>
         </p:nvSpPr>
         <p:spPr>
           <a:xfrm>
-            <a:off x="3142080" y="33459120"/>
-            <a:ext cx="7223760" cy="1645920"/>
+            <a:off x="3142080" y="33675120"/>
+            <a:ext cx="7223400" cy="1645560"/>
           </a:xfrm>
           <a:prstGeom prst="rect">
             <a:avLst/>
@@ -3838,6 +4275,12 @@
             <a:noFill/>
           </a:ln>
         </p:spPr>
+        <p:style>
+          <a:lnRef idx="0"/>
+          <a:fillRef idx="0"/>
+          <a:effectRef idx="0"/>
+          <a:fontRef idx="minor"/>
+        </p:style>
         <p:txBody>
           <a:bodyPr lIns="90000" rIns="90000" tIns="45000" bIns="45000"/>
           <a:p>
@@ -3850,70 +4293,10 @@
               <a:rPr b="0" lang="en-US" sz="4400" spc="-1" strike="noStrike">
                 <a:latin typeface="Arial Narrow"/>
               </a:rPr>
-              <a:t>Best </a:t>
-            </a:r>
-            <a:r>
-              <a:rPr b="0" lang="en-US" sz="4400" spc="-1" strike="noStrike">
-                <a:latin typeface="Arial Narrow"/>
-              </a:rPr>
-              <a:t>practic</a:t>
-            </a:r>
-            <a:r>
-              <a:rPr b="0" lang="en-US" sz="4400" spc="-1" strike="noStrike">
-                <a:latin typeface="Arial Narrow"/>
-              </a:rPr>
-              <a:t>es and </a:t>
-            </a:r>
-            <a:r>
-              <a:rPr b="0" lang="en-US" sz="4400" spc="-1" strike="noStrike">
-                <a:latin typeface="Arial Narrow"/>
-              </a:rPr>
-              <a:t>user-</a:t>
-            </a:r>
-            <a:r>
-              <a:rPr b="0" lang="en-US" sz="4400" spc="-1" strike="noStrike">
-                <a:latin typeface="Arial Narrow"/>
-              </a:rPr>
-              <a:t>tracke</a:t>
-            </a:r>
-            <a:r>
-              <a:rPr b="0" lang="en-US" sz="4400" spc="-1" strike="noStrike">
-                <a:latin typeface="Arial Narrow"/>
-              </a:rPr>
-              <a:t>d data </a:t>
-            </a:r>
-            <a:r>
-              <a:rPr b="0" lang="en-US" sz="4400" spc="-1" strike="noStrike">
-                <a:latin typeface="Arial Narrow"/>
-              </a:rPr>
-              <a:t>of </a:t>
-            </a:r>
-            <a:r>
-              <a:rPr b="0" lang="en-US" sz="4400" spc="-1" strike="noStrike">
-                <a:latin typeface="Arial Narrow"/>
-              </a:rPr>
-              <a:t>RBC’s </a:t>
-            </a:r>
-            <a:r>
-              <a:rPr b="0" lang="en-US" sz="4400" spc="-1" strike="noStrike">
-                <a:latin typeface="Arial Narrow"/>
-              </a:rPr>
-              <a:t>Galaxy </a:t>
-            </a:r>
-            <a:r>
-              <a:rPr b="0" lang="en-US" sz="4400" spc="-1" strike="noStrike">
-                <a:latin typeface="Arial Narrow"/>
-              </a:rPr>
-              <a:t>instanc</a:t>
-            </a:r>
-            <a:r>
-              <a:rPr b="0" lang="en-US" sz="4400" spc="-1" strike="noStrike">
-                <a:latin typeface="Arial Narrow"/>
-              </a:rPr>
-              <a:t>e</a:t>
-            </a:r>
-            <a:endParaRPr b="0" lang="en-US" sz="4400" spc="-1" strike="noStrike">
-              <a:latin typeface="Arial Narrow"/>
+              <a:t>Best practices and user-tracked data of RBC’s Galaxy instance</a:t>
+            </a:r>
+            <a:endParaRPr b="0" lang="en-US" sz="4400" spc="-1" strike="noStrike">
+              <a:latin typeface="Arial"/>
             </a:endParaRPr>
           </a:p>
         </p:txBody>
@@ -3931,7 +4314,7 @@
         <p:spPr>
           <a:xfrm>
             <a:off x="2250000" y="39322080"/>
-            <a:ext cx="9401760" cy="1946520"/>
+            <a:ext cx="9401400" cy="1946160"/>
           </a:xfrm>
           <a:prstGeom prst="rect">
             <a:avLst/>
@@ -3943,14 +4326,14 @@
       </p:pic>
       <p:sp>
         <p:nvSpPr>
-          <p:cNvPr id="59" name="TextShape 16"/>
-          <p:cNvSpPr txBox="1"/>
+          <p:cNvPr id="59" name="CustomShape 16"/>
+          <p:cNvSpPr/>
           <p:nvPr/>
         </p:nvSpPr>
         <p:spPr>
           <a:xfrm>
-            <a:off x="11801880" y="39322080"/>
-            <a:ext cx="6267960" cy="1996200"/>
+            <a:off x="11693880" y="39214080"/>
+            <a:ext cx="6267600" cy="1995840"/>
           </a:xfrm>
           <a:prstGeom prst="rect">
             <a:avLst/>
@@ -3960,16 +4343,22 @@
             <a:noFill/>
           </a:ln>
         </p:spPr>
+        <p:style>
+          <a:lnRef idx="0"/>
+          <a:fillRef idx="0"/>
+          <a:effectRef idx="0"/>
+          <a:fontRef idx="minor"/>
+        </p:style>
         <p:txBody>
           <a:bodyPr lIns="90000" rIns="90000" tIns="45000" bIns="45000"/>
           <a:p>
             <a:pPr algn="just">
               <a:lnSpc>
-                <a:spcPct val="115000"/>
-              </a:lnSpc>
-            </a:pPr>
-            <a:r>
-              <a:rPr b="0" lang="en-US" sz="3600" spc="-1" strike="noStrike">
+                <a:spcPct val="100000"/>
+              </a:lnSpc>
+            </a:pPr>
+            <a:r>
+              <a:rPr b="0" lang="en-US" sz="3200" spc="-1" strike="noStrike">
                 <a:solidFill>
                   <a:srgbClr val="ffffff"/>
                 </a:solidFill>
@@ -3977,21 +4366,18 @@
               </a:rPr>
               <a:t>Systems Biology and Bioinformatics</a:t>
             </a:r>
-            <a:endParaRPr b="0" lang="en-US" sz="3600" spc="-1" strike="noStrike">
-              <a:solidFill>
-                <a:srgbClr val="ffffff"/>
-              </a:solidFill>
-              <a:latin typeface="Arial Narrow"/>
-            </a:endParaRPr>
-          </a:p>
-          <a:p>
-            <a:pPr algn="just">
-              <a:lnSpc>
-                <a:spcPct val="115000"/>
-              </a:lnSpc>
-            </a:pPr>
-            <a:r>
-              <a:rPr b="0" lang="en-US" sz="3600" spc="-1" strike="noStrike">
+            <a:endParaRPr b="0" lang="en-US" sz="3200" spc="-1" strike="noStrike">
+              <a:latin typeface="Arial"/>
+            </a:endParaRPr>
+          </a:p>
+          <a:p>
+            <a:pPr algn="just">
+              <a:lnSpc>
+                <a:spcPct val="100000"/>
+              </a:lnSpc>
+            </a:pPr>
+            <a:r>
+              <a:rPr b="0" lang="en-US" sz="3200" spc="-1" strike="noStrike">
                 <a:solidFill>
                   <a:srgbClr val="ffffff"/>
                 </a:solidFill>
@@ -3999,21 +4385,18 @@
               </a:rPr>
               <a:t>University of Rostock</a:t>
             </a:r>
-            <a:endParaRPr b="0" lang="en-US" sz="3600" spc="-1" strike="noStrike">
-              <a:solidFill>
-                <a:srgbClr val="ffffff"/>
-              </a:solidFill>
-              <a:latin typeface="Arial Narrow"/>
-            </a:endParaRPr>
-          </a:p>
-          <a:p>
-            <a:pPr algn="just">
-              <a:lnSpc>
-                <a:spcPct val="115000"/>
-              </a:lnSpc>
-            </a:pPr>
-            <a:r>
-              <a:rPr b="0" lang="en-US" sz="3600" spc="-1" strike="noStrike">
+            <a:endParaRPr b="0" lang="en-US" sz="3200" spc="-1" strike="noStrike">
+              <a:latin typeface="Arial"/>
+            </a:endParaRPr>
+          </a:p>
+          <a:p>
+            <a:pPr algn="just">
+              <a:lnSpc>
+                <a:spcPct val="100000"/>
+              </a:lnSpc>
+            </a:pPr>
+            <a:r>
+              <a:rPr b="0" lang="en-US" sz="3200" spc="-1" strike="noStrike">
                 <a:solidFill>
                   <a:srgbClr val="ffffff"/>
                 </a:solidFill>
@@ -4021,21 +4404,18 @@
               </a:rPr>
               <a:t>Ulmenstr. 69, 18051 Rostock</a:t>
             </a:r>
-            <a:endParaRPr b="0" lang="en-US" sz="3600" spc="-1" strike="noStrike">
-              <a:solidFill>
-                <a:srgbClr val="ffffff"/>
-              </a:solidFill>
-              <a:latin typeface="Arial Narrow"/>
-            </a:endParaRPr>
-          </a:p>
-          <a:p>
-            <a:pPr algn="just">
-              <a:lnSpc>
-                <a:spcPct val="115000"/>
-              </a:lnSpc>
-            </a:pPr>
-            <a:r>
-              <a:rPr b="1" lang="en-US" sz="3600" spc="-1" strike="noStrike">
+            <a:endParaRPr b="0" lang="en-US" sz="3200" spc="-1" strike="noStrike">
+              <a:latin typeface="Arial"/>
+            </a:endParaRPr>
+          </a:p>
+          <a:p>
+            <a:pPr algn="just">
+              <a:lnSpc>
+                <a:spcPct val="100000"/>
+              </a:lnSpc>
+            </a:pPr>
+            <a:r>
+              <a:rPr b="1" lang="en-US" sz="3200" spc="-1" strike="noStrike">
                 <a:solidFill>
                   <a:srgbClr val="ffffff"/>
                 </a:solidFill>
@@ -4043,11 +4423,8 @@
               </a:rPr>
               <a:t>www.sbi.uni-rostock.de</a:t>
             </a:r>
-            <a:endParaRPr b="0" lang="en-US" sz="3600" spc="-1" strike="noStrike">
-              <a:solidFill>
-                <a:srgbClr val="ffffff"/>
-              </a:solidFill>
-              <a:latin typeface="Arial Narrow"/>
+            <a:endParaRPr b="0" lang="en-US" sz="3200" spc="-1" strike="noStrike">
+              <a:latin typeface="Arial"/>
             </a:endParaRPr>
           </a:p>
         </p:txBody>
@@ -4064,8 +4441,8 @@
         </p:blipFill>
         <p:spPr>
           <a:xfrm>
-            <a:off x="11194560" y="28890000"/>
-            <a:ext cx="1807560" cy="1792800"/>
+            <a:off x="11590560" y="29286000"/>
+            <a:ext cx="1807200" cy="1792440"/>
           </a:xfrm>
           <a:prstGeom prst="rect">
             <a:avLst/>
@@ -4087,8 +4464,8 @@
         </p:blipFill>
         <p:spPr>
           <a:xfrm>
-            <a:off x="11136240" y="24998760"/>
-            <a:ext cx="1981080" cy="2004120"/>
+            <a:off x="11532240" y="25394760"/>
+            <a:ext cx="1980720" cy="2003760"/>
           </a:xfrm>
           <a:prstGeom prst="rect">
             <a:avLst/>
@@ -4110,8 +4487,8 @@
         </p:blipFill>
         <p:spPr>
           <a:xfrm>
-            <a:off x="11090160" y="32644800"/>
-            <a:ext cx="2129760" cy="3011040"/>
+            <a:off x="11486160" y="33040800"/>
+            <a:ext cx="2129400" cy="3010680"/>
           </a:xfrm>
           <a:prstGeom prst="rect">
             <a:avLst/>
@@ -4123,14 +4500,14 @@
       </p:pic>
       <p:sp>
         <p:nvSpPr>
-          <p:cNvPr id="63" name="TextShape 17"/>
-          <p:cNvSpPr txBox="1"/>
+          <p:cNvPr id="63" name="CustomShape 17"/>
+          <p:cNvSpPr/>
           <p:nvPr/>
         </p:nvSpPr>
         <p:spPr>
           <a:xfrm>
-            <a:off x="11097360" y="35019360"/>
-            <a:ext cx="2286000" cy="640080"/>
+            <a:off x="11493360" y="35415360"/>
+            <a:ext cx="2285640" cy="639720"/>
           </a:xfrm>
           <a:prstGeom prst="rect">
             <a:avLst/>
@@ -4140,10 +4517,20 @@
             <a:noFill/>
           </a:ln>
         </p:spPr>
+        <p:style>
+          <a:lnRef idx="0"/>
+          <a:fillRef idx="0"/>
+          <a:effectRef idx="0"/>
+          <a:fontRef idx="minor"/>
+        </p:style>
         <p:txBody>
           <a:bodyPr lIns="90000" rIns="90000" tIns="45000" bIns="45000"/>
           <a:p>
-            <a:pPr algn="just"/>
+            <a:pPr algn="just">
+              <a:lnSpc>
+                <a:spcPct val="100000"/>
+              </a:lnSpc>
+            </a:pPr>
             <a:r>
               <a:rPr b="0" lang="en-US" sz="3200" spc="-1" strike="noStrike">
                 <a:solidFill>
@@ -4154,24 +4541,21 @@
               <a:t>denbi.de/rbc</a:t>
             </a:r>
             <a:endParaRPr b="0" lang="en-US" sz="3200" spc="-1" strike="noStrike">
-              <a:solidFill>
-                <a:srgbClr val="3465a4"/>
-              </a:solidFill>
-              <a:latin typeface="Arial Narrow"/>
+              <a:latin typeface="Arial"/>
             </a:endParaRPr>
           </a:p>
         </p:txBody>
       </p:sp>
       <p:sp>
         <p:nvSpPr>
-          <p:cNvPr id="64" name="TextShape 18"/>
-          <p:cNvSpPr txBox="1"/>
+          <p:cNvPr id="64" name="CustomShape 18"/>
+          <p:cNvSpPr/>
           <p:nvPr/>
         </p:nvSpPr>
         <p:spPr>
           <a:xfrm>
-            <a:off x="11097360" y="31131360"/>
-            <a:ext cx="3108960" cy="852120"/>
+            <a:off x="11493360" y="31635360"/>
+            <a:ext cx="3108600" cy="851760"/>
           </a:xfrm>
           <a:prstGeom prst="rect">
             <a:avLst/>
@@ -4181,10 +4565,20 @@
             <a:noFill/>
           </a:ln>
         </p:spPr>
+        <p:style>
+          <a:lnRef idx="0"/>
+          <a:fillRef idx="0"/>
+          <a:effectRef idx="0"/>
+          <a:fontRef idx="minor"/>
+        </p:style>
         <p:txBody>
           <a:bodyPr lIns="90000" rIns="90000" tIns="45000" bIns="45000"/>
           <a:p>
-            <a:pPr algn="just"/>
+            <a:pPr algn="just">
+              <a:lnSpc>
+                <a:spcPct val="100000"/>
+              </a:lnSpc>
+            </a:pPr>
             <a:r>
               <a:rPr b="0" lang="en-US" sz="3200" spc="-1" strike="noStrike">
                 <a:solidFill>
@@ -4195,24 +4589,21 @@
               <a:t>edamontology.org</a:t>
             </a:r>
             <a:endParaRPr b="0" lang="en-US" sz="3200" spc="-1" strike="noStrike">
-              <a:solidFill>
-                <a:srgbClr val="3465a4"/>
-              </a:solidFill>
-              <a:latin typeface="Arial Narrow"/>
+              <a:latin typeface="Arial"/>
             </a:endParaRPr>
           </a:p>
         </p:txBody>
       </p:sp>
       <p:sp>
         <p:nvSpPr>
-          <p:cNvPr id="65" name="TextShape 19"/>
-          <p:cNvSpPr txBox="1"/>
+          <p:cNvPr id="65" name="CustomShape 19"/>
+          <p:cNvSpPr/>
           <p:nvPr/>
         </p:nvSpPr>
         <p:spPr>
           <a:xfrm>
-            <a:off x="11097360" y="27387720"/>
-            <a:ext cx="3108960" cy="852120"/>
+            <a:off x="11493360" y="27783720"/>
+            <a:ext cx="3108600" cy="851760"/>
           </a:xfrm>
           <a:prstGeom prst="rect">
             <a:avLst/>
@@ -4222,10 +4613,20 @@
             <a:noFill/>
           </a:ln>
         </p:spPr>
+        <p:style>
+          <a:lnRef idx="0"/>
+          <a:fillRef idx="0"/>
+          <a:effectRef idx="0"/>
+          <a:fontRef idx="minor"/>
+        </p:style>
         <p:txBody>
           <a:bodyPr lIns="90000" rIns="90000" tIns="45000" bIns="45000"/>
           <a:p>
-            <a:pPr algn="just"/>
+            <a:pPr algn="just">
+              <a:lnSpc>
+                <a:spcPct val="100000"/>
+              </a:lnSpc>
+            </a:pPr>
             <a:r>
               <a:rPr b="0" lang="en-US" sz="3200" spc="-1" strike="noStrike">
                 <a:solidFill>
@@ -4236,10 +4637,7 @@
               <a:t>galaxyproject.org</a:t>
             </a:r>
             <a:endParaRPr b="0" lang="en-US" sz="3200" spc="-1" strike="noStrike">
-              <a:solidFill>
-                <a:srgbClr val="3465a4"/>
-              </a:solidFill>
-              <a:latin typeface="Arial Narrow"/>
+              <a:latin typeface="Arial"/>
             </a:endParaRPr>
           </a:p>
         </p:txBody>
@@ -4256,8 +4654,8 @@
         </p:blipFill>
         <p:spPr>
           <a:xfrm>
-            <a:off x="3096360" y="36383760"/>
-            <a:ext cx="1671480" cy="1671480"/>
+            <a:off x="3096360" y="36995760"/>
+            <a:ext cx="1671120" cy="1671120"/>
           </a:xfrm>
           <a:prstGeom prst="rect">
             <a:avLst/>
@@ -4269,14 +4667,14 @@
       </p:pic>
       <p:sp>
         <p:nvSpPr>
-          <p:cNvPr id="67" name="TextShape 20"/>
-          <p:cNvSpPr txBox="1"/>
+          <p:cNvPr id="67" name="CustomShape 20"/>
+          <p:cNvSpPr/>
           <p:nvPr/>
         </p:nvSpPr>
         <p:spPr>
           <a:xfrm>
-            <a:off x="5069520" y="36717840"/>
-            <a:ext cx="2907000" cy="614520"/>
+            <a:off x="5069520" y="37329840"/>
+            <a:ext cx="2906640" cy="614160"/>
           </a:xfrm>
           <a:prstGeom prst="rect">
             <a:avLst/>
@@ -4286,10 +4684,20 @@
             <a:noFill/>
           </a:ln>
         </p:spPr>
+        <p:style>
+          <a:lnRef idx="0"/>
+          <a:fillRef idx="0"/>
+          <a:effectRef idx="0"/>
+          <a:fontRef idx="minor"/>
+        </p:style>
         <p:txBody>
           <a:bodyPr lIns="90000" rIns="90000" tIns="45000" bIns="45000"/>
           <a:p>
-            <a:pPr algn="just"/>
+            <a:pPr algn="just">
+              <a:lnSpc>
+                <a:spcPct val="100000"/>
+              </a:lnSpc>
+            </a:pPr>
             <a:r>
               <a:rPr b="1" lang="en-US" sz="4400" spc="-1" strike="noStrike">
                 <a:latin typeface="Arial Narrow"/>
@@ -4304,14 +4712,14 @@
       </p:sp>
       <p:sp>
         <p:nvSpPr>
-          <p:cNvPr id="68" name="TextShape 21"/>
-          <p:cNvSpPr txBox="1"/>
+          <p:cNvPr id="68" name="CustomShape 21"/>
+          <p:cNvSpPr/>
           <p:nvPr/>
         </p:nvSpPr>
         <p:spPr>
           <a:xfrm>
-            <a:off x="5069880" y="37330200"/>
-            <a:ext cx="4124880" cy="471240"/>
+            <a:off x="5069880" y="37942200"/>
+            <a:ext cx="4124520" cy="470880"/>
           </a:xfrm>
           <a:prstGeom prst="rect">
             <a:avLst/>
@@ -4321,10 +4729,20 @@
             <a:noFill/>
           </a:ln>
         </p:spPr>
+        <p:style>
+          <a:lnRef idx="0"/>
+          <a:fillRef idx="0"/>
+          <a:effectRef idx="0"/>
+          <a:fontRef idx="minor"/>
+        </p:style>
         <p:txBody>
           <a:bodyPr lIns="90000" rIns="90000" tIns="45000" bIns="45000"/>
           <a:p>
-            <a:pPr algn="just"/>
+            <a:pPr algn="just">
+              <a:lnSpc>
+                <a:spcPct val="100000"/>
+              </a:lnSpc>
+            </a:pPr>
             <a:r>
               <a:rPr b="0" lang="en-US" sz="3200" spc="-1" strike="noStrike">
                 <a:latin typeface="Arial Narrow"/>
@@ -4349,8 +4767,8 @@
         </p:blipFill>
         <p:spPr>
           <a:xfrm>
-            <a:off x="9047880" y="35337600"/>
-            <a:ext cx="5564520" cy="3931920"/>
+            <a:off x="9047880" y="36021600"/>
+            <a:ext cx="5564160" cy="3931560"/>
           </a:xfrm>
           <a:prstGeom prst="rect">
             <a:avLst/>
@@ -4372,8 +4790,8 @@
         </p:blipFill>
         <p:spPr>
           <a:xfrm>
-            <a:off x="25584480" y="39359520"/>
-            <a:ext cx="2484000" cy="1856880"/>
+            <a:off x="26052480" y="39539520"/>
+            <a:ext cx="1944720" cy="1453680"/>
           </a:xfrm>
           <a:prstGeom prst="rect">
             <a:avLst/>
@@ -4395,8 +4813,8 @@
         </p:blipFill>
         <p:spPr>
           <a:xfrm>
-            <a:off x="22020480" y="39410640"/>
-            <a:ext cx="3436920" cy="1773360"/>
+            <a:off x="22956480" y="39518640"/>
+            <a:ext cx="2981520" cy="1538280"/>
           </a:xfrm>
           <a:prstGeom prst="rect">
             <a:avLst/>
@@ -4418,8 +4836,8 @@
         </p:blipFill>
         <p:spPr>
           <a:xfrm>
-            <a:off x="15365160" y="11208600"/>
-            <a:ext cx="12715920" cy="7849800"/>
+            <a:off x="15257160" y="11244600"/>
+            <a:ext cx="12715560" cy="7849440"/>
           </a:xfrm>
           <a:prstGeom prst="rect">
             <a:avLst/>
@@ -4437,8 +4855,8 @@
         </p:nvSpPr>
         <p:spPr>
           <a:xfrm>
-            <a:off x="6858000" y="27825840"/>
-            <a:ext cx="0" cy="1017360"/>
+            <a:off x="6858000" y="28221840"/>
+            <a:ext cx="360" cy="1017360"/>
           </a:xfrm>
           <a:prstGeom prst="line">
             <a:avLst/>
@@ -4465,8 +4883,8 @@
         </p:nvSpPr>
         <p:spPr>
           <a:xfrm>
-            <a:off x="6858000" y="31673160"/>
-            <a:ext cx="0" cy="1017360"/>
+            <a:off x="6858000" y="32069160"/>
+            <a:ext cx="360" cy="1017360"/>
           </a:xfrm>
           <a:prstGeom prst="line">
             <a:avLst/>
@@ -4487,14 +4905,14 @@
       </p:sp>
       <p:sp>
         <p:nvSpPr>
-          <p:cNvPr id="75" name="TextShape 24"/>
-          <p:cNvSpPr txBox="1"/>
+          <p:cNvPr id="75" name="CustomShape 24"/>
+          <p:cNvSpPr/>
           <p:nvPr/>
         </p:nvSpPr>
         <p:spPr>
           <a:xfrm>
-            <a:off x="15472800" y="28779120"/>
-            <a:ext cx="11247120" cy="914400"/>
+            <a:off x="15472800" y="28707120"/>
+            <a:ext cx="11246760" cy="914040"/>
           </a:xfrm>
           <a:prstGeom prst="rect">
             <a:avLst/>
@@ -4504,10 +4922,20 @@
             <a:noFill/>
           </a:ln>
         </p:spPr>
+        <p:style>
+          <a:lnRef idx="0"/>
+          <a:fillRef idx="0"/>
+          <a:effectRef idx="0"/>
+          <a:fontRef idx="minor"/>
+        </p:style>
         <p:txBody>
           <a:bodyPr lIns="90000" rIns="90000" tIns="45000" bIns="45000"/>
           <a:p>
-            <a:pPr algn="just"/>
+            <a:pPr algn="just">
+              <a:lnSpc>
+                <a:spcPct val="100000"/>
+              </a:lnSpc>
+            </a:pPr>
             <a:r>
               <a:rPr b="0" lang="en-US" sz="3200" spc="-1" strike="noStrike">
                 <a:solidFill>
@@ -4515,31 +4943,10 @@
                 </a:solidFill>
                 <a:latin typeface="Arial Narrow"/>
               </a:rPr>
-              <a:t>Transcription factors and regulatory sites &gt; </a:t>
-            </a:r>
-            <a:r>
-              <a:rPr b="0" lang="en-US" sz="3200" spc="-1" strike="noStrike">
-                <a:solidFill>
-                  <a:srgbClr val="3465a4"/>
-                </a:solidFill>
-                <a:latin typeface="Arial Narrow"/>
-              </a:rPr>
-              <a:t>Functional, regulatory, and non-coding RNA &gt; </a:t>
-            </a:r>
-            <a:r>
-              <a:rPr b="0" lang="en-US" sz="3200" spc="-1" strike="noStrike">
-                <a:solidFill>
-                  <a:srgbClr val="3465a4"/>
-                </a:solidFill>
-                <a:latin typeface="Arial Narrow"/>
-              </a:rPr>
-              <a:t>RNA</a:t>
+              <a:t>Transcription factors and regulatory sites &gt; Functional, regulatory, and non-coding RNA &gt; RNA</a:t>
             </a:r>
             <a:endParaRPr b="0" lang="en-US" sz="3200" spc="-1" strike="noStrike">
-              <a:solidFill>
-                <a:srgbClr val="3465a4"/>
-              </a:solidFill>
-              <a:latin typeface="Arial Narrow"/>
+              <a:latin typeface="Arial"/>
             </a:endParaRPr>
           </a:p>
         </p:txBody>
@@ -4556,8 +4963,8 @@
         </p:blipFill>
         <p:spPr>
           <a:xfrm>
-            <a:off x="15500160" y="29721600"/>
-            <a:ext cx="12535920" cy="3494160"/>
+            <a:off x="15500160" y="29829600"/>
+            <a:ext cx="12535560" cy="3493800"/>
           </a:xfrm>
           <a:prstGeom prst="rect">
             <a:avLst/>
@@ -4569,14 +4976,14 @@
       </p:pic>
       <p:sp>
         <p:nvSpPr>
-          <p:cNvPr id="77" name="TextShape 25"/>
-          <p:cNvSpPr txBox="1"/>
+          <p:cNvPr id="77" name="CustomShape 25"/>
+          <p:cNvSpPr/>
           <p:nvPr/>
         </p:nvSpPr>
         <p:spPr>
           <a:xfrm>
             <a:off x="15472800" y="26943120"/>
-            <a:ext cx="11247120" cy="471240"/>
+            <a:ext cx="11246760" cy="470880"/>
           </a:xfrm>
           <a:prstGeom prst="rect">
             <a:avLst/>
@@ -4586,10 +4993,20 @@
             <a:noFill/>
           </a:ln>
         </p:spPr>
+        <p:style>
+          <a:lnRef idx="0"/>
+          <a:fillRef idx="0"/>
+          <a:effectRef idx="0"/>
+          <a:fontRef idx="minor"/>
+        </p:style>
         <p:txBody>
           <a:bodyPr lIns="90000" rIns="90000" tIns="45000" bIns="45000"/>
           <a:p>
-            <a:pPr algn="just"/>
+            <a:pPr algn="just">
+              <a:lnSpc>
+                <a:spcPct val="100000"/>
+              </a:lnSpc>
+            </a:pPr>
             <a:r>
               <a:rPr b="0" lang="en-US" sz="3200" spc="-1" strike="noStrike">
                 <a:solidFill>
@@ -4600,10 +5017,7 @@
               <a:t>Bioinformatics</a:t>
             </a:r>
             <a:endParaRPr b="0" lang="en-US" sz="3200" spc="-1" strike="noStrike">
-              <a:solidFill>
-                <a:srgbClr val="3465a4"/>
-              </a:solidFill>
-              <a:latin typeface="Arial Narrow"/>
+              <a:latin typeface="Arial"/>
             </a:endParaRPr>
           </a:p>
         </p:txBody>
@@ -4620,8 +5034,31 @@
         </p:blipFill>
         <p:spPr>
           <a:xfrm>
-            <a:off x="15497280" y="27516240"/>
-            <a:ext cx="12538800" cy="759600"/>
+            <a:off x="15497280" y="27624240"/>
+            <a:ext cx="12538440" cy="759240"/>
+          </a:xfrm>
+          <a:prstGeom prst="rect">
+            <a:avLst/>
+          </a:prstGeom>
+          <a:ln>
+            <a:noFill/>
+          </a:ln>
+        </p:spPr>
+      </p:pic>
+      <p:pic>
+        <p:nvPicPr>
+          <p:cNvPr id="79" name="" descr=""/>
+          <p:cNvPicPr/>
+          <p:nvPr/>
+        </p:nvPicPr>
+        <p:blipFill>
+          <a:blip r:embed="rId14"/>
+          <a:stretch/>
+        </p:blipFill>
+        <p:spPr>
+          <a:xfrm>
+            <a:off x="18273600" y="39694680"/>
+            <a:ext cx="4480560" cy="1179000"/>
           </a:xfrm>
           <a:prstGeom prst="rect">
             <a:avLst/>

</xml_diff>

<commit_message>
minor fixes to forschungscamp poster
</commit_message>
<xml_diff>
--- a/2017-11-23__rostock__forschungscamp/poster.pptx
+++ b/2017-11-23__rostock__forschungscamp/poster.pptx
@@ -1923,9 +1923,32 @@
           <a:chExt cx="0" cy="0"/>
         </a:xfrm>
       </p:grpSpPr>
-      <p:sp>
-        <p:nvSpPr>
-          <p:cNvPr id="41" name="CustomShape 1"/>
+      <p:pic>
+        <p:nvPicPr>
+          <p:cNvPr id="41" name="" descr=""/>
+          <p:cNvPicPr/>
+          <p:nvPr/>
+        </p:nvPicPr>
+        <p:blipFill>
+          <a:blip r:embed="rId1"/>
+          <a:stretch/>
+        </p:blipFill>
+        <p:spPr>
+          <a:xfrm rot="10800000">
+            <a:off x="28072080" y="42738480"/>
+            <a:ext cx="25835040" cy="1371600"/>
+          </a:xfrm>
+          <a:prstGeom prst="rect">
+            <a:avLst/>
+          </a:prstGeom>
+          <a:ln>
+            <a:noFill/>
+          </a:ln>
+        </p:spPr>
+      </p:pic>
+      <p:sp>
+        <p:nvSpPr>
+          <p:cNvPr id="42" name="CustomShape 1"/>
           <p:cNvSpPr/>
           <p:nvPr/>
         </p:nvSpPr>
@@ -1955,7 +1978,7 @@
       </p:sp>
       <p:sp>
         <p:nvSpPr>
-          <p:cNvPr id="42" name="CustomShape 2"/>
+          <p:cNvPr id="43" name="CustomShape 2"/>
           <p:cNvSpPr/>
           <p:nvPr/>
         </p:nvSpPr>
@@ -2004,7 +2027,7 @@
       </p:sp>
       <p:sp>
         <p:nvSpPr>
-          <p:cNvPr id="43" name="CustomShape 3"/>
+          <p:cNvPr id="44" name="CustomShape 3"/>
           <p:cNvSpPr/>
           <p:nvPr/>
         </p:nvSpPr>
@@ -2356,7 +2379,7 @@
       </p:sp>
       <p:sp>
         <p:nvSpPr>
-          <p:cNvPr id="44" name="CustomShape 4"/>
+          <p:cNvPr id="45" name="CustomShape 4"/>
           <p:cNvSpPr/>
           <p:nvPr/>
         </p:nvSpPr>
@@ -2405,7 +2428,7 @@
       </p:sp>
       <p:sp>
         <p:nvSpPr>
-          <p:cNvPr id="45" name="CustomShape 5"/>
+          <p:cNvPr id="46" name="CustomShape 5"/>
           <p:cNvSpPr/>
           <p:nvPr/>
         </p:nvSpPr>
@@ -2555,7 +2578,7 @@
       </p:sp>
       <p:sp>
         <p:nvSpPr>
-          <p:cNvPr id="46" name="CustomShape 6"/>
+          <p:cNvPr id="47" name="CustomShape 6"/>
           <p:cNvSpPr/>
           <p:nvPr/>
         </p:nvSpPr>
@@ -2581,7 +2604,7 @@
       </p:sp>
       <p:sp>
         <p:nvSpPr>
-          <p:cNvPr id="47" name="CustomShape 7"/>
+          <p:cNvPr id="48" name="CustomShape 7"/>
           <p:cNvSpPr/>
           <p:nvPr/>
         </p:nvSpPr>
@@ -2607,7 +2630,7 @@
       </p:sp>
       <p:sp>
         <p:nvSpPr>
-          <p:cNvPr id="48" name="CustomShape 8"/>
+          <p:cNvPr id="49" name="CustomShape 8"/>
           <p:cNvSpPr/>
           <p:nvPr/>
         </p:nvSpPr>
@@ -2633,12 +2656,12 @@
       </p:sp>
       <p:pic>
         <p:nvPicPr>
-          <p:cNvPr id="49" name="" descr=""/>
+          <p:cNvPr id="50" name="" descr=""/>
           <p:cNvPicPr/>
           <p:nvPr/>
         </p:nvPicPr>
         <p:blipFill>
-          <a:blip r:embed="rId1"/>
+          <a:blip r:embed="rId2"/>
           <a:stretch/>
         </p:blipFill>
         <p:spPr>
@@ -2656,7 +2679,7 @@
       </p:pic>
       <p:sp>
         <p:nvSpPr>
-          <p:cNvPr id="50" name="CustomShape 9"/>
+          <p:cNvPr id="51" name="CustomShape 9"/>
           <p:cNvSpPr/>
           <p:nvPr/>
         </p:nvSpPr>
@@ -3378,18 +3401,26 @@
             </a:endParaRPr>
           </a:p>
           <a:p>
-            <a:pPr marL="895320" indent="-893880">
-              <a:lnSpc>
-                <a:spcPct val="100000"/>
-              </a:lnSpc>
-              <a:spcBef>
-                <a:spcPts val="879"/>
-              </a:spcBef>
-              <a:buClr>
-                <a:srgbClr val="000000"/>
-              </a:buClr>
-              <a:buFont typeface="Arial"/>
-              <a:buChar char="•"/>
+            <a:pPr>
+              <a:lnSpc>
+                <a:spcPct val="100000"/>
+              </a:lnSpc>
+              <a:spcBef>
+                <a:spcPts val="879"/>
+              </a:spcBef>
+            </a:pPr>
+            <a:endParaRPr b="0" lang="en-US" sz="4400" spc="-1" strike="noStrike">
+              <a:latin typeface="Arial"/>
+            </a:endParaRPr>
+          </a:p>
+          <a:p>
+            <a:pPr>
+              <a:lnSpc>
+                <a:spcPct val="100000"/>
+              </a:lnSpc>
+              <a:spcBef>
+                <a:spcPts val="879"/>
+              </a:spcBef>
             </a:pPr>
             <a:r>
               <a:rPr b="0" lang="en-US" sz="600" spc="-1" strike="noStrike">
@@ -3406,34 +3437,6 @@
             </a:endParaRPr>
           </a:p>
           <a:p>
-            <a:pPr marL="895320" indent="-893880">
-              <a:lnSpc>
-                <a:spcPct val="100000"/>
-              </a:lnSpc>
-              <a:spcBef>
-                <a:spcPts val="879"/>
-              </a:spcBef>
-              <a:buClr>
-                <a:srgbClr val="000000"/>
-              </a:buClr>
-              <a:buFont typeface="Arial"/>
-              <a:buChar char="•"/>
-            </a:pPr>
-            <a:r>
-              <a:rPr b="0" lang="en-US" sz="600" spc="-1" strike="noStrike">
-                <a:solidFill>
-                  <a:srgbClr val="000000"/>
-                </a:solidFill>
-                <a:latin typeface="Arial Narrow"/>
-                <a:ea typeface="DejaVu Sans"/>
-              </a:rPr>
-              <a:t> </a:t>
-            </a:r>
-            <a:endParaRPr b="0" lang="en-US" sz="600" spc="-1" strike="noStrike">
-              <a:latin typeface="Arial"/>
-            </a:endParaRPr>
-          </a:p>
-          <a:p>
             <a:pPr>
               <a:lnSpc>
                 <a:spcPct val="100000"/>
@@ -3958,30 +3961,15 @@
             </a:endParaRPr>
           </a:p>
           <a:p>
-            <a:pPr marL="895320" indent="-893880">
-              <a:lnSpc>
-                <a:spcPct val="100000"/>
-              </a:lnSpc>
-              <a:spcBef>
-                <a:spcPts val="879"/>
-              </a:spcBef>
-              <a:buClr>
-                <a:srgbClr val="000000"/>
-              </a:buClr>
-              <a:buFont typeface="Arial"/>
-              <a:buChar char="•"/>
-            </a:pPr>
-            <a:r>
-              <a:rPr b="0" lang="en-US" sz="600" spc="-1" strike="noStrike">
-                <a:solidFill>
-                  <a:srgbClr val="000000"/>
-                </a:solidFill>
-                <a:latin typeface="Arial Narrow"/>
-                <a:ea typeface="DejaVu Sans"/>
-              </a:rPr>
-              <a:t> </a:t>
-            </a:r>
-            <a:endParaRPr b="0" lang="en-US" sz="600" spc="-1" strike="noStrike">
+            <a:pPr>
+              <a:lnSpc>
+                <a:spcPct val="100000"/>
+              </a:lnSpc>
+              <a:spcBef>
+                <a:spcPts val="879"/>
+              </a:spcBef>
+            </a:pPr>
+            <a:endParaRPr b="0" lang="en-US" sz="4400" spc="-1" strike="noStrike">
               <a:latin typeface="Arial"/>
             </a:endParaRPr>
           </a:p>
@@ -4045,7 +4033,7 @@
       </p:sp>
       <p:sp>
         <p:nvSpPr>
-          <p:cNvPr id="51" name="CustomShape 10"/>
+          <p:cNvPr id="52" name="CustomShape 10"/>
           <p:cNvSpPr/>
           <p:nvPr/>
         </p:nvSpPr>
@@ -4076,7 +4064,7 @@
       </p:sp>
       <p:sp>
         <p:nvSpPr>
-          <p:cNvPr id="52" name="CustomShape 11"/>
+          <p:cNvPr id="53" name="CustomShape 11"/>
           <p:cNvSpPr/>
           <p:nvPr/>
         </p:nvSpPr>
@@ -4107,7 +4095,7 @@
       </p:sp>
       <p:sp>
         <p:nvSpPr>
-          <p:cNvPr id="53" name="CustomShape 12"/>
+          <p:cNvPr id="54" name="CustomShape 12"/>
           <p:cNvSpPr/>
           <p:nvPr/>
         </p:nvSpPr>
@@ -4138,7 +4126,7 @@
       </p:sp>
       <p:sp>
         <p:nvSpPr>
-          <p:cNvPr id="54" name="CustomShape 13"/>
+          <p:cNvPr id="55" name="CustomShape 13"/>
           <p:cNvSpPr/>
           <p:nvPr/>
         </p:nvSpPr>
@@ -4193,7 +4181,7 @@
       </p:sp>
       <p:sp>
         <p:nvSpPr>
-          <p:cNvPr id="55" name="CustomShape 14"/>
+          <p:cNvPr id="56" name="CustomShape 14"/>
           <p:cNvSpPr/>
           <p:nvPr/>
         </p:nvSpPr>
@@ -4242,7 +4230,7 @@
       </p:sp>
       <p:sp>
         <p:nvSpPr>
-          <p:cNvPr id="56" name="CustomShape 15"/>
+          <p:cNvPr id="57" name="CustomShape 15"/>
           <p:cNvSpPr/>
           <p:nvPr/>
         </p:nvSpPr>
@@ -4291,12 +4279,12 @@
       </p:sp>
       <p:pic>
         <p:nvPicPr>
-          <p:cNvPr id="57" name="" descr=""/>
+          <p:cNvPr id="58" name="" descr=""/>
           <p:cNvPicPr/>
           <p:nvPr/>
         </p:nvPicPr>
         <p:blipFill>
-          <a:blip r:embed="rId2"/>
+          <a:blip r:embed="rId3"/>
           <a:stretch/>
         </p:blipFill>
         <p:spPr>
@@ -4314,7 +4302,7 @@
       </p:pic>
       <p:sp>
         <p:nvSpPr>
-          <p:cNvPr id="58" name="CustomShape 16"/>
+          <p:cNvPr id="59" name="CustomShape 16"/>
           <p:cNvSpPr/>
           <p:nvPr/>
         </p:nvSpPr>
@@ -4421,29 +4409,6 @@
           </a:p>
         </p:txBody>
       </p:sp>
-      <p:pic>
-        <p:nvPicPr>
-          <p:cNvPr id="59" name="" descr=""/>
-          <p:cNvPicPr/>
-          <p:nvPr/>
-        </p:nvPicPr>
-        <p:blipFill>
-          <a:blip r:embed="rId3"/>
-          <a:stretch/>
-        </p:blipFill>
-        <p:spPr>
-          <a:xfrm>
-            <a:off x="11590560" y="29286000"/>
-            <a:ext cx="1806840" cy="1792080"/>
-          </a:xfrm>
-          <a:prstGeom prst="rect">
-            <a:avLst/>
-          </a:prstGeom>
-          <a:ln>
-            <a:noFill/>
-          </a:ln>
-        </p:spPr>
-      </p:pic>
       <p:pic>
         <p:nvPicPr>
           <p:cNvPr id="60" name="" descr=""/>
@@ -4456,8 +4421,8 @@
         </p:blipFill>
         <p:spPr>
           <a:xfrm>
-            <a:off x="11532240" y="25394760"/>
-            <a:ext cx="1980360" cy="2003400"/>
+            <a:off x="11590560" y="29286000"/>
+            <a:ext cx="1806840" cy="1792080"/>
           </a:xfrm>
           <a:prstGeom prst="rect">
             <a:avLst/>
@@ -4479,8 +4444,8 @@
         </p:blipFill>
         <p:spPr>
           <a:xfrm>
-            <a:off x="11486160" y="33040800"/>
-            <a:ext cx="2129040" cy="3010320"/>
+            <a:off x="11532240" y="25394760"/>
+            <a:ext cx="1980360" cy="2003400"/>
           </a:xfrm>
           <a:prstGeom prst="rect">
             <a:avLst/>
@@ -4490,9 +4455,32 @@
           </a:ln>
         </p:spPr>
       </p:pic>
-      <p:sp>
-        <p:nvSpPr>
-          <p:cNvPr id="62" name="CustomShape 17"/>
+      <p:pic>
+        <p:nvPicPr>
+          <p:cNvPr id="62" name="" descr=""/>
+          <p:cNvPicPr/>
+          <p:nvPr/>
+        </p:nvPicPr>
+        <p:blipFill>
+          <a:blip r:embed="rId6"/>
+          <a:stretch/>
+        </p:blipFill>
+        <p:spPr>
+          <a:xfrm>
+            <a:off x="11486160" y="33040800"/>
+            <a:ext cx="2129040" cy="3010320"/>
+          </a:xfrm>
+          <a:prstGeom prst="rect">
+            <a:avLst/>
+          </a:prstGeom>
+          <a:ln>
+            <a:noFill/>
+          </a:ln>
+        </p:spPr>
+      </p:pic>
+      <p:sp>
+        <p:nvSpPr>
+          <p:cNvPr id="63" name="CustomShape 17"/>
           <p:cNvSpPr/>
           <p:nvPr/>
         </p:nvSpPr>
@@ -4541,7 +4529,7 @@
       </p:sp>
       <p:sp>
         <p:nvSpPr>
-          <p:cNvPr id="63" name="CustomShape 18"/>
+          <p:cNvPr id="64" name="CustomShape 18"/>
           <p:cNvSpPr/>
           <p:nvPr/>
         </p:nvSpPr>
@@ -4590,7 +4578,7 @@
       </p:sp>
       <p:sp>
         <p:nvSpPr>
-          <p:cNvPr id="64" name="CustomShape 19"/>
+          <p:cNvPr id="65" name="CustomShape 19"/>
           <p:cNvSpPr/>
           <p:nvPr/>
         </p:nvSpPr>
@@ -4639,12 +4627,12 @@
       </p:sp>
       <p:pic>
         <p:nvPicPr>
-          <p:cNvPr id="65" name="" descr=""/>
+          <p:cNvPr id="66" name="" descr=""/>
           <p:cNvPicPr/>
           <p:nvPr/>
         </p:nvPicPr>
         <p:blipFill>
-          <a:blip r:embed="rId6"/>
+          <a:blip r:embed="rId7"/>
           <a:stretch/>
         </p:blipFill>
         <p:spPr>
@@ -4662,7 +4650,7 @@
       </p:pic>
       <p:sp>
         <p:nvSpPr>
-          <p:cNvPr id="66" name="CustomShape 20"/>
+          <p:cNvPr id="67" name="CustomShape 20"/>
           <p:cNvSpPr/>
           <p:nvPr/>
         </p:nvSpPr>
@@ -4711,7 +4699,7 @@
       </p:sp>
       <p:sp>
         <p:nvSpPr>
-          <p:cNvPr id="67" name="CustomShape 21"/>
+          <p:cNvPr id="68" name="CustomShape 21"/>
           <p:cNvSpPr/>
           <p:nvPr/>
         </p:nvSpPr>
@@ -4758,29 +4746,6 @@
           </a:p>
         </p:txBody>
       </p:sp>
-      <p:pic>
-        <p:nvPicPr>
-          <p:cNvPr id="68" name="" descr=""/>
-          <p:cNvPicPr/>
-          <p:nvPr/>
-        </p:nvPicPr>
-        <p:blipFill>
-          <a:blip r:embed="rId7"/>
-          <a:stretch/>
-        </p:blipFill>
-        <p:spPr>
-          <a:xfrm>
-            <a:off x="9047880" y="36021600"/>
-            <a:ext cx="5563800" cy="3931200"/>
-          </a:xfrm>
-          <a:prstGeom prst="rect">
-            <a:avLst/>
-          </a:prstGeom>
-          <a:ln>
-            <a:noFill/>
-          </a:ln>
-        </p:spPr>
-      </p:pic>
       <p:pic>
         <p:nvPicPr>
           <p:cNvPr id="69" name="" descr=""/>
@@ -4793,8 +4758,8 @@
         </p:blipFill>
         <p:spPr>
           <a:xfrm>
-            <a:off x="26052480" y="39539520"/>
-            <a:ext cx="1944360" cy="1453320"/>
+            <a:off x="9047880" y="36021600"/>
+            <a:ext cx="5563800" cy="3931200"/>
           </a:xfrm>
           <a:prstGeom prst="rect">
             <a:avLst/>
@@ -4816,8 +4781,8 @@
         </p:blipFill>
         <p:spPr>
           <a:xfrm>
-            <a:off x="22956480" y="39518640"/>
-            <a:ext cx="2981160" cy="1537920"/>
+            <a:off x="26052480" y="39539520"/>
+            <a:ext cx="1944360" cy="1453320"/>
           </a:xfrm>
           <a:prstGeom prst="rect">
             <a:avLst/>
@@ -4839,8 +4804,8 @@
         </p:blipFill>
         <p:spPr>
           <a:xfrm>
-            <a:off x="15257160" y="11244600"/>
-            <a:ext cx="12715200" cy="7849080"/>
+            <a:off x="22956480" y="39518640"/>
+            <a:ext cx="2981160" cy="1537920"/>
           </a:xfrm>
           <a:prstGeom prst="rect">
             <a:avLst/>
@@ -4850,9 +4815,32 @@
           </a:ln>
         </p:spPr>
       </p:pic>
-      <p:sp>
-        <p:nvSpPr>
-          <p:cNvPr id="72" name="Line 22"/>
+      <p:pic>
+        <p:nvPicPr>
+          <p:cNvPr id="72" name="" descr=""/>
+          <p:cNvPicPr/>
+          <p:nvPr/>
+        </p:nvPicPr>
+        <p:blipFill>
+          <a:blip r:embed="rId11"/>
+          <a:stretch/>
+        </p:blipFill>
+        <p:spPr>
+          <a:xfrm>
+            <a:off x="15257160" y="11244600"/>
+            <a:ext cx="12715200" cy="7849080"/>
+          </a:xfrm>
+          <a:prstGeom prst="rect">
+            <a:avLst/>
+          </a:prstGeom>
+          <a:ln>
+            <a:noFill/>
+          </a:ln>
+        </p:spPr>
+      </p:pic>
+      <p:sp>
+        <p:nvSpPr>
+          <p:cNvPr id="73" name="Line 22"/>
           <p:cNvSpPr/>
           <p:nvPr/>
         </p:nvSpPr>
@@ -4880,7 +4868,7 @@
       </p:sp>
       <p:sp>
         <p:nvSpPr>
-          <p:cNvPr id="73" name="Line 23"/>
+          <p:cNvPr id="74" name="Line 23"/>
           <p:cNvSpPr/>
           <p:nvPr/>
         </p:nvSpPr>
@@ -4908,7 +4896,7 @@
       </p:sp>
       <p:sp>
         <p:nvSpPr>
-          <p:cNvPr id="74" name="CustomShape 24"/>
+          <p:cNvPr id="75" name="CustomShape 24"/>
           <p:cNvSpPr/>
           <p:nvPr/>
         </p:nvSpPr>
@@ -4957,12 +4945,12 @@
       </p:sp>
       <p:pic>
         <p:nvPicPr>
-          <p:cNvPr id="75" name="" descr=""/>
+          <p:cNvPr id="76" name="" descr=""/>
           <p:cNvPicPr/>
           <p:nvPr/>
         </p:nvPicPr>
         <p:blipFill>
-          <a:blip r:embed="rId11"/>
+          <a:blip r:embed="rId12"/>
           <a:stretch/>
         </p:blipFill>
         <p:spPr>
@@ -4980,7 +4968,7 @@
       </p:pic>
       <p:sp>
         <p:nvSpPr>
-          <p:cNvPr id="76" name="CustomShape 25"/>
+          <p:cNvPr id="77" name="CustomShape 25"/>
           <p:cNvSpPr/>
           <p:nvPr/>
         </p:nvSpPr>
@@ -5027,29 +5015,6 @@
           </a:p>
         </p:txBody>
       </p:sp>
-      <p:pic>
-        <p:nvPicPr>
-          <p:cNvPr id="77" name="" descr=""/>
-          <p:cNvPicPr/>
-          <p:nvPr/>
-        </p:nvPicPr>
-        <p:blipFill>
-          <a:blip r:embed="rId12"/>
-          <a:stretch/>
-        </p:blipFill>
-        <p:spPr>
-          <a:xfrm>
-            <a:off x="15497280" y="27840240"/>
-            <a:ext cx="12538080" cy="758880"/>
-          </a:xfrm>
-          <a:prstGeom prst="rect">
-            <a:avLst/>
-          </a:prstGeom>
-          <a:ln>
-            <a:noFill/>
-          </a:ln>
-        </p:spPr>
-      </p:pic>
       <p:pic>
         <p:nvPicPr>
           <p:cNvPr id="78" name="" descr=""/>
@@ -5062,8 +5027,8 @@
         </p:blipFill>
         <p:spPr>
           <a:xfrm>
-            <a:off x="18273600" y="39694680"/>
-            <a:ext cx="4480200" cy="1178640"/>
+            <a:off x="15497280" y="27840240"/>
+            <a:ext cx="12538080" cy="758880"/>
           </a:xfrm>
           <a:prstGeom prst="rect">
             <a:avLst/>
@@ -5084,9 +5049,9 @@
           <a:stretch/>
         </p:blipFill>
         <p:spPr>
-          <a:xfrm rot="10800000">
-            <a:off x="28072080" y="42738480"/>
-            <a:ext cx="25835040" cy="1371600"/>
+          <a:xfrm>
+            <a:off x="18273600" y="39694680"/>
+            <a:ext cx="4480200" cy="1178640"/>
           </a:xfrm>
           <a:prstGeom prst="rect">
             <a:avLst/>

</xml_diff>